<commit_message>
Uploading the files for Configuration Model
</commit_message>
<xml_diff>
--- a/Images/SI4.pptx
+++ b/Images/SI4.pptx
@@ -197,7 +197,7 @@
           <a:p>
             <a:fld id="{0C45F89B-D0D3-4AC5-836F-869636F86470}" type="datetimeFigureOut">
               <a:rPr lang="en-US" smtClean="0"/>
-              <a:t>7/16/2021</a:t>
+              <a:t>7/23/2021</a:t>
             </a:fld>
             <a:endParaRPr lang="en-US"/>
           </a:p>
@@ -595,7 +595,7 @@
           <a:p>
             <a:fld id="{1516511B-B61A-47A9-97DC-35FBB5E54714}" type="datetimeFigureOut">
               <a:rPr lang="en-US" smtClean="0"/>
-              <a:t>7/16/2021</a:t>
+              <a:t>7/23/2021</a:t>
             </a:fld>
             <a:endParaRPr lang="en-US"/>
           </a:p>
@@ -765,7 +765,7 @@
           <a:p>
             <a:fld id="{1516511B-B61A-47A9-97DC-35FBB5E54714}" type="datetimeFigureOut">
               <a:rPr lang="en-US" smtClean="0"/>
-              <a:t>7/16/2021</a:t>
+              <a:t>7/23/2021</a:t>
             </a:fld>
             <a:endParaRPr lang="en-US"/>
           </a:p>
@@ -945,7 +945,7 @@
           <a:p>
             <a:fld id="{1516511B-B61A-47A9-97DC-35FBB5E54714}" type="datetimeFigureOut">
               <a:rPr lang="en-US" smtClean="0"/>
-              <a:t>7/16/2021</a:t>
+              <a:t>7/23/2021</a:t>
             </a:fld>
             <a:endParaRPr lang="en-US"/>
           </a:p>
@@ -1115,7 +1115,7 @@
           <a:p>
             <a:fld id="{1516511B-B61A-47A9-97DC-35FBB5E54714}" type="datetimeFigureOut">
               <a:rPr lang="en-US" smtClean="0"/>
-              <a:t>7/16/2021</a:t>
+              <a:t>7/23/2021</a:t>
             </a:fld>
             <a:endParaRPr lang="en-US"/>
           </a:p>
@@ -1361,7 +1361,7 @@
           <a:p>
             <a:fld id="{1516511B-B61A-47A9-97DC-35FBB5E54714}" type="datetimeFigureOut">
               <a:rPr lang="en-US" smtClean="0"/>
-              <a:t>7/16/2021</a:t>
+              <a:t>7/23/2021</a:t>
             </a:fld>
             <a:endParaRPr lang="en-US"/>
           </a:p>
@@ -1593,7 +1593,7 @@
           <a:p>
             <a:fld id="{1516511B-B61A-47A9-97DC-35FBB5E54714}" type="datetimeFigureOut">
               <a:rPr lang="en-US" smtClean="0"/>
-              <a:t>7/16/2021</a:t>
+              <a:t>7/23/2021</a:t>
             </a:fld>
             <a:endParaRPr lang="en-US"/>
           </a:p>
@@ -1960,7 +1960,7 @@
           <a:p>
             <a:fld id="{1516511B-B61A-47A9-97DC-35FBB5E54714}" type="datetimeFigureOut">
               <a:rPr lang="en-US" smtClean="0"/>
-              <a:t>7/16/2021</a:t>
+              <a:t>7/23/2021</a:t>
             </a:fld>
             <a:endParaRPr lang="en-US"/>
           </a:p>
@@ -2078,7 +2078,7 @@
           <a:p>
             <a:fld id="{1516511B-B61A-47A9-97DC-35FBB5E54714}" type="datetimeFigureOut">
               <a:rPr lang="en-US" smtClean="0"/>
-              <a:t>7/16/2021</a:t>
+              <a:t>7/23/2021</a:t>
             </a:fld>
             <a:endParaRPr lang="en-US"/>
           </a:p>
@@ -2173,7 +2173,7 @@
           <a:p>
             <a:fld id="{1516511B-B61A-47A9-97DC-35FBB5E54714}" type="datetimeFigureOut">
               <a:rPr lang="en-US" smtClean="0"/>
-              <a:t>7/16/2021</a:t>
+              <a:t>7/23/2021</a:t>
             </a:fld>
             <a:endParaRPr lang="en-US"/>
           </a:p>
@@ -2450,7 +2450,7 @@
           <a:p>
             <a:fld id="{1516511B-B61A-47A9-97DC-35FBB5E54714}" type="datetimeFigureOut">
               <a:rPr lang="en-US" smtClean="0"/>
-              <a:t>7/16/2021</a:t>
+              <a:t>7/23/2021</a:t>
             </a:fld>
             <a:endParaRPr lang="en-US"/>
           </a:p>
@@ -2707,7 +2707,7 @@
           <a:p>
             <a:fld id="{1516511B-B61A-47A9-97DC-35FBB5E54714}" type="datetimeFigureOut">
               <a:rPr lang="en-US" smtClean="0"/>
-              <a:t>7/16/2021</a:t>
+              <a:t>7/23/2021</a:t>
             </a:fld>
             <a:endParaRPr lang="en-US"/>
           </a:p>
@@ -2920,7 +2920,7 @@
           <a:p>
             <a:fld id="{1516511B-B61A-47A9-97DC-35FBB5E54714}" type="datetimeFigureOut">
               <a:rPr lang="en-US" smtClean="0"/>
-              <a:t>7/16/2021</a:t>
+              <a:t>7/23/2021</a:t>
             </a:fld>
             <a:endParaRPr lang="en-US"/>
           </a:p>
@@ -3345,6 +3345,9 @@
           <a:prstGeom prst="roundRect">
             <a:avLst/>
           </a:prstGeom>
+          <a:solidFill>
+            <a:srgbClr val="56B288"/>
+          </a:solidFill>
         </p:spPr>
         <p:style>
           <a:lnRef idx="1">
@@ -3366,7 +3369,10 @@
           <a:p>
             <a:pPr algn="ctr"/>
             <a:r>
-              <a:rPr lang="en-US" dirty="0"/>
+              <a:rPr lang="en-US" dirty="0">
+                <a:latin typeface="Times New Roman" panose="02020603050405020304" pitchFamily="18" charset="0"/>
+                <a:cs typeface="Times New Roman" panose="02020603050405020304" pitchFamily="18" charset="0"/>
+              </a:rPr>
               <a:t>Ligand A</a:t>
             </a:r>
           </a:p>
@@ -3392,6 +3398,9 @@
           <a:prstGeom prst="roundRect">
             <a:avLst/>
           </a:prstGeom>
+          <a:solidFill>
+            <a:srgbClr val="56B288"/>
+          </a:solidFill>
         </p:spPr>
         <p:style>
           <a:lnRef idx="1">
@@ -3413,7 +3422,10 @@
           <a:p>
             <a:pPr algn="ctr"/>
             <a:r>
-              <a:rPr lang="en-US" dirty="0"/>
+              <a:rPr lang="en-US" dirty="0">
+                <a:latin typeface="Times New Roman" panose="02020603050405020304" pitchFamily="18" charset="0"/>
+                <a:cs typeface="Times New Roman" panose="02020603050405020304" pitchFamily="18" charset="0"/>
+              </a:rPr>
               <a:t>Ligand B</a:t>
             </a:r>
           </a:p>
@@ -3439,152 +3451,8 @@
           <a:prstGeom prst="roundRect">
             <a:avLst/>
           </a:prstGeom>
-        </p:spPr>
-        <p:style>
-          <a:lnRef idx="1">
-            <a:schemeClr val="accent6"/>
-          </a:lnRef>
-          <a:fillRef idx="2">
-            <a:schemeClr val="accent6"/>
-          </a:fillRef>
-          <a:effectRef idx="1">
-            <a:schemeClr val="accent6"/>
-          </a:effectRef>
-          <a:fontRef idx="minor">
-            <a:schemeClr val="dk1"/>
-          </a:fontRef>
-        </p:style>
-        <p:txBody>
-          <a:bodyPr rtlCol="0" anchor="ctr"/>
-          <a:lstStyle/>
-          <a:p>
-            <a:pPr algn="ctr"/>
-            <a:r>
-              <a:rPr lang="en-US" dirty="0"/>
-              <a:t>Protein 1</a:t>
-            </a:r>
-          </a:p>
-        </p:txBody>
-      </p:sp>
-      <p:sp>
-        <p:nvSpPr>
-          <p:cNvPr id="18" name="Rectangle: Rounded Corners 17">
-            <a:extLst>
-              <a:ext uri="{FF2B5EF4-FFF2-40B4-BE49-F238E27FC236}">
-                <a16:creationId xmlns:a16="http://schemas.microsoft.com/office/drawing/2014/main" id="{A731C30A-EBB3-49DA-B2B0-29E66C74515A}"/>
-              </a:ext>
-            </a:extLst>
-          </p:cNvPr>
-          <p:cNvSpPr/>
-          <p:nvPr/>
-        </p:nvSpPr>
-        <p:spPr>
-          <a:xfrm>
-            <a:off x="3243179" y="1195817"/>
-            <a:ext cx="1331494" cy="689811"/>
-          </a:xfrm>
-          <a:prstGeom prst="roundRect">
-            <a:avLst/>
-          </a:prstGeom>
-        </p:spPr>
-        <p:style>
-          <a:lnRef idx="1">
-            <a:schemeClr val="accent6"/>
-          </a:lnRef>
-          <a:fillRef idx="2">
-            <a:schemeClr val="accent6"/>
-          </a:fillRef>
-          <a:effectRef idx="1">
-            <a:schemeClr val="accent6"/>
-          </a:effectRef>
-          <a:fontRef idx="minor">
-            <a:schemeClr val="dk1"/>
-          </a:fontRef>
-        </p:style>
-        <p:txBody>
-          <a:bodyPr rtlCol="0" anchor="ctr"/>
-          <a:lstStyle/>
-          <a:p>
-            <a:pPr algn="ctr"/>
-            <a:r>
-              <a:rPr lang="en-US" dirty="0"/>
-              <a:t>Protein 2</a:t>
-            </a:r>
-          </a:p>
-        </p:txBody>
-      </p:sp>
-      <p:sp>
-        <p:nvSpPr>
-          <p:cNvPr id="19" name="Rectangle: Rounded Corners 18">
-            <a:extLst>
-              <a:ext uri="{FF2B5EF4-FFF2-40B4-BE49-F238E27FC236}">
-                <a16:creationId xmlns:a16="http://schemas.microsoft.com/office/drawing/2014/main" id="{01C0B325-B647-42FD-9DF6-86FB03A66F36}"/>
-              </a:ext>
-            </a:extLst>
-          </p:cNvPr>
-          <p:cNvSpPr/>
-          <p:nvPr/>
-        </p:nvSpPr>
-        <p:spPr>
-          <a:xfrm>
-            <a:off x="3243179" y="2124254"/>
-            <a:ext cx="1331494" cy="689811"/>
-          </a:xfrm>
-          <a:prstGeom prst="roundRect">
-            <a:avLst/>
-          </a:prstGeom>
-        </p:spPr>
-        <p:style>
-          <a:lnRef idx="1">
-            <a:schemeClr val="accent6"/>
-          </a:lnRef>
-          <a:fillRef idx="2">
-            <a:schemeClr val="accent6"/>
-          </a:fillRef>
-          <a:effectRef idx="1">
-            <a:schemeClr val="accent6"/>
-          </a:effectRef>
-          <a:fontRef idx="minor">
-            <a:schemeClr val="dk1"/>
-          </a:fontRef>
-        </p:style>
-        <p:txBody>
-          <a:bodyPr rtlCol="0" anchor="ctr"/>
-          <a:lstStyle/>
-          <a:p>
-            <a:pPr algn="ctr"/>
-            <a:r>
-              <a:rPr lang="en-US" dirty="0"/>
-              <a:t>Protein 3</a:t>
-            </a:r>
-          </a:p>
-        </p:txBody>
-      </p:sp>
-      <p:sp>
-        <p:nvSpPr>
-          <p:cNvPr id="20" name="Rectangle: Rounded Corners 19">
-            <a:extLst>
-              <a:ext uri="{FF2B5EF4-FFF2-40B4-BE49-F238E27FC236}">
-                <a16:creationId xmlns:a16="http://schemas.microsoft.com/office/drawing/2014/main" id="{CE882CC2-DED2-4588-8310-A1638C54D91E}"/>
-              </a:ext>
-            </a:extLst>
-          </p:cNvPr>
-          <p:cNvSpPr/>
-          <p:nvPr/>
-        </p:nvSpPr>
-        <p:spPr>
-          <a:xfrm>
-            <a:off x="3243179" y="3335433"/>
-            <a:ext cx="1331494" cy="689811"/>
-          </a:xfrm>
-          <a:prstGeom prst="roundRect">
-            <a:avLst/>
-          </a:prstGeom>
           <a:solidFill>
-            <a:schemeClr val="accent5">
-              <a:lumMod val="60000"/>
-              <a:lumOff val="40000"/>
-            </a:schemeClr>
+            <a:srgbClr val="E8718C"/>
           </a:solidFill>
         </p:spPr>
         <p:style>
@@ -3607,18 +3475,21 @@
           <a:p>
             <a:pPr algn="ctr"/>
             <a:r>
-              <a:rPr lang="en-US" dirty="0"/>
-              <a:t>Protein 4</a:t>
-            </a:r>
-          </a:p>
-        </p:txBody>
-      </p:sp>
-      <p:sp>
-        <p:nvSpPr>
-          <p:cNvPr id="23" name="Rectangle: Rounded Corners 22">
+              <a:rPr lang="en-US" dirty="0">
+                <a:latin typeface="Times New Roman" panose="02020603050405020304" pitchFamily="18" charset="0"/>
+                <a:cs typeface="Times New Roman" panose="02020603050405020304" pitchFamily="18" charset="0"/>
+              </a:rPr>
+              <a:t>Protein 1</a:t>
+            </a:r>
+          </a:p>
+        </p:txBody>
+      </p:sp>
+      <p:sp>
+        <p:nvSpPr>
+          <p:cNvPr id="18" name="Rectangle: Rounded Corners 17">
             <a:extLst>
               <a:ext uri="{FF2B5EF4-FFF2-40B4-BE49-F238E27FC236}">
-                <a16:creationId xmlns:a16="http://schemas.microsoft.com/office/drawing/2014/main" id="{36C5C4C5-FC9C-48A5-A1DE-D905C3DBCE48}"/>
+                <a16:creationId xmlns:a16="http://schemas.microsoft.com/office/drawing/2014/main" id="{A731C30A-EBB3-49DA-B2B0-29E66C74515A}"/>
               </a:ext>
             </a:extLst>
           </p:cNvPr>
@@ -3627,17 +3498,14 @@
         </p:nvSpPr>
         <p:spPr>
           <a:xfrm>
-            <a:off x="3267241" y="4458381"/>
+            <a:off x="3243179" y="1195817"/>
             <a:ext cx="1331494" cy="689811"/>
           </a:xfrm>
           <a:prstGeom prst="roundRect">
             <a:avLst/>
           </a:prstGeom>
           <a:solidFill>
-            <a:schemeClr val="accent5">
-              <a:lumMod val="60000"/>
-              <a:lumOff val="40000"/>
-            </a:schemeClr>
+            <a:srgbClr val="E8718C"/>
           </a:solidFill>
         </p:spPr>
         <p:style>
@@ -3660,7 +3528,169 @@
           <a:p>
             <a:pPr algn="ctr"/>
             <a:r>
-              <a:rPr lang="en-US" dirty="0"/>
+              <a:rPr lang="en-US" dirty="0">
+                <a:latin typeface="Times New Roman" panose="02020603050405020304" pitchFamily="18" charset="0"/>
+                <a:cs typeface="Times New Roman" panose="02020603050405020304" pitchFamily="18" charset="0"/>
+              </a:rPr>
+              <a:t>Protein 2</a:t>
+            </a:r>
+          </a:p>
+        </p:txBody>
+      </p:sp>
+      <p:sp>
+        <p:nvSpPr>
+          <p:cNvPr id="19" name="Rectangle: Rounded Corners 18">
+            <a:extLst>
+              <a:ext uri="{FF2B5EF4-FFF2-40B4-BE49-F238E27FC236}">
+                <a16:creationId xmlns:a16="http://schemas.microsoft.com/office/drawing/2014/main" id="{01C0B325-B647-42FD-9DF6-86FB03A66F36}"/>
+              </a:ext>
+            </a:extLst>
+          </p:cNvPr>
+          <p:cNvSpPr/>
+          <p:nvPr/>
+        </p:nvSpPr>
+        <p:spPr>
+          <a:xfrm>
+            <a:off x="3243179" y="2124254"/>
+            <a:ext cx="1331494" cy="689811"/>
+          </a:xfrm>
+          <a:prstGeom prst="roundRect">
+            <a:avLst/>
+          </a:prstGeom>
+          <a:solidFill>
+            <a:srgbClr val="E8718C"/>
+          </a:solidFill>
+        </p:spPr>
+        <p:style>
+          <a:lnRef idx="1">
+            <a:schemeClr val="accent6"/>
+          </a:lnRef>
+          <a:fillRef idx="2">
+            <a:schemeClr val="accent6"/>
+          </a:fillRef>
+          <a:effectRef idx="1">
+            <a:schemeClr val="accent6"/>
+          </a:effectRef>
+          <a:fontRef idx="minor">
+            <a:schemeClr val="dk1"/>
+          </a:fontRef>
+        </p:style>
+        <p:txBody>
+          <a:bodyPr rtlCol="0" anchor="ctr"/>
+          <a:lstStyle/>
+          <a:p>
+            <a:pPr algn="ctr"/>
+            <a:r>
+              <a:rPr lang="en-US" dirty="0">
+                <a:latin typeface="Times New Roman" panose="02020603050405020304" pitchFamily="18" charset="0"/>
+                <a:cs typeface="Times New Roman" panose="02020603050405020304" pitchFamily="18" charset="0"/>
+              </a:rPr>
+              <a:t>Protein 3</a:t>
+            </a:r>
+          </a:p>
+        </p:txBody>
+      </p:sp>
+      <p:sp>
+        <p:nvSpPr>
+          <p:cNvPr id="20" name="Rectangle: Rounded Corners 19">
+            <a:extLst>
+              <a:ext uri="{FF2B5EF4-FFF2-40B4-BE49-F238E27FC236}">
+                <a16:creationId xmlns:a16="http://schemas.microsoft.com/office/drawing/2014/main" id="{CE882CC2-DED2-4588-8310-A1638C54D91E}"/>
+              </a:ext>
+            </a:extLst>
+          </p:cNvPr>
+          <p:cNvSpPr/>
+          <p:nvPr/>
+        </p:nvSpPr>
+        <p:spPr>
+          <a:xfrm>
+            <a:off x="3243179" y="3335433"/>
+            <a:ext cx="1331494" cy="689811"/>
+          </a:xfrm>
+          <a:prstGeom prst="roundRect">
+            <a:avLst/>
+          </a:prstGeom>
+          <a:solidFill>
+            <a:srgbClr val="E8718C"/>
+          </a:solidFill>
+        </p:spPr>
+        <p:style>
+          <a:lnRef idx="1">
+            <a:schemeClr val="accent6"/>
+          </a:lnRef>
+          <a:fillRef idx="2">
+            <a:schemeClr val="accent6"/>
+          </a:fillRef>
+          <a:effectRef idx="1">
+            <a:schemeClr val="accent6"/>
+          </a:effectRef>
+          <a:fontRef idx="minor">
+            <a:schemeClr val="dk1"/>
+          </a:fontRef>
+        </p:style>
+        <p:txBody>
+          <a:bodyPr rtlCol="0" anchor="ctr"/>
+          <a:lstStyle/>
+          <a:p>
+            <a:pPr algn="ctr"/>
+            <a:r>
+              <a:rPr lang="en-US" dirty="0">
+                <a:latin typeface="Times New Roman" panose="02020603050405020304" pitchFamily="18" charset="0"/>
+                <a:cs typeface="Times New Roman" panose="02020603050405020304" pitchFamily="18" charset="0"/>
+              </a:rPr>
+              <a:t>Protein 4</a:t>
+            </a:r>
+          </a:p>
+        </p:txBody>
+      </p:sp>
+      <p:sp>
+        <p:nvSpPr>
+          <p:cNvPr id="23" name="Rectangle: Rounded Corners 22">
+            <a:extLst>
+              <a:ext uri="{FF2B5EF4-FFF2-40B4-BE49-F238E27FC236}">
+                <a16:creationId xmlns:a16="http://schemas.microsoft.com/office/drawing/2014/main" id="{36C5C4C5-FC9C-48A5-A1DE-D905C3DBCE48}"/>
+              </a:ext>
+            </a:extLst>
+          </p:cNvPr>
+          <p:cNvSpPr/>
+          <p:nvPr/>
+        </p:nvSpPr>
+        <p:spPr>
+          <a:xfrm>
+            <a:off x="3267241" y="4458381"/>
+            <a:ext cx="1331494" cy="689811"/>
+          </a:xfrm>
+          <a:prstGeom prst="roundRect">
+            <a:avLst/>
+          </a:prstGeom>
+          <a:solidFill>
+            <a:srgbClr val="E8718C"/>
+          </a:solidFill>
+        </p:spPr>
+        <p:style>
+          <a:lnRef idx="1">
+            <a:schemeClr val="accent6"/>
+          </a:lnRef>
+          <a:fillRef idx="2">
+            <a:schemeClr val="accent6"/>
+          </a:fillRef>
+          <a:effectRef idx="1">
+            <a:schemeClr val="accent6"/>
+          </a:effectRef>
+          <a:fontRef idx="minor">
+            <a:schemeClr val="dk1"/>
+          </a:fontRef>
+        </p:style>
+        <p:txBody>
+          <a:bodyPr rtlCol="0" anchor="ctr"/>
+          <a:lstStyle/>
+          <a:p>
+            <a:pPr algn="ctr"/>
+            <a:r>
+              <a:rPr lang="en-US" dirty="0">
+                <a:latin typeface="Times New Roman" panose="02020603050405020304" pitchFamily="18" charset="0"/>
+                <a:cs typeface="Times New Roman" panose="02020603050405020304" pitchFamily="18" charset="0"/>
+              </a:rPr>
               <a:t>Protein 5</a:t>
             </a:r>
           </a:p>
@@ -3690,7 +3720,11 @@
           <a:prstGeom prst="line">
             <a:avLst/>
           </a:prstGeom>
-          <a:ln w="12700"/>
+          <a:ln w="12700">
+            <a:solidFill>
+              <a:schemeClr val="tx1"/>
+            </a:solidFill>
+          </a:ln>
         </p:spPr>
         <p:style>
           <a:lnRef idx="1">
@@ -3731,7 +3765,11 @@
           <a:prstGeom prst="line">
             <a:avLst/>
           </a:prstGeom>
-          <a:ln w="12700"/>
+          <a:ln w="12700">
+            <a:solidFill>
+              <a:schemeClr val="tx1"/>
+            </a:solidFill>
+          </a:ln>
         </p:spPr>
         <p:style>
           <a:lnRef idx="1">
@@ -3772,7 +3810,11 @@
           <a:prstGeom prst="line">
             <a:avLst/>
           </a:prstGeom>
-          <a:ln w="12700"/>
+          <a:ln w="12700">
+            <a:solidFill>
+              <a:schemeClr val="tx1"/>
+            </a:solidFill>
+          </a:ln>
         </p:spPr>
         <p:style>
           <a:lnRef idx="1">
@@ -3812,7 +3854,11 @@
           <a:prstGeom prst="line">
             <a:avLst/>
           </a:prstGeom>
-          <a:ln w="12700"/>
+          <a:ln w="12700">
+            <a:solidFill>
+              <a:schemeClr val="tx1"/>
+            </a:solidFill>
+          </a:ln>
         </p:spPr>
         <p:style>
           <a:lnRef idx="1">
@@ -3853,7 +3899,11 @@
           <a:prstGeom prst="line">
             <a:avLst/>
           </a:prstGeom>
-          <a:ln w="12700"/>
+          <a:ln w="12700">
+            <a:solidFill>
+              <a:schemeClr val="tx1"/>
+            </a:solidFill>
+          </a:ln>
         </p:spPr>
         <p:style>
           <a:lnRef idx="1">
@@ -3893,7 +3943,7 @@
           <a:noFill/>
           <a:ln w="9525" cap="flat" cmpd="sng" algn="ctr">
             <a:solidFill>
-              <a:schemeClr val="accent5"/>
+              <a:schemeClr val="tx1"/>
             </a:solidFill>
             <a:prstDash val="solid"/>
             <a:round/>
@@ -3921,7 +3971,13 @@
           <a:p>
             <a:pPr algn="ctr"/>
             <a:r>
-              <a:rPr lang="en-US" dirty="0"/>
+              <a:rPr lang="en-US" dirty="0">
+                <a:solidFill>
+                  <a:schemeClr val="tx1"/>
+                </a:solidFill>
+                <a:latin typeface="Times New Roman" panose="02020603050405020304" pitchFamily="18" charset="0"/>
+                <a:cs typeface="Times New Roman" panose="02020603050405020304" pitchFamily="18" charset="0"/>
+              </a:rPr>
               <a:t>Binding Pairs</a:t>
             </a:r>
           </a:p>
@@ -3950,7 +4006,7 @@
           <a:noFill/>
           <a:ln w="9525" cap="flat" cmpd="sng" algn="ctr">
             <a:solidFill>
-              <a:schemeClr val="accent6"/>
+              <a:schemeClr val="tx1"/>
             </a:solidFill>
             <a:prstDash val="solid"/>
             <a:round/>
@@ -3978,7 +4034,10 @@
           <a:p>
             <a:pPr algn="ctr"/>
             <a:r>
-              <a:rPr lang="en-US" dirty="0"/>
+              <a:rPr lang="en-US" dirty="0">
+                <a:latin typeface="Times New Roman" panose="02020603050405020304" pitchFamily="18" charset="0"/>
+                <a:cs typeface="Times New Roman" panose="02020603050405020304" pitchFamily="18" charset="0"/>
+              </a:rPr>
               <a:t>Maximize the similarities between proteins 1, 2, and 3</a:t>
             </a:r>
           </a:p>
@@ -4006,6 +4065,11 @@
           <a:prstGeom prst="line">
             <a:avLst/>
           </a:prstGeom>
+          <a:ln>
+            <a:solidFill>
+              <a:schemeClr val="tx1"/>
+            </a:solidFill>
+          </a:ln>
         </p:spPr>
         <p:style>
           <a:lnRef idx="1">
@@ -4045,6 +4109,11 @@
           <a:prstGeom prst="line">
             <a:avLst/>
           </a:prstGeom>
+          <a:ln>
+            <a:solidFill>
+              <a:schemeClr val="tx1"/>
+            </a:solidFill>
+          </a:ln>
         </p:spPr>
         <p:style>
           <a:lnRef idx="1">
@@ -4084,7 +4153,7 @@
           <a:noFill/>
           <a:ln w="9525" cap="flat" cmpd="sng" algn="ctr">
             <a:solidFill>
-              <a:schemeClr val="accent5"/>
+              <a:schemeClr val="tx1"/>
             </a:solidFill>
             <a:prstDash val="solid"/>
             <a:round/>
@@ -4112,7 +4181,13 @@
           <a:p>
             <a:pPr algn="ctr"/>
             <a:r>
-              <a:rPr lang="en-US" dirty="0"/>
+              <a:rPr lang="en-US" dirty="0">
+                <a:solidFill>
+                  <a:schemeClr val="accent6"/>
+                </a:solidFill>
+                <a:latin typeface="Times New Roman" panose="02020603050405020304" pitchFamily="18" charset="0"/>
+                <a:cs typeface="Times New Roman" panose="02020603050405020304" pitchFamily="18" charset="0"/>
+              </a:rPr>
               <a:t>Maximize the similarities between proteins 1, 2, and 3</a:t>
             </a:r>
           </a:p>
@@ -4141,6 +4216,11 @@
           <a:prstGeom prst="line">
             <a:avLst/>
           </a:prstGeom>
+          <a:ln>
+            <a:solidFill>
+              <a:schemeClr val="tx1"/>
+            </a:solidFill>
+          </a:ln>
         </p:spPr>
         <p:style>
           <a:lnRef idx="1">
@@ -4180,6 +4260,11 @@
           <a:prstGeom prst="line">
             <a:avLst/>
           </a:prstGeom>
+          <a:ln>
+            <a:solidFill>
+              <a:schemeClr val="tx1"/>
+            </a:solidFill>
+          </a:ln>
         </p:spPr>
         <p:style>
           <a:lnRef idx="1">
@@ -4219,7 +4304,7 @@
           <a:noFill/>
           <a:ln w="9525" cap="flat" cmpd="sng" algn="ctr">
             <a:solidFill>
-              <a:schemeClr val="accent2"/>
+              <a:schemeClr val="tx1"/>
             </a:solidFill>
             <a:prstDash val="solid"/>
             <a:round/>
@@ -4247,7 +4332,13 @@
           <a:p>
             <a:pPr algn="ctr"/>
             <a:r>
-              <a:rPr lang="en-US" dirty="0"/>
+              <a:rPr lang="en-US" dirty="0">
+                <a:solidFill>
+                  <a:schemeClr val="tx1"/>
+                </a:solidFill>
+                <a:latin typeface="Times New Roman" panose="02020603050405020304" pitchFamily="18" charset="0"/>
+                <a:cs typeface="Times New Roman" panose="02020603050405020304" pitchFamily="18" charset="0"/>
+              </a:rPr>
               <a:t>Maximize the dissimilarities between proteins (1, 2, 3) and (4,5)</a:t>
             </a:r>
           </a:p>

</xml_diff>

<commit_message>
Updating figures for SI
</commit_message>
<xml_diff>
--- a/Images/SI4.pptx
+++ b/Images/SI4.pptx
@@ -2,7 +2,7 @@
 <file path=ppt/presentation.xml><?xml version="1.0" encoding="utf-8"?>
 <p:presentation xmlns:a="http://schemas.openxmlformats.org/drawingml/2006/main" xmlns:r="http://schemas.openxmlformats.org/officeDocument/2006/relationships" xmlns:p="http://schemas.openxmlformats.org/presentationml/2006/main" saveSubsetFonts="1">
   <p:sldMasterIdLst>
-    <p:sldMasterId id="2147483696" r:id="rId1"/>
+    <p:sldMasterId id="2147483720" r:id="rId1"/>
   </p:sldMasterIdLst>
   <p:notesMasterIdLst>
     <p:notesMasterId r:id="rId3"/>
@@ -10,7 +10,7 @@
   <p:sldIdLst>
     <p:sldId id="258" r:id="rId2"/>
   </p:sldIdLst>
-  <p:sldSz cx="9144000" cy="5486400"/>
+  <p:sldSz cx="14630400" cy="5486400"/>
   <p:notesSz cx="6858000" cy="9144000"/>
   <p:defaultTextStyle>
     <a:defPPr>
@@ -197,7 +197,7 @@
           <a:p>
             <a:fld id="{0C45F89B-D0D3-4AC5-836F-869636F86470}" type="datetimeFigureOut">
               <a:rPr lang="en-US" smtClean="0"/>
-              <a:t>7/23/2021</a:t>
+              <a:t>9/25/2021</a:t>
             </a:fld>
             <a:endParaRPr lang="en-US"/>
           </a:p>
@@ -215,8 +215,8 @@
         </p:nvSpPr>
         <p:spPr>
           <a:xfrm>
-            <a:off x="857250" y="1143000"/>
-            <a:ext cx="5143500" cy="3086100"/>
+            <a:off x="-685800" y="1143000"/>
+            <a:ext cx="8229600" cy="3086100"/>
           </a:xfrm>
           <a:prstGeom prst="rect">
             <a:avLst/>
@@ -493,15 +493,15 @@
         </p:nvSpPr>
         <p:spPr>
           <a:xfrm>
-            <a:off x="1143000" y="897890"/>
-            <a:ext cx="6858000" cy="1910080"/>
+            <a:off x="1828800" y="897890"/>
+            <a:ext cx="10972800" cy="1910080"/>
           </a:xfrm>
         </p:spPr>
         <p:txBody>
           <a:bodyPr anchor="b"/>
           <a:lstStyle>
             <a:lvl1pPr algn="ctr">
-              <a:defRPr sz="4500"/>
+              <a:defRPr sz="4800"/>
             </a:lvl1pPr>
           </a:lstStyle>
           <a:p>
@@ -525,8 +525,8 @@
         </p:nvSpPr>
         <p:spPr>
           <a:xfrm>
-            <a:off x="1143000" y="2881630"/>
-            <a:ext cx="6858000" cy="1324610"/>
+            <a:off x="1828800" y="2881630"/>
+            <a:ext cx="10972800" cy="1324610"/>
           </a:xfrm>
         </p:spPr>
         <p:txBody>
@@ -534,39 +534,39 @@
           <a:lstStyle>
             <a:lvl1pPr marL="0" indent="0" algn="ctr">
               <a:buNone/>
-              <a:defRPr sz="1800"/>
+              <a:defRPr sz="1920"/>
             </a:lvl1pPr>
-            <a:lvl2pPr marL="342900" indent="0" algn="ctr">
-              <a:buNone/>
-              <a:defRPr sz="1500"/>
+            <a:lvl2pPr marL="365760" indent="0" algn="ctr">
+              <a:buNone/>
+              <a:defRPr sz="1600"/>
             </a:lvl2pPr>
-            <a:lvl3pPr marL="685800" indent="0" algn="ctr">
-              <a:buNone/>
-              <a:defRPr sz="1350"/>
+            <a:lvl3pPr marL="731520" indent="0" algn="ctr">
+              <a:buNone/>
+              <a:defRPr sz="1440"/>
             </a:lvl3pPr>
-            <a:lvl4pPr marL="1028700" indent="0" algn="ctr">
-              <a:buNone/>
-              <a:defRPr sz="1200"/>
+            <a:lvl4pPr marL="1097280" indent="0" algn="ctr">
+              <a:buNone/>
+              <a:defRPr sz="1280"/>
             </a:lvl4pPr>
-            <a:lvl5pPr marL="1371600" indent="0" algn="ctr">
-              <a:buNone/>
-              <a:defRPr sz="1200"/>
+            <a:lvl5pPr marL="1463040" indent="0" algn="ctr">
+              <a:buNone/>
+              <a:defRPr sz="1280"/>
             </a:lvl5pPr>
-            <a:lvl6pPr marL="1714500" indent="0" algn="ctr">
-              <a:buNone/>
-              <a:defRPr sz="1200"/>
+            <a:lvl6pPr marL="1828800" indent="0" algn="ctr">
+              <a:buNone/>
+              <a:defRPr sz="1280"/>
             </a:lvl6pPr>
-            <a:lvl7pPr marL="2057400" indent="0" algn="ctr">
-              <a:buNone/>
-              <a:defRPr sz="1200"/>
+            <a:lvl7pPr marL="2194560" indent="0" algn="ctr">
+              <a:buNone/>
+              <a:defRPr sz="1280"/>
             </a:lvl7pPr>
-            <a:lvl8pPr marL="2400300" indent="0" algn="ctr">
-              <a:buNone/>
-              <a:defRPr sz="1200"/>
+            <a:lvl8pPr marL="2560320" indent="0" algn="ctr">
+              <a:buNone/>
+              <a:defRPr sz="1280"/>
             </a:lvl8pPr>
-            <a:lvl9pPr marL="2743200" indent="0" algn="ctr">
-              <a:buNone/>
-              <a:defRPr sz="1200"/>
+            <a:lvl9pPr marL="2926080" indent="0" algn="ctr">
+              <a:buNone/>
+              <a:defRPr sz="1280"/>
             </a:lvl9pPr>
           </a:lstStyle>
           <a:p>
@@ -595,7 +595,7 @@
           <a:p>
             <a:fld id="{1516511B-B61A-47A9-97DC-35FBB5E54714}" type="datetimeFigureOut">
               <a:rPr lang="en-US" smtClean="0"/>
-              <a:t>7/23/2021</a:t>
+              <a:t>9/25/2021</a:t>
             </a:fld>
             <a:endParaRPr lang="en-US"/>
           </a:p>
@@ -646,7 +646,7 @@
     </p:spTree>
     <p:extLst>
       <p:ext uri="{BB962C8B-B14F-4D97-AF65-F5344CB8AC3E}">
-        <p14:creationId xmlns:p14="http://schemas.microsoft.com/office/powerpoint/2010/main" val="726723716"/>
+        <p14:creationId xmlns:p14="http://schemas.microsoft.com/office/powerpoint/2010/main" val="3589276722"/>
       </p:ext>
     </p:extLst>
   </p:cSld>
@@ -765,7 +765,7 @@
           <a:p>
             <a:fld id="{1516511B-B61A-47A9-97DC-35FBB5E54714}" type="datetimeFigureOut">
               <a:rPr lang="en-US" smtClean="0"/>
-              <a:t>7/23/2021</a:t>
+              <a:t>9/25/2021</a:t>
             </a:fld>
             <a:endParaRPr lang="en-US"/>
           </a:p>
@@ -816,7 +816,7 @@
     </p:spTree>
     <p:extLst>
       <p:ext uri="{BB962C8B-B14F-4D97-AF65-F5344CB8AC3E}">
-        <p14:creationId xmlns:p14="http://schemas.microsoft.com/office/powerpoint/2010/main" val="4028797150"/>
+        <p14:creationId xmlns:p14="http://schemas.microsoft.com/office/powerpoint/2010/main" val="349306363"/>
       </p:ext>
     </p:extLst>
   </p:cSld>
@@ -855,8 +855,8 @@
         </p:nvSpPr>
         <p:spPr>
           <a:xfrm>
-            <a:off x="6543675" y="292100"/>
-            <a:ext cx="1971675" cy="4649470"/>
+            <a:off x="10469880" y="292100"/>
+            <a:ext cx="3154680" cy="4649470"/>
           </a:xfrm>
         </p:spPr>
         <p:txBody>
@@ -883,8 +883,8 @@
         </p:nvSpPr>
         <p:spPr>
           <a:xfrm>
-            <a:off x="628650" y="292100"/>
-            <a:ext cx="5800725" cy="4649470"/>
+            <a:off x="1005840" y="292100"/>
+            <a:ext cx="9281160" cy="4649470"/>
           </a:xfrm>
         </p:spPr>
         <p:txBody>
@@ -945,7 +945,7 @@
           <a:p>
             <a:fld id="{1516511B-B61A-47A9-97DC-35FBB5E54714}" type="datetimeFigureOut">
               <a:rPr lang="en-US" smtClean="0"/>
-              <a:t>7/23/2021</a:t>
+              <a:t>9/25/2021</a:t>
             </a:fld>
             <a:endParaRPr lang="en-US"/>
           </a:p>
@@ -996,7 +996,7 @@
     </p:spTree>
     <p:extLst>
       <p:ext uri="{BB962C8B-B14F-4D97-AF65-F5344CB8AC3E}">
-        <p14:creationId xmlns:p14="http://schemas.microsoft.com/office/powerpoint/2010/main" val="1742436534"/>
+        <p14:creationId xmlns:p14="http://schemas.microsoft.com/office/powerpoint/2010/main" val="53200663"/>
       </p:ext>
     </p:extLst>
   </p:cSld>
@@ -1115,7 +1115,7 @@
           <a:p>
             <a:fld id="{1516511B-B61A-47A9-97DC-35FBB5E54714}" type="datetimeFigureOut">
               <a:rPr lang="en-US" smtClean="0"/>
-              <a:t>7/23/2021</a:t>
+              <a:t>9/25/2021</a:t>
             </a:fld>
             <a:endParaRPr lang="en-US"/>
           </a:p>
@@ -1166,7 +1166,7 @@
     </p:spTree>
     <p:extLst>
       <p:ext uri="{BB962C8B-B14F-4D97-AF65-F5344CB8AC3E}">
-        <p14:creationId xmlns:p14="http://schemas.microsoft.com/office/powerpoint/2010/main" val="3863467673"/>
+        <p14:creationId xmlns:p14="http://schemas.microsoft.com/office/powerpoint/2010/main" val="2398735839"/>
       </p:ext>
     </p:extLst>
   </p:cSld>
@@ -1205,15 +1205,15 @@
         </p:nvSpPr>
         <p:spPr>
           <a:xfrm>
-            <a:off x="623888" y="1367791"/>
-            <a:ext cx="7886700" cy="2282190"/>
+            <a:off x="998220" y="1367791"/>
+            <a:ext cx="12618720" cy="2282190"/>
           </a:xfrm>
         </p:spPr>
         <p:txBody>
           <a:bodyPr anchor="b"/>
           <a:lstStyle>
             <a:lvl1pPr>
-              <a:defRPr sz="4500"/>
+              <a:defRPr sz="4800"/>
             </a:lvl1pPr>
           </a:lstStyle>
           <a:p>
@@ -1237,8 +1237,8 @@
         </p:nvSpPr>
         <p:spPr>
           <a:xfrm>
-            <a:off x="623888" y="3671571"/>
-            <a:ext cx="7886700" cy="1200150"/>
+            <a:off x="998220" y="3671571"/>
+            <a:ext cx="12618720" cy="1200150"/>
           </a:xfrm>
         </p:spPr>
         <p:txBody>
@@ -1246,7 +1246,7 @@
           <a:lstStyle>
             <a:lvl1pPr marL="0" indent="0">
               <a:buNone/>
-              <a:defRPr sz="1800">
+              <a:defRPr sz="1920">
                 <a:solidFill>
                   <a:schemeClr val="tx1">
                     <a:tint val="75000"/>
@@ -1254,9 +1254,9 @@
                 </a:solidFill>
               </a:defRPr>
             </a:lvl1pPr>
-            <a:lvl2pPr marL="342900" indent="0">
-              <a:buNone/>
-              <a:defRPr sz="1500">
+            <a:lvl2pPr marL="365760" indent="0">
+              <a:buNone/>
+              <a:defRPr sz="1600">
                 <a:solidFill>
                   <a:schemeClr val="tx1">
                     <a:tint val="75000"/>
@@ -1264,9 +1264,9 @@
                 </a:solidFill>
               </a:defRPr>
             </a:lvl2pPr>
-            <a:lvl3pPr marL="685800" indent="0">
-              <a:buNone/>
-              <a:defRPr sz="1350">
+            <a:lvl3pPr marL="731520" indent="0">
+              <a:buNone/>
+              <a:defRPr sz="1440">
                 <a:solidFill>
                   <a:schemeClr val="tx1">
                     <a:tint val="75000"/>
@@ -1274,9 +1274,9 @@
                 </a:solidFill>
               </a:defRPr>
             </a:lvl3pPr>
-            <a:lvl4pPr marL="1028700" indent="0">
-              <a:buNone/>
-              <a:defRPr sz="1200">
+            <a:lvl4pPr marL="1097280" indent="0">
+              <a:buNone/>
+              <a:defRPr sz="1280">
                 <a:solidFill>
                   <a:schemeClr val="tx1">
                     <a:tint val="75000"/>
@@ -1284,9 +1284,9 @@
                 </a:solidFill>
               </a:defRPr>
             </a:lvl4pPr>
-            <a:lvl5pPr marL="1371600" indent="0">
-              <a:buNone/>
-              <a:defRPr sz="1200">
+            <a:lvl5pPr marL="1463040" indent="0">
+              <a:buNone/>
+              <a:defRPr sz="1280">
                 <a:solidFill>
                   <a:schemeClr val="tx1">
                     <a:tint val="75000"/>
@@ -1294,9 +1294,9 @@
                 </a:solidFill>
               </a:defRPr>
             </a:lvl5pPr>
-            <a:lvl6pPr marL="1714500" indent="0">
-              <a:buNone/>
-              <a:defRPr sz="1200">
+            <a:lvl6pPr marL="1828800" indent="0">
+              <a:buNone/>
+              <a:defRPr sz="1280">
                 <a:solidFill>
                   <a:schemeClr val="tx1">
                     <a:tint val="75000"/>
@@ -1304,9 +1304,9 @@
                 </a:solidFill>
               </a:defRPr>
             </a:lvl6pPr>
-            <a:lvl7pPr marL="2057400" indent="0">
-              <a:buNone/>
-              <a:defRPr sz="1200">
+            <a:lvl7pPr marL="2194560" indent="0">
+              <a:buNone/>
+              <a:defRPr sz="1280">
                 <a:solidFill>
                   <a:schemeClr val="tx1">
                     <a:tint val="75000"/>
@@ -1314,9 +1314,9 @@
                 </a:solidFill>
               </a:defRPr>
             </a:lvl7pPr>
-            <a:lvl8pPr marL="2400300" indent="0">
-              <a:buNone/>
-              <a:defRPr sz="1200">
+            <a:lvl8pPr marL="2560320" indent="0">
+              <a:buNone/>
+              <a:defRPr sz="1280">
                 <a:solidFill>
                   <a:schemeClr val="tx1">
                     <a:tint val="75000"/>
@@ -1324,9 +1324,9 @@
                 </a:solidFill>
               </a:defRPr>
             </a:lvl8pPr>
-            <a:lvl9pPr marL="2743200" indent="0">
-              <a:buNone/>
-              <a:defRPr sz="1200">
+            <a:lvl9pPr marL="2926080" indent="0">
+              <a:buNone/>
+              <a:defRPr sz="1280">
                 <a:solidFill>
                   <a:schemeClr val="tx1">
                     <a:tint val="75000"/>
@@ -1361,7 +1361,7 @@
           <a:p>
             <a:fld id="{1516511B-B61A-47A9-97DC-35FBB5E54714}" type="datetimeFigureOut">
               <a:rPr lang="en-US" smtClean="0"/>
-              <a:t>7/23/2021</a:t>
+              <a:t>9/25/2021</a:t>
             </a:fld>
             <a:endParaRPr lang="en-US"/>
           </a:p>
@@ -1412,7 +1412,7 @@
     </p:spTree>
     <p:extLst>
       <p:ext uri="{BB962C8B-B14F-4D97-AF65-F5344CB8AC3E}">
-        <p14:creationId xmlns:p14="http://schemas.microsoft.com/office/powerpoint/2010/main" val="2128716667"/>
+        <p14:creationId xmlns:p14="http://schemas.microsoft.com/office/powerpoint/2010/main" val="1768878523"/>
       </p:ext>
     </p:extLst>
   </p:cSld>
@@ -1474,8 +1474,8 @@
         </p:nvSpPr>
         <p:spPr>
           <a:xfrm>
-            <a:off x="628650" y="1460500"/>
-            <a:ext cx="3886200" cy="3481070"/>
+            <a:off x="1005840" y="1460500"/>
+            <a:ext cx="6217920" cy="3481070"/>
           </a:xfrm>
         </p:spPr>
         <p:txBody>
@@ -1531,8 +1531,8 @@
         </p:nvSpPr>
         <p:spPr>
           <a:xfrm>
-            <a:off x="4629150" y="1460500"/>
-            <a:ext cx="3886200" cy="3481070"/>
+            <a:off x="7406640" y="1460500"/>
+            <a:ext cx="6217920" cy="3481070"/>
           </a:xfrm>
         </p:spPr>
         <p:txBody>
@@ -1593,7 +1593,7 @@
           <a:p>
             <a:fld id="{1516511B-B61A-47A9-97DC-35FBB5E54714}" type="datetimeFigureOut">
               <a:rPr lang="en-US" smtClean="0"/>
-              <a:t>7/23/2021</a:t>
+              <a:t>9/25/2021</a:t>
             </a:fld>
             <a:endParaRPr lang="en-US"/>
           </a:p>
@@ -1644,7 +1644,7 @@
     </p:spTree>
     <p:extLst>
       <p:ext uri="{BB962C8B-B14F-4D97-AF65-F5344CB8AC3E}">
-        <p14:creationId xmlns:p14="http://schemas.microsoft.com/office/powerpoint/2010/main" val="558860222"/>
+        <p14:creationId xmlns:p14="http://schemas.microsoft.com/office/powerpoint/2010/main" val="186253193"/>
       </p:ext>
     </p:extLst>
   </p:cSld>
@@ -1683,8 +1683,8 @@
         </p:nvSpPr>
         <p:spPr>
           <a:xfrm>
-            <a:off x="629841" y="292101"/>
-            <a:ext cx="7886700" cy="1060450"/>
+            <a:off x="1007746" y="292101"/>
+            <a:ext cx="12618720" cy="1060450"/>
           </a:xfrm>
         </p:spPr>
         <p:txBody>
@@ -1711,8 +1711,8 @@
         </p:nvSpPr>
         <p:spPr>
           <a:xfrm>
-            <a:off x="629842" y="1344930"/>
-            <a:ext cx="3868340" cy="659130"/>
+            <a:off x="1007746" y="1344930"/>
+            <a:ext cx="6189344" cy="659130"/>
           </a:xfrm>
         </p:spPr>
         <p:txBody>
@@ -1720,39 +1720,39 @@
           <a:lstStyle>
             <a:lvl1pPr marL="0" indent="0">
               <a:buNone/>
-              <a:defRPr sz="1800" b="1"/>
+              <a:defRPr sz="1920" b="1"/>
             </a:lvl1pPr>
-            <a:lvl2pPr marL="342900" indent="0">
-              <a:buNone/>
-              <a:defRPr sz="1500" b="1"/>
+            <a:lvl2pPr marL="365760" indent="0">
+              <a:buNone/>
+              <a:defRPr sz="1600" b="1"/>
             </a:lvl2pPr>
-            <a:lvl3pPr marL="685800" indent="0">
-              <a:buNone/>
-              <a:defRPr sz="1350" b="1"/>
+            <a:lvl3pPr marL="731520" indent="0">
+              <a:buNone/>
+              <a:defRPr sz="1440" b="1"/>
             </a:lvl3pPr>
-            <a:lvl4pPr marL="1028700" indent="0">
-              <a:buNone/>
-              <a:defRPr sz="1200" b="1"/>
+            <a:lvl4pPr marL="1097280" indent="0">
+              <a:buNone/>
+              <a:defRPr sz="1280" b="1"/>
             </a:lvl4pPr>
-            <a:lvl5pPr marL="1371600" indent="0">
-              <a:buNone/>
-              <a:defRPr sz="1200" b="1"/>
+            <a:lvl5pPr marL="1463040" indent="0">
+              <a:buNone/>
+              <a:defRPr sz="1280" b="1"/>
             </a:lvl5pPr>
-            <a:lvl6pPr marL="1714500" indent="0">
-              <a:buNone/>
-              <a:defRPr sz="1200" b="1"/>
+            <a:lvl6pPr marL="1828800" indent="0">
+              <a:buNone/>
+              <a:defRPr sz="1280" b="1"/>
             </a:lvl6pPr>
-            <a:lvl7pPr marL="2057400" indent="0">
-              <a:buNone/>
-              <a:defRPr sz="1200" b="1"/>
+            <a:lvl7pPr marL="2194560" indent="0">
+              <a:buNone/>
+              <a:defRPr sz="1280" b="1"/>
             </a:lvl7pPr>
-            <a:lvl8pPr marL="2400300" indent="0">
-              <a:buNone/>
-              <a:defRPr sz="1200" b="1"/>
+            <a:lvl8pPr marL="2560320" indent="0">
+              <a:buNone/>
+              <a:defRPr sz="1280" b="1"/>
             </a:lvl8pPr>
-            <a:lvl9pPr marL="2743200" indent="0">
-              <a:buNone/>
-              <a:defRPr sz="1200" b="1"/>
+            <a:lvl9pPr marL="2926080" indent="0">
+              <a:buNone/>
+              <a:defRPr sz="1280" b="1"/>
             </a:lvl9pPr>
           </a:lstStyle>
           <a:p>
@@ -1776,8 +1776,8 @@
         </p:nvSpPr>
         <p:spPr>
           <a:xfrm>
-            <a:off x="629842" y="2004060"/>
-            <a:ext cx="3868340" cy="2947670"/>
+            <a:off x="1007746" y="2004060"/>
+            <a:ext cx="6189344" cy="2947670"/>
           </a:xfrm>
         </p:spPr>
         <p:txBody>
@@ -1833,8 +1833,8 @@
         </p:nvSpPr>
         <p:spPr>
           <a:xfrm>
-            <a:off x="4629150" y="1344930"/>
-            <a:ext cx="3887391" cy="659130"/>
+            <a:off x="7406640" y="1344930"/>
+            <a:ext cx="6219826" cy="659130"/>
           </a:xfrm>
         </p:spPr>
         <p:txBody>
@@ -1842,39 +1842,39 @@
           <a:lstStyle>
             <a:lvl1pPr marL="0" indent="0">
               <a:buNone/>
-              <a:defRPr sz="1800" b="1"/>
+              <a:defRPr sz="1920" b="1"/>
             </a:lvl1pPr>
-            <a:lvl2pPr marL="342900" indent="0">
-              <a:buNone/>
-              <a:defRPr sz="1500" b="1"/>
+            <a:lvl2pPr marL="365760" indent="0">
+              <a:buNone/>
+              <a:defRPr sz="1600" b="1"/>
             </a:lvl2pPr>
-            <a:lvl3pPr marL="685800" indent="0">
-              <a:buNone/>
-              <a:defRPr sz="1350" b="1"/>
+            <a:lvl3pPr marL="731520" indent="0">
+              <a:buNone/>
+              <a:defRPr sz="1440" b="1"/>
             </a:lvl3pPr>
-            <a:lvl4pPr marL="1028700" indent="0">
-              <a:buNone/>
-              <a:defRPr sz="1200" b="1"/>
+            <a:lvl4pPr marL="1097280" indent="0">
+              <a:buNone/>
+              <a:defRPr sz="1280" b="1"/>
             </a:lvl4pPr>
-            <a:lvl5pPr marL="1371600" indent="0">
-              <a:buNone/>
-              <a:defRPr sz="1200" b="1"/>
+            <a:lvl5pPr marL="1463040" indent="0">
+              <a:buNone/>
+              <a:defRPr sz="1280" b="1"/>
             </a:lvl5pPr>
-            <a:lvl6pPr marL="1714500" indent="0">
-              <a:buNone/>
-              <a:defRPr sz="1200" b="1"/>
+            <a:lvl6pPr marL="1828800" indent="0">
+              <a:buNone/>
+              <a:defRPr sz="1280" b="1"/>
             </a:lvl6pPr>
-            <a:lvl7pPr marL="2057400" indent="0">
-              <a:buNone/>
-              <a:defRPr sz="1200" b="1"/>
+            <a:lvl7pPr marL="2194560" indent="0">
+              <a:buNone/>
+              <a:defRPr sz="1280" b="1"/>
             </a:lvl7pPr>
-            <a:lvl8pPr marL="2400300" indent="0">
-              <a:buNone/>
-              <a:defRPr sz="1200" b="1"/>
+            <a:lvl8pPr marL="2560320" indent="0">
+              <a:buNone/>
+              <a:defRPr sz="1280" b="1"/>
             </a:lvl8pPr>
-            <a:lvl9pPr marL="2743200" indent="0">
-              <a:buNone/>
-              <a:defRPr sz="1200" b="1"/>
+            <a:lvl9pPr marL="2926080" indent="0">
+              <a:buNone/>
+              <a:defRPr sz="1280" b="1"/>
             </a:lvl9pPr>
           </a:lstStyle>
           <a:p>
@@ -1898,8 +1898,8 @@
         </p:nvSpPr>
         <p:spPr>
           <a:xfrm>
-            <a:off x="4629150" y="2004060"/>
-            <a:ext cx="3887391" cy="2947670"/>
+            <a:off x="7406640" y="2004060"/>
+            <a:ext cx="6219826" cy="2947670"/>
           </a:xfrm>
         </p:spPr>
         <p:txBody>
@@ -1960,7 +1960,7 @@
           <a:p>
             <a:fld id="{1516511B-B61A-47A9-97DC-35FBB5E54714}" type="datetimeFigureOut">
               <a:rPr lang="en-US" smtClean="0"/>
-              <a:t>7/23/2021</a:t>
+              <a:t>9/25/2021</a:t>
             </a:fld>
             <a:endParaRPr lang="en-US"/>
           </a:p>
@@ -2011,7 +2011,7 @@
     </p:spTree>
     <p:extLst>
       <p:ext uri="{BB962C8B-B14F-4D97-AF65-F5344CB8AC3E}">
-        <p14:creationId xmlns:p14="http://schemas.microsoft.com/office/powerpoint/2010/main" val="3958663072"/>
+        <p14:creationId xmlns:p14="http://schemas.microsoft.com/office/powerpoint/2010/main" val="1222560586"/>
       </p:ext>
     </p:extLst>
   </p:cSld>
@@ -2078,7 +2078,7 @@
           <a:p>
             <a:fld id="{1516511B-B61A-47A9-97DC-35FBB5E54714}" type="datetimeFigureOut">
               <a:rPr lang="en-US" smtClean="0"/>
-              <a:t>7/23/2021</a:t>
+              <a:t>9/25/2021</a:t>
             </a:fld>
             <a:endParaRPr lang="en-US"/>
           </a:p>
@@ -2129,7 +2129,7 @@
     </p:spTree>
     <p:extLst>
       <p:ext uri="{BB962C8B-B14F-4D97-AF65-F5344CB8AC3E}">
-        <p14:creationId xmlns:p14="http://schemas.microsoft.com/office/powerpoint/2010/main" val="251898075"/>
+        <p14:creationId xmlns:p14="http://schemas.microsoft.com/office/powerpoint/2010/main" val="2253754059"/>
       </p:ext>
     </p:extLst>
   </p:cSld>
@@ -2173,7 +2173,7 @@
           <a:p>
             <a:fld id="{1516511B-B61A-47A9-97DC-35FBB5E54714}" type="datetimeFigureOut">
               <a:rPr lang="en-US" smtClean="0"/>
-              <a:t>7/23/2021</a:t>
+              <a:t>9/25/2021</a:t>
             </a:fld>
             <a:endParaRPr lang="en-US"/>
           </a:p>
@@ -2224,7 +2224,7 @@
     </p:spTree>
     <p:extLst>
       <p:ext uri="{BB962C8B-B14F-4D97-AF65-F5344CB8AC3E}">
-        <p14:creationId xmlns:p14="http://schemas.microsoft.com/office/powerpoint/2010/main" val="3884504953"/>
+        <p14:creationId xmlns:p14="http://schemas.microsoft.com/office/powerpoint/2010/main" val="1104040556"/>
       </p:ext>
     </p:extLst>
   </p:cSld>
@@ -2263,15 +2263,15 @@
         </p:nvSpPr>
         <p:spPr>
           <a:xfrm>
-            <a:off x="629841" y="365760"/>
-            <a:ext cx="2949178" cy="1280160"/>
+            <a:off x="1007746" y="365760"/>
+            <a:ext cx="4718684" cy="1280160"/>
           </a:xfrm>
         </p:spPr>
         <p:txBody>
           <a:bodyPr anchor="b"/>
           <a:lstStyle>
             <a:lvl1pPr>
-              <a:defRPr sz="2400"/>
+              <a:defRPr sz="2560"/>
             </a:lvl1pPr>
           </a:lstStyle>
           <a:p>
@@ -2295,39 +2295,39 @@
         </p:nvSpPr>
         <p:spPr>
           <a:xfrm>
-            <a:off x="3887391" y="789940"/>
-            <a:ext cx="4629150" cy="3898900"/>
+            <a:off x="6219826" y="789940"/>
+            <a:ext cx="7406640" cy="3898900"/>
           </a:xfrm>
         </p:spPr>
         <p:txBody>
           <a:bodyPr/>
           <a:lstStyle>
             <a:lvl1pPr>
-              <a:defRPr sz="2400"/>
+              <a:defRPr sz="2560"/>
             </a:lvl1pPr>
             <a:lvl2pPr>
-              <a:defRPr sz="2100"/>
+              <a:defRPr sz="2240"/>
             </a:lvl2pPr>
             <a:lvl3pPr>
-              <a:defRPr sz="1800"/>
+              <a:defRPr sz="1920"/>
             </a:lvl3pPr>
             <a:lvl4pPr>
-              <a:defRPr sz="1500"/>
+              <a:defRPr sz="1600"/>
             </a:lvl4pPr>
             <a:lvl5pPr>
-              <a:defRPr sz="1500"/>
+              <a:defRPr sz="1600"/>
             </a:lvl5pPr>
             <a:lvl6pPr>
-              <a:defRPr sz="1500"/>
+              <a:defRPr sz="1600"/>
             </a:lvl6pPr>
             <a:lvl7pPr>
-              <a:defRPr sz="1500"/>
+              <a:defRPr sz="1600"/>
             </a:lvl7pPr>
             <a:lvl8pPr>
-              <a:defRPr sz="1500"/>
+              <a:defRPr sz="1600"/>
             </a:lvl8pPr>
             <a:lvl9pPr>
-              <a:defRPr sz="1500"/>
+              <a:defRPr sz="1600"/>
             </a:lvl9pPr>
           </a:lstStyle>
           <a:p>
@@ -2380,8 +2380,8 @@
         </p:nvSpPr>
         <p:spPr>
           <a:xfrm>
-            <a:off x="629841" y="1645920"/>
-            <a:ext cx="2949178" cy="3049270"/>
+            <a:off x="1007746" y="1645920"/>
+            <a:ext cx="4718684" cy="3049270"/>
           </a:xfrm>
         </p:spPr>
         <p:txBody>
@@ -2389,39 +2389,39 @@
           <a:lstStyle>
             <a:lvl1pPr marL="0" indent="0">
               <a:buNone/>
-              <a:defRPr sz="1200"/>
+              <a:defRPr sz="1280"/>
             </a:lvl1pPr>
-            <a:lvl2pPr marL="342900" indent="0">
-              <a:buNone/>
-              <a:defRPr sz="1050"/>
+            <a:lvl2pPr marL="365760" indent="0">
+              <a:buNone/>
+              <a:defRPr sz="1120"/>
             </a:lvl2pPr>
-            <a:lvl3pPr marL="685800" indent="0">
-              <a:buNone/>
-              <a:defRPr sz="900"/>
+            <a:lvl3pPr marL="731520" indent="0">
+              <a:buNone/>
+              <a:defRPr sz="960"/>
             </a:lvl3pPr>
-            <a:lvl4pPr marL="1028700" indent="0">
-              <a:buNone/>
-              <a:defRPr sz="750"/>
+            <a:lvl4pPr marL="1097280" indent="0">
+              <a:buNone/>
+              <a:defRPr sz="800"/>
             </a:lvl4pPr>
-            <a:lvl5pPr marL="1371600" indent="0">
-              <a:buNone/>
-              <a:defRPr sz="750"/>
+            <a:lvl5pPr marL="1463040" indent="0">
+              <a:buNone/>
+              <a:defRPr sz="800"/>
             </a:lvl5pPr>
-            <a:lvl6pPr marL="1714500" indent="0">
-              <a:buNone/>
-              <a:defRPr sz="750"/>
+            <a:lvl6pPr marL="1828800" indent="0">
+              <a:buNone/>
+              <a:defRPr sz="800"/>
             </a:lvl6pPr>
-            <a:lvl7pPr marL="2057400" indent="0">
-              <a:buNone/>
-              <a:defRPr sz="750"/>
+            <a:lvl7pPr marL="2194560" indent="0">
+              <a:buNone/>
+              <a:defRPr sz="800"/>
             </a:lvl7pPr>
-            <a:lvl8pPr marL="2400300" indent="0">
-              <a:buNone/>
-              <a:defRPr sz="750"/>
+            <a:lvl8pPr marL="2560320" indent="0">
+              <a:buNone/>
+              <a:defRPr sz="800"/>
             </a:lvl8pPr>
-            <a:lvl9pPr marL="2743200" indent="0">
-              <a:buNone/>
-              <a:defRPr sz="750"/>
+            <a:lvl9pPr marL="2926080" indent="0">
+              <a:buNone/>
+              <a:defRPr sz="800"/>
             </a:lvl9pPr>
           </a:lstStyle>
           <a:p>
@@ -2450,7 +2450,7 @@
           <a:p>
             <a:fld id="{1516511B-B61A-47A9-97DC-35FBB5E54714}" type="datetimeFigureOut">
               <a:rPr lang="en-US" smtClean="0"/>
-              <a:t>7/23/2021</a:t>
+              <a:t>9/25/2021</a:t>
             </a:fld>
             <a:endParaRPr lang="en-US"/>
           </a:p>
@@ -2501,7 +2501,7 @@
     </p:spTree>
     <p:extLst>
       <p:ext uri="{BB962C8B-B14F-4D97-AF65-F5344CB8AC3E}">
-        <p14:creationId xmlns:p14="http://schemas.microsoft.com/office/powerpoint/2010/main" val="3758194625"/>
+        <p14:creationId xmlns:p14="http://schemas.microsoft.com/office/powerpoint/2010/main" val="2934915688"/>
       </p:ext>
     </p:extLst>
   </p:cSld>
@@ -2540,15 +2540,15 @@
         </p:nvSpPr>
         <p:spPr>
           <a:xfrm>
-            <a:off x="629841" y="365760"/>
-            <a:ext cx="2949178" cy="1280160"/>
+            <a:off x="1007746" y="365760"/>
+            <a:ext cx="4718684" cy="1280160"/>
           </a:xfrm>
         </p:spPr>
         <p:txBody>
           <a:bodyPr anchor="b"/>
           <a:lstStyle>
             <a:lvl1pPr>
-              <a:defRPr sz="2400"/>
+              <a:defRPr sz="2560"/>
             </a:lvl1pPr>
           </a:lstStyle>
           <a:p>
@@ -2572,8 +2572,8 @@
         </p:nvSpPr>
         <p:spPr>
           <a:xfrm>
-            <a:off x="3887391" y="789940"/>
-            <a:ext cx="4629150" cy="3898900"/>
+            <a:off x="6219826" y="789940"/>
+            <a:ext cx="7406640" cy="3898900"/>
           </a:xfrm>
         </p:spPr>
         <p:txBody>
@@ -2581,39 +2581,39 @@
           <a:lstStyle>
             <a:lvl1pPr marL="0" indent="0">
               <a:buNone/>
-              <a:defRPr sz="2400"/>
+              <a:defRPr sz="2560"/>
             </a:lvl1pPr>
-            <a:lvl2pPr marL="342900" indent="0">
-              <a:buNone/>
-              <a:defRPr sz="2100"/>
+            <a:lvl2pPr marL="365760" indent="0">
+              <a:buNone/>
+              <a:defRPr sz="2240"/>
             </a:lvl2pPr>
-            <a:lvl3pPr marL="685800" indent="0">
-              <a:buNone/>
-              <a:defRPr sz="1800"/>
+            <a:lvl3pPr marL="731520" indent="0">
+              <a:buNone/>
+              <a:defRPr sz="1920"/>
             </a:lvl3pPr>
-            <a:lvl4pPr marL="1028700" indent="0">
-              <a:buNone/>
-              <a:defRPr sz="1500"/>
+            <a:lvl4pPr marL="1097280" indent="0">
+              <a:buNone/>
+              <a:defRPr sz="1600"/>
             </a:lvl4pPr>
-            <a:lvl5pPr marL="1371600" indent="0">
-              <a:buNone/>
-              <a:defRPr sz="1500"/>
+            <a:lvl5pPr marL="1463040" indent="0">
+              <a:buNone/>
+              <a:defRPr sz="1600"/>
             </a:lvl5pPr>
-            <a:lvl6pPr marL="1714500" indent="0">
-              <a:buNone/>
-              <a:defRPr sz="1500"/>
+            <a:lvl6pPr marL="1828800" indent="0">
+              <a:buNone/>
+              <a:defRPr sz="1600"/>
             </a:lvl6pPr>
-            <a:lvl7pPr marL="2057400" indent="0">
-              <a:buNone/>
-              <a:defRPr sz="1500"/>
+            <a:lvl7pPr marL="2194560" indent="0">
+              <a:buNone/>
+              <a:defRPr sz="1600"/>
             </a:lvl7pPr>
-            <a:lvl8pPr marL="2400300" indent="0">
-              <a:buNone/>
-              <a:defRPr sz="1500"/>
+            <a:lvl8pPr marL="2560320" indent="0">
+              <a:buNone/>
+              <a:defRPr sz="1600"/>
             </a:lvl8pPr>
-            <a:lvl9pPr marL="2743200" indent="0">
-              <a:buNone/>
-              <a:defRPr sz="1500"/>
+            <a:lvl9pPr marL="2926080" indent="0">
+              <a:buNone/>
+              <a:defRPr sz="1600"/>
             </a:lvl9pPr>
           </a:lstStyle>
           <a:p>
@@ -2637,8 +2637,8 @@
         </p:nvSpPr>
         <p:spPr>
           <a:xfrm>
-            <a:off x="629841" y="1645920"/>
-            <a:ext cx="2949178" cy="3049270"/>
+            <a:off x="1007746" y="1645920"/>
+            <a:ext cx="4718684" cy="3049270"/>
           </a:xfrm>
         </p:spPr>
         <p:txBody>
@@ -2646,39 +2646,39 @@
           <a:lstStyle>
             <a:lvl1pPr marL="0" indent="0">
               <a:buNone/>
-              <a:defRPr sz="1200"/>
+              <a:defRPr sz="1280"/>
             </a:lvl1pPr>
-            <a:lvl2pPr marL="342900" indent="0">
-              <a:buNone/>
-              <a:defRPr sz="1050"/>
+            <a:lvl2pPr marL="365760" indent="0">
+              <a:buNone/>
+              <a:defRPr sz="1120"/>
             </a:lvl2pPr>
-            <a:lvl3pPr marL="685800" indent="0">
-              <a:buNone/>
-              <a:defRPr sz="900"/>
+            <a:lvl3pPr marL="731520" indent="0">
+              <a:buNone/>
+              <a:defRPr sz="960"/>
             </a:lvl3pPr>
-            <a:lvl4pPr marL="1028700" indent="0">
-              <a:buNone/>
-              <a:defRPr sz="750"/>
+            <a:lvl4pPr marL="1097280" indent="0">
+              <a:buNone/>
+              <a:defRPr sz="800"/>
             </a:lvl4pPr>
-            <a:lvl5pPr marL="1371600" indent="0">
-              <a:buNone/>
-              <a:defRPr sz="750"/>
+            <a:lvl5pPr marL="1463040" indent="0">
+              <a:buNone/>
+              <a:defRPr sz="800"/>
             </a:lvl5pPr>
-            <a:lvl6pPr marL="1714500" indent="0">
-              <a:buNone/>
-              <a:defRPr sz="750"/>
+            <a:lvl6pPr marL="1828800" indent="0">
+              <a:buNone/>
+              <a:defRPr sz="800"/>
             </a:lvl6pPr>
-            <a:lvl7pPr marL="2057400" indent="0">
-              <a:buNone/>
-              <a:defRPr sz="750"/>
+            <a:lvl7pPr marL="2194560" indent="0">
+              <a:buNone/>
+              <a:defRPr sz="800"/>
             </a:lvl7pPr>
-            <a:lvl8pPr marL="2400300" indent="0">
-              <a:buNone/>
-              <a:defRPr sz="750"/>
+            <a:lvl8pPr marL="2560320" indent="0">
+              <a:buNone/>
+              <a:defRPr sz="800"/>
             </a:lvl8pPr>
-            <a:lvl9pPr marL="2743200" indent="0">
-              <a:buNone/>
-              <a:defRPr sz="750"/>
+            <a:lvl9pPr marL="2926080" indent="0">
+              <a:buNone/>
+              <a:defRPr sz="800"/>
             </a:lvl9pPr>
           </a:lstStyle>
           <a:p>
@@ -2707,7 +2707,7 @@
           <a:p>
             <a:fld id="{1516511B-B61A-47A9-97DC-35FBB5E54714}" type="datetimeFigureOut">
               <a:rPr lang="en-US" smtClean="0"/>
-              <a:t>7/23/2021</a:t>
+              <a:t>9/25/2021</a:t>
             </a:fld>
             <a:endParaRPr lang="en-US"/>
           </a:p>
@@ -2758,7 +2758,7 @@
     </p:spTree>
     <p:extLst>
       <p:ext uri="{BB962C8B-B14F-4D97-AF65-F5344CB8AC3E}">
-        <p14:creationId xmlns:p14="http://schemas.microsoft.com/office/powerpoint/2010/main" val="993902488"/>
+        <p14:creationId xmlns:p14="http://schemas.microsoft.com/office/powerpoint/2010/main" val="2362465958"/>
       </p:ext>
     </p:extLst>
   </p:cSld>
@@ -2802,8 +2802,8 @@
         </p:nvSpPr>
         <p:spPr>
           <a:xfrm>
-            <a:off x="628650" y="292101"/>
-            <a:ext cx="7886700" cy="1060450"/>
+            <a:off x="1005840" y="292101"/>
+            <a:ext cx="12618720" cy="1060450"/>
           </a:xfrm>
           <a:prstGeom prst="rect">
             <a:avLst/>
@@ -2835,8 +2835,8 @@
         </p:nvSpPr>
         <p:spPr>
           <a:xfrm>
-            <a:off x="628650" y="1460500"/>
-            <a:ext cx="7886700" cy="3481070"/>
+            <a:off x="1005840" y="1460500"/>
+            <a:ext cx="12618720" cy="3481070"/>
           </a:xfrm>
           <a:prstGeom prst="rect">
             <a:avLst/>
@@ -2897,8 +2897,8 @@
         </p:nvSpPr>
         <p:spPr>
           <a:xfrm>
-            <a:off x="628650" y="5085080"/>
-            <a:ext cx="2057400" cy="292100"/>
+            <a:off x="1005840" y="5085080"/>
+            <a:ext cx="3291840" cy="292100"/>
           </a:xfrm>
           <a:prstGeom prst="rect">
             <a:avLst/>
@@ -2908,7 +2908,7 @@
           <a:bodyPr vert="horz" lIns="91440" tIns="45720" rIns="91440" bIns="45720" rtlCol="0" anchor="ctr"/>
           <a:lstStyle>
             <a:lvl1pPr algn="l">
-              <a:defRPr sz="900">
+              <a:defRPr sz="960">
                 <a:solidFill>
                   <a:schemeClr val="tx1">
                     <a:tint val="75000"/>
@@ -2920,7 +2920,7 @@
           <a:p>
             <a:fld id="{1516511B-B61A-47A9-97DC-35FBB5E54714}" type="datetimeFigureOut">
               <a:rPr lang="en-US" smtClean="0"/>
-              <a:t>7/23/2021</a:t>
+              <a:t>9/25/2021</a:t>
             </a:fld>
             <a:endParaRPr lang="en-US"/>
           </a:p>
@@ -2938,8 +2938,8 @@
         </p:nvSpPr>
         <p:spPr>
           <a:xfrm>
-            <a:off x="3028950" y="5085080"/>
-            <a:ext cx="3086100" cy="292100"/>
+            <a:off x="4846320" y="5085080"/>
+            <a:ext cx="4937760" cy="292100"/>
           </a:xfrm>
           <a:prstGeom prst="rect">
             <a:avLst/>
@@ -2949,7 +2949,7 @@
           <a:bodyPr vert="horz" lIns="91440" tIns="45720" rIns="91440" bIns="45720" rtlCol="0" anchor="ctr"/>
           <a:lstStyle>
             <a:lvl1pPr algn="ctr">
-              <a:defRPr sz="900">
+              <a:defRPr sz="960">
                 <a:solidFill>
                   <a:schemeClr val="tx1">
                     <a:tint val="75000"/>
@@ -2975,8 +2975,8 @@
         </p:nvSpPr>
         <p:spPr>
           <a:xfrm>
-            <a:off x="6457950" y="5085080"/>
-            <a:ext cx="2057400" cy="292100"/>
+            <a:off x="10332720" y="5085080"/>
+            <a:ext cx="3291840" cy="292100"/>
           </a:xfrm>
           <a:prstGeom prst="rect">
             <a:avLst/>
@@ -2986,7 +2986,7 @@
           <a:bodyPr vert="horz" lIns="91440" tIns="45720" rIns="91440" bIns="45720" rtlCol="0" anchor="ctr"/>
           <a:lstStyle>
             <a:lvl1pPr algn="r">
-              <a:defRPr sz="900">
+              <a:defRPr sz="960">
                 <a:solidFill>
                   <a:schemeClr val="tx1">
                     <a:tint val="75000"/>
@@ -3007,27 +3007,27 @@
     </p:spTree>
     <p:extLst>
       <p:ext uri="{BB962C8B-B14F-4D97-AF65-F5344CB8AC3E}">
-        <p14:creationId xmlns:p14="http://schemas.microsoft.com/office/powerpoint/2010/main" val="3060046289"/>
+        <p14:creationId xmlns:p14="http://schemas.microsoft.com/office/powerpoint/2010/main" val="1714237031"/>
       </p:ext>
     </p:extLst>
   </p:cSld>
   <p:clrMap bg1="lt1" tx1="dk1" bg2="lt2" tx2="dk2" accent1="accent1" accent2="accent2" accent3="accent3" accent4="accent4" accent5="accent5" accent6="accent6" hlink="hlink" folHlink="folHlink"/>
   <p:sldLayoutIdLst>
-    <p:sldLayoutId id="2147483697" r:id="rId1"/>
-    <p:sldLayoutId id="2147483698" r:id="rId2"/>
-    <p:sldLayoutId id="2147483699" r:id="rId3"/>
-    <p:sldLayoutId id="2147483700" r:id="rId4"/>
-    <p:sldLayoutId id="2147483701" r:id="rId5"/>
-    <p:sldLayoutId id="2147483702" r:id="rId6"/>
-    <p:sldLayoutId id="2147483703" r:id="rId7"/>
-    <p:sldLayoutId id="2147483704" r:id="rId8"/>
-    <p:sldLayoutId id="2147483705" r:id="rId9"/>
-    <p:sldLayoutId id="2147483706" r:id="rId10"/>
-    <p:sldLayoutId id="2147483707" r:id="rId11"/>
+    <p:sldLayoutId id="2147483721" r:id="rId1"/>
+    <p:sldLayoutId id="2147483722" r:id="rId2"/>
+    <p:sldLayoutId id="2147483723" r:id="rId3"/>
+    <p:sldLayoutId id="2147483724" r:id="rId4"/>
+    <p:sldLayoutId id="2147483725" r:id="rId5"/>
+    <p:sldLayoutId id="2147483726" r:id="rId6"/>
+    <p:sldLayoutId id="2147483727" r:id="rId7"/>
+    <p:sldLayoutId id="2147483728" r:id="rId8"/>
+    <p:sldLayoutId id="2147483729" r:id="rId9"/>
+    <p:sldLayoutId id="2147483730" r:id="rId10"/>
+    <p:sldLayoutId id="2147483731" r:id="rId11"/>
   </p:sldLayoutIdLst>
   <p:txStyles>
     <p:titleStyle>
-      <a:lvl1pPr algn="l" defTabSz="685800" rtl="0" eaLnBrk="1" latinLnBrk="0" hangingPunct="1">
+      <a:lvl1pPr algn="l" defTabSz="731520" rtl="0" eaLnBrk="1" latinLnBrk="0" hangingPunct="1">
         <a:lnSpc>
           <a:spcPct val="90000"/>
         </a:lnSpc>
@@ -3035,7 +3035,7 @@
           <a:spcPct val="0"/>
         </a:spcBef>
         <a:buNone/>
-        <a:defRPr sz="3300" kern="1200">
+        <a:defRPr sz="3520" kern="1200">
           <a:solidFill>
             <a:schemeClr val="tx1"/>
           </a:solidFill>
@@ -3046,16 +3046,16 @@
       </a:lvl1pPr>
     </p:titleStyle>
     <p:bodyStyle>
-      <a:lvl1pPr marL="171450" indent="-171450" algn="l" defTabSz="685800" rtl="0" eaLnBrk="1" latinLnBrk="0" hangingPunct="1">
+      <a:lvl1pPr marL="182880" indent="-182880" algn="l" defTabSz="731520" rtl="0" eaLnBrk="1" latinLnBrk="0" hangingPunct="1">
         <a:lnSpc>
           <a:spcPct val="90000"/>
         </a:lnSpc>
         <a:spcBef>
-          <a:spcPts val="750"/>
+          <a:spcPts val="800"/>
         </a:spcBef>
         <a:buFont typeface="Arial" panose="020B0604020202020204" pitchFamily="34" charset="0"/>
         <a:buChar char="•"/>
-        <a:defRPr sz="2100" kern="1200">
+        <a:defRPr sz="2240" kern="1200">
           <a:solidFill>
             <a:schemeClr val="tx1"/>
           </a:solidFill>
@@ -3064,16 +3064,16 @@
           <a:cs typeface="+mn-cs"/>
         </a:defRPr>
       </a:lvl1pPr>
-      <a:lvl2pPr marL="514350" indent="-171450" algn="l" defTabSz="685800" rtl="0" eaLnBrk="1" latinLnBrk="0" hangingPunct="1">
+      <a:lvl2pPr marL="548640" indent="-182880" algn="l" defTabSz="731520" rtl="0" eaLnBrk="1" latinLnBrk="0" hangingPunct="1">
         <a:lnSpc>
           <a:spcPct val="90000"/>
         </a:lnSpc>
         <a:spcBef>
-          <a:spcPts val="375"/>
+          <a:spcPts val="400"/>
         </a:spcBef>
         <a:buFont typeface="Arial" panose="020B0604020202020204" pitchFamily="34" charset="0"/>
         <a:buChar char="•"/>
-        <a:defRPr sz="1800" kern="1200">
+        <a:defRPr sz="1920" kern="1200">
           <a:solidFill>
             <a:schemeClr val="tx1"/>
           </a:solidFill>
@@ -3082,16 +3082,16 @@
           <a:cs typeface="+mn-cs"/>
         </a:defRPr>
       </a:lvl2pPr>
-      <a:lvl3pPr marL="857250" indent="-171450" algn="l" defTabSz="685800" rtl="0" eaLnBrk="1" latinLnBrk="0" hangingPunct="1">
+      <a:lvl3pPr marL="914400" indent="-182880" algn="l" defTabSz="731520" rtl="0" eaLnBrk="1" latinLnBrk="0" hangingPunct="1">
         <a:lnSpc>
           <a:spcPct val="90000"/>
         </a:lnSpc>
         <a:spcBef>
-          <a:spcPts val="375"/>
+          <a:spcPts val="400"/>
         </a:spcBef>
         <a:buFont typeface="Arial" panose="020B0604020202020204" pitchFamily="34" charset="0"/>
         <a:buChar char="•"/>
-        <a:defRPr sz="1500" kern="1200">
+        <a:defRPr sz="1600" kern="1200">
           <a:solidFill>
             <a:schemeClr val="tx1"/>
           </a:solidFill>
@@ -3100,16 +3100,16 @@
           <a:cs typeface="+mn-cs"/>
         </a:defRPr>
       </a:lvl3pPr>
-      <a:lvl4pPr marL="1200150" indent="-171450" algn="l" defTabSz="685800" rtl="0" eaLnBrk="1" latinLnBrk="0" hangingPunct="1">
+      <a:lvl4pPr marL="1280160" indent="-182880" algn="l" defTabSz="731520" rtl="0" eaLnBrk="1" latinLnBrk="0" hangingPunct="1">
         <a:lnSpc>
           <a:spcPct val="90000"/>
         </a:lnSpc>
         <a:spcBef>
-          <a:spcPts val="375"/>
+          <a:spcPts val="400"/>
         </a:spcBef>
         <a:buFont typeface="Arial" panose="020B0604020202020204" pitchFamily="34" charset="0"/>
         <a:buChar char="•"/>
-        <a:defRPr sz="1350" kern="1200">
+        <a:defRPr sz="1440" kern="1200">
           <a:solidFill>
             <a:schemeClr val="tx1"/>
           </a:solidFill>
@@ -3118,16 +3118,16 @@
           <a:cs typeface="+mn-cs"/>
         </a:defRPr>
       </a:lvl4pPr>
-      <a:lvl5pPr marL="1543050" indent="-171450" algn="l" defTabSz="685800" rtl="0" eaLnBrk="1" latinLnBrk="0" hangingPunct="1">
+      <a:lvl5pPr marL="1645920" indent="-182880" algn="l" defTabSz="731520" rtl="0" eaLnBrk="1" latinLnBrk="0" hangingPunct="1">
         <a:lnSpc>
           <a:spcPct val="90000"/>
         </a:lnSpc>
         <a:spcBef>
-          <a:spcPts val="375"/>
+          <a:spcPts val="400"/>
         </a:spcBef>
         <a:buFont typeface="Arial" panose="020B0604020202020204" pitchFamily="34" charset="0"/>
         <a:buChar char="•"/>
-        <a:defRPr sz="1350" kern="1200">
+        <a:defRPr sz="1440" kern="1200">
           <a:solidFill>
             <a:schemeClr val="tx1"/>
           </a:solidFill>
@@ -3136,16 +3136,16 @@
           <a:cs typeface="+mn-cs"/>
         </a:defRPr>
       </a:lvl5pPr>
-      <a:lvl6pPr marL="1885950" indent="-171450" algn="l" defTabSz="685800" rtl="0" eaLnBrk="1" latinLnBrk="0" hangingPunct="1">
+      <a:lvl6pPr marL="2011680" indent="-182880" algn="l" defTabSz="731520" rtl="0" eaLnBrk="1" latinLnBrk="0" hangingPunct="1">
         <a:lnSpc>
           <a:spcPct val="90000"/>
         </a:lnSpc>
         <a:spcBef>
-          <a:spcPts val="375"/>
+          <a:spcPts val="400"/>
         </a:spcBef>
         <a:buFont typeface="Arial" panose="020B0604020202020204" pitchFamily="34" charset="0"/>
         <a:buChar char="•"/>
-        <a:defRPr sz="1350" kern="1200">
+        <a:defRPr sz="1440" kern="1200">
           <a:solidFill>
             <a:schemeClr val="tx1"/>
           </a:solidFill>
@@ -3154,16 +3154,16 @@
           <a:cs typeface="+mn-cs"/>
         </a:defRPr>
       </a:lvl6pPr>
-      <a:lvl7pPr marL="2228850" indent="-171450" algn="l" defTabSz="685800" rtl="0" eaLnBrk="1" latinLnBrk="0" hangingPunct="1">
+      <a:lvl7pPr marL="2377440" indent="-182880" algn="l" defTabSz="731520" rtl="0" eaLnBrk="1" latinLnBrk="0" hangingPunct="1">
         <a:lnSpc>
           <a:spcPct val="90000"/>
         </a:lnSpc>
         <a:spcBef>
-          <a:spcPts val="375"/>
+          <a:spcPts val="400"/>
         </a:spcBef>
         <a:buFont typeface="Arial" panose="020B0604020202020204" pitchFamily="34" charset="0"/>
         <a:buChar char="•"/>
-        <a:defRPr sz="1350" kern="1200">
+        <a:defRPr sz="1440" kern="1200">
           <a:solidFill>
             <a:schemeClr val="tx1"/>
           </a:solidFill>
@@ -3172,16 +3172,16 @@
           <a:cs typeface="+mn-cs"/>
         </a:defRPr>
       </a:lvl7pPr>
-      <a:lvl8pPr marL="2571750" indent="-171450" algn="l" defTabSz="685800" rtl="0" eaLnBrk="1" latinLnBrk="0" hangingPunct="1">
+      <a:lvl8pPr marL="2743200" indent="-182880" algn="l" defTabSz="731520" rtl="0" eaLnBrk="1" latinLnBrk="0" hangingPunct="1">
         <a:lnSpc>
           <a:spcPct val="90000"/>
         </a:lnSpc>
         <a:spcBef>
-          <a:spcPts val="375"/>
+          <a:spcPts val="400"/>
         </a:spcBef>
         <a:buFont typeface="Arial" panose="020B0604020202020204" pitchFamily="34" charset="0"/>
         <a:buChar char="•"/>
-        <a:defRPr sz="1350" kern="1200">
+        <a:defRPr sz="1440" kern="1200">
           <a:solidFill>
             <a:schemeClr val="tx1"/>
           </a:solidFill>
@@ -3190,16 +3190,16 @@
           <a:cs typeface="+mn-cs"/>
         </a:defRPr>
       </a:lvl8pPr>
-      <a:lvl9pPr marL="2914650" indent="-171450" algn="l" defTabSz="685800" rtl="0" eaLnBrk="1" latinLnBrk="0" hangingPunct="1">
+      <a:lvl9pPr marL="3108960" indent="-182880" algn="l" defTabSz="731520" rtl="0" eaLnBrk="1" latinLnBrk="0" hangingPunct="1">
         <a:lnSpc>
           <a:spcPct val="90000"/>
         </a:lnSpc>
         <a:spcBef>
-          <a:spcPts val="375"/>
+          <a:spcPts val="400"/>
         </a:spcBef>
         <a:buFont typeface="Arial" panose="020B0604020202020204" pitchFamily="34" charset="0"/>
         <a:buChar char="•"/>
-        <a:defRPr sz="1350" kern="1200">
+        <a:defRPr sz="1440" kern="1200">
           <a:solidFill>
             <a:schemeClr val="tx1"/>
           </a:solidFill>
@@ -3213,8 +3213,8 @@
       <a:defPPr>
         <a:defRPr lang="en-US"/>
       </a:defPPr>
-      <a:lvl1pPr marL="0" algn="l" defTabSz="685800" rtl="0" eaLnBrk="1" latinLnBrk="0" hangingPunct="1">
-        <a:defRPr sz="1350" kern="1200">
+      <a:lvl1pPr marL="0" algn="l" defTabSz="731520" rtl="0" eaLnBrk="1" latinLnBrk="0" hangingPunct="1">
+        <a:defRPr sz="1440" kern="1200">
           <a:solidFill>
             <a:schemeClr val="tx1"/>
           </a:solidFill>
@@ -3223,8 +3223,8 @@
           <a:cs typeface="+mn-cs"/>
         </a:defRPr>
       </a:lvl1pPr>
-      <a:lvl2pPr marL="342900" algn="l" defTabSz="685800" rtl="0" eaLnBrk="1" latinLnBrk="0" hangingPunct="1">
-        <a:defRPr sz="1350" kern="1200">
+      <a:lvl2pPr marL="365760" algn="l" defTabSz="731520" rtl="0" eaLnBrk="1" latinLnBrk="0" hangingPunct="1">
+        <a:defRPr sz="1440" kern="1200">
           <a:solidFill>
             <a:schemeClr val="tx1"/>
           </a:solidFill>
@@ -3233,8 +3233,8 @@
           <a:cs typeface="+mn-cs"/>
         </a:defRPr>
       </a:lvl2pPr>
-      <a:lvl3pPr marL="685800" algn="l" defTabSz="685800" rtl="0" eaLnBrk="1" latinLnBrk="0" hangingPunct="1">
-        <a:defRPr sz="1350" kern="1200">
+      <a:lvl3pPr marL="731520" algn="l" defTabSz="731520" rtl="0" eaLnBrk="1" latinLnBrk="0" hangingPunct="1">
+        <a:defRPr sz="1440" kern="1200">
           <a:solidFill>
             <a:schemeClr val="tx1"/>
           </a:solidFill>
@@ -3243,8 +3243,8 @@
           <a:cs typeface="+mn-cs"/>
         </a:defRPr>
       </a:lvl3pPr>
-      <a:lvl4pPr marL="1028700" algn="l" defTabSz="685800" rtl="0" eaLnBrk="1" latinLnBrk="0" hangingPunct="1">
-        <a:defRPr sz="1350" kern="1200">
+      <a:lvl4pPr marL="1097280" algn="l" defTabSz="731520" rtl="0" eaLnBrk="1" latinLnBrk="0" hangingPunct="1">
+        <a:defRPr sz="1440" kern="1200">
           <a:solidFill>
             <a:schemeClr val="tx1"/>
           </a:solidFill>
@@ -3253,8 +3253,8 @@
           <a:cs typeface="+mn-cs"/>
         </a:defRPr>
       </a:lvl4pPr>
-      <a:lvl5pPr marL="1371600" algn="l" defTabSz="685800" rtl="0" eaLnBrk="1" latinLnBrk="0" hangingPunct="1">
-        <a:defRPr sz="1350" kern="1200">
+      <a:lvl5pPr marL="1463040" algn="l" defTabSz="731520" rtl="0" eaLnBrk="1" latinLnBrk="0" hangingPunct="1">
+        <a:defRPr sz="1440" kern="1200">
           <a:solidFill>
             <a:schemeClr val="tx1"/>
           </a:solidFill>
@@ -3263,8 +3263,8 @@
           <a:cs typeface="+mn-cs"/>
         </a:defRPr>
       </a:lvl5pPr>
-      <a:lvl6pPr marL="1714500" algn="l" defTabSz="685800" rtl="0" eaLnBrk="1" latinLnBrk="0" hangingPunct="1">
-        <a:defRPr sz="1350" kern="1200">
+      <a:lvl6pPr marL="1828800" algn="l" defTabSz="731520" rtl="0" eaLnBrk="1" latinLnBrk="0" hangingPunct="1">
+        <a:defRPr sz="1440" kern="1200">
           <a:solidFill>
             <a:schemeClr val="tx1"/>
           </a:solidFill>
@@ -3273,8 +3273,8 @@
           <a:cs typeface="+mn-cs"/>
         </a:defRPr>
       </a:lvl6pPr>
-      <a:lvl7pPr marL="2057400" algn="l" defTabSz="685800" rtl="0" eaLnBrk="1" latinLnBrk="0" hangingPunct="1">
-        <a:defRPr sz="1350" kern="1200">
+      <a:lvl7pPr marL="2194560" algn="l" defTabSz="731520" rtl="0" eaLnBrk="1" latinLnBrk="0" hangingPunct="1">
+        <a:defRPr sz="1440" kern="1200">
           <a:solidFill>
             <a:schemeClr val="tx1"/>
           </a:solidFill>
@@ -3283,8 +3283,8 @@
           <a:cs typeface="+mn-cs"/>
         </a:defRPr>
       </a:lvl7pPr>
-      <a:lvl8pPr marL="2400300" algn="l" defTabSz="685800" rtl="0" eaLnBrk="1" latinLnBrk="0" hangingPunct="1">
-        <a:defRPr sz="1350" kern="1200">
+      <a:lvl8pPr marL="2560320" algn="l" defTabSz="731520" rtl="0" eaLnBrk="1" latinLnBrk="0" hangingPunct="1">
+        <a:defRPr sz="1440" kern="1200">
           <a:solidFill>
             <a:schemeClr val="tx1"/>
           </a:solidFill>
@@ -3293,8 +3293,8 @@
           <a:cs typeface="+mn-cs"/>
         </a:defRPr>
       </a:lvl8pPr>
-      <a:lvl9pPr marL="2743200" algn="l" defTabSz="685800" rtl="0" eaLnBrk="1" latinLnBrk="0" hangingPunct="1">
-        <a:defRPr sz="1350" kern="1200">
+      <a:lvl9pPr marL="2926080" algn="l" defTabSz="731520" rtl="0" eaLnBrk="1" latinLnBrk="0" hangingPunct="1">
+        <a:defRPr sz="1440" kern="1200">
           <a:solidFill>
             <a:schemeClr val="tx1"/>
           </a:solidFill>
@@ -3325,1025 +3325,1727 @@
           <a:chExt cx="0" cy="0"/>
         </a:xfrm>
       </p:grpSpPr>
-      <p:sp>
-        <p:nvSpPr>
-          <p:cNvPr id="15" name="Rectangle: Rounded Corners 14">
+      <p:grpSp>
+        <p:nvGrpSpPr>
+          <p:cNvPr id="2" name="Group 1">
             <a:extLst>
               <a:ext uri="{FF2B5EF4-FFF2-40B4-BE49-F238E27FC236}">
-                <a16:creationId xmlns:a16="http://schemas.microsoft.com/office/drawing/2014/main" id="{CC7C3581-4499-4914-A74F-D82CD70190E5}"/>
+                <a16:creationId xmlns:a16="http://schemas.microsoft.com/office/drawing/2014/main" id="{F4E78676-710A-4318-8A68-FE5B4EDD594C}"/>
               </a:ext>
             </a:extLst>
           </p:cNvPr>
-          <p:cNvSpPr/>
+          <p:cNvGrpSpPr/>
           <p:nvPr/>
-        </p:nvSpPr>
-        <p:spPr>
+        </p:nvGrpSpPr>
+        <p:grpSpPr>
           <a:xfrm>
-            <a:off x="836863" y="1342203"/>
-            <a:ext cx="1267326" cy="617621"/>
+            <a:off x="6007362" y="307731"/>
+            <a:ext cx="7965832" cy="4870938"/>
+            <a:chOff x="836863" y="296455"/>
+            <a:chExt cx="7912769" cy="4960019"/>
           </a:xfrm>
-          <a:prstGeom prst="roundRect">
-            <a:avLst/>
-          </a:prstGeom>
-          <a:solidFill>
-            <a:srgbClr val="56B288"/>
-          </a:solidFill>
-        </p:spPr>
-        <p:style>
-          <a:lnRef idx="1">
-            <a:schemeClr val="accent4"/>
-          </a:lnRef>
-          <a:fillRef idx="2">
-            <a:schemeClr val="accent4"/>
-          </a:fillRef>
-          <a:effectRef idx="1">
-            <a:schemeClr val="accent4"/>
-          </a:effectRef>
-          <a:fontRef idx="minor">
-            <a:schemeClr val="dk1"/>
-          </a:fontRef>
-        </p:style>
-        <p:txBody>
-          <a:bodyPr rtlCol="0" anchor="ctr"/>
-          <a:lstStyle/>
-          <a:p>
-            <a:pPr algn="ctr"/>
-            <a:r>
-              <a:rPr lang="en-US" dirty="0">
-                <a:latin typeface="Times New Roman" panose="02020603050405020304" pitchFamily="18" charset="0"/>
-                <a:cs typeface="Times New Roman" panose="02020603050405020304" pitchFamily="18" charset="0"/>
-              </a:rPr>
-              <a:t>Ligand A</a:t>
-            </a:r>
-          </a:p>
-        </p:txBody>
-      </p:sp>
-      <p:sp>
-        <p:nvSpPr>
-          <p:cNvPr id="16" name="Rectangle: Rounded Corners 15">
+        </p:grpSpPr>
+        <p:sp>
+          <p:nvSpPr>
+            <p:cNvPr id="15" name="Rectangle: Rounded Corners 14">
+              <a:extLst>
+                <a:ext uri="{FF2B5EF4-FFF2-40B4-BE49-F238E27FC236}">
+                  <a16:creationId xmlns:a16="http://schemas.microsoft.com/office/drawing/2014/main" id="{CC7C3581-4499-4914-A74F-D82CD70190E5}"/>
+                </a:ext>
+              </a:extLst>
+            </p:cNvPr>
+            <p:cNvSpPr/>
+            <p:nvPr/>
+          </p:nvSpPr>
+          <p:spPr>
+            <a:xfrm>
+              <a:off x="836863" y="1342203"/>
+              <a:ext cx="1267326" cy="617621"/>
+            </a:xfrm>
+            <a:prstGeom prst="roundRect">
+              <a:avLst/>
+            </a:prstGeom>
+            <a:noFill/>
+            <a:ln w="19050">
+              <a:solidFill>
+                <a:srgbClr val="56B288"/>
+              </a:solidFill>
+            </a:ln>
+          </p:spPr>
+          <p:style>
+            <a:lnRef idx="1">
+              <a:schemeClr val="accent4"/>
+            </a:lnRef>
+            <a:fillRef idx="2">
+              <a:schemeClr val="accent4"/>
+            </a:fillRef>
+            <a:effectRef idx="1">
+              <a:schemeClr val="accent4"/>
+            </a:effectRef>
+            <a:fontRef idx="minor">
+              <a:schemeClr val="dk1"/>
+            </a:fontRef>
+          </p:style>
+          <p:txBody>
+            <a:bodyPr rtlCol="0" anchor="ctr"/>
+            <a:lstStyle/>
+            <a:p>
+              <a:pPr algn="ctr"/>
+              <a:r>
+                <a:rPr lang="en-US" sz="1400" dirty="0">
+                  <a:latin typeface="Times New Roman" panose="02020603050405020304" pitchFamily="18" charset="0"/>
+                  <a:cs typeface="Times New Roman" panose="02020603050405020304" pitchFamily="18" charset="0"/>
+                </a:rPr>
+                <a:t>Ligand A</a:t>
+              </a:r>
+            </a:p>
+          </p:txBody>
+        </p:sp>
+        <p:sp>
+          <p:nvSpPr>
+            <p:cNvPr id="16" name="Rectangle: Rounded Corners 15">
+              <a:extLst>
+                <a:ext uri="{FF2B5EF4-FFF2-40B4-BE49-F238E27FC236}">
+                  <a16:creationId xmlns:a16="http://schemas.microsoft.com/office/drawing/2014/main" id="{6AA463F0-E0DD-41E8-8A87-A7F6C220DC58}"/>
+                </a:ext>
+              </a:extLst>
+            </p:cNvPr>
+            <p:cNvSpPr/>
+            <p:nvPr/>
+          </p:nvSpPr>
+          <p:spPr>
+            <a:xfrm>
+              <a:off x="836863" y="3945035"/>
+              <a:ext cx="1267326" cy="617621"/>
+            </a:xfrm>
+            <a:prstGeom prst="roundRect">
+              <a:avLst/>
+            </a:prstGeom>
+            <a:noFill/>
+            <a:ln w="19050">
+              <a:solidFill>
+                <a:srgbClr val="56B288"/>
+              </a:solidFill>
+            </a:ln>
+          </p:spPr>
+          <p:style>
+            <a:lnRef idx="1">
+              <a:schemeClr val="accent4"/>
+            </a:lnRef>
+            <a:fillRef idx="2">
+              <a:schemeClr val="accent4"/>
+            </a:fillRef>
+            <a:effectRef idx="1">
+              <a:schemeClr val="accent4"/>
+            </a:effectRef>
+            <a:fontRef idx="minor">
+              <a:schemeClr val="dk1"/>
+            </a:fontRef>
+          </p:style>
+          <p:txBody>
+            <a:bodyPr rtlCol="0" anchor="ctr"/>
+            <a:lstStyle/>
+            <a:p>
+              <a:pPr algn="ctr"/>
+              <a:r>
+                <a:rPr lang="en-US" sz="1400" dirty="0">
+                  <a:latin typeface="Times New Roman" panose="02020603050405020304" pitchFamily="18" charset="0"/>
+                  <a:cs typeface="Times New Roman" panose="02020603050405020304" pitchFamily="18" charset="0"/>
+                </a:rPr>
+                <a:t>Ligand B</a:t>
+              </a:r>
+            </a:p>
+          </p:txBody>
+        </p:sp>
+        <p:sp>
+          <p:nvSpPr>
+            <p:cNvPr id="17" name="Rectangle: Rounded Corners 16">
+              <a:extLst>
+                <a:ext uri="{FF2B5EF4-FFF2-40B4-BE49-F238E27FC236}">
+                  <a16:creationId xmlns:a16="http://schemas.microsoft.com/office/drawing/2014/main" id="{D23B225F-221E-47F3-8FF1-4B5E2B0282DD}"/>
+                </a:ext>
+              </a:extLst>
+            </p:cNvPr>
+            <p:cNvSpPr/>
+            <p:nvPr/>
+          </p:nvSpPr>
+          <p:spPr>
+            <a:xfrm>
+              <a:off x="3243179" y="355610"/>
+              <a:ext cx="1331494" cy="689811"/>
+            </a:xfrm>
+            <a:prstGeom prst="roundRect">
+              <a:avLst/>
+            </a:prstGeom>
+            <a:noFill/>
+            <a:ln w="19050">
+              <a:solidFill>
+                <a:srgbClr val="E8718C"/>
+              </a:solidFill>
+            </a:ln>
+          </p:spPr>
+          <p:style>
+            <a:lnRef idx="1">
+              <a:schemeClr val="accent6"/>
+            </a:lnRef>
+            <a:fillRef idx="2">
+              <a:schemeClr val="accent6"/>
+            </a:fillRef>
+            <a:effectRef idx="1">
+              <a:schemeClr val="accent6"/>
+            </a:effectRef>
+            <a:fontRef idx="minor">
+              <a:schemeClr val="dk1"/>
+            </a:fontRef>
+          </p:style>
+          <p:txBody>
+            <a:bodyPr rtlCol="0" anchor="ctr"/>
+            <a:lstStyle/>
+            <a:p>
+              <a:pPr algn="ctr"/>
+              <a:r>
+                <a:rPr lang="en-US" sz="1400" dirty="0">
+                  <a:latin typeface="Times New Roman" panose="02020603050405020304" pitchFamily="18" charset="0"/>
+                  <a:cs typeface="Times New Roman" panose="02020603050405020304" pitchFamily="18" charset="0"/>
+                </a:rPr>
+                <a:t>Protein 1</a:t>
+              </a:r>
+            </a:p>
+          </p:txBody>
+        </p:sp>
+        <p:sp>
+          <p:nvSpPr>
+            <p:cNvPr id="18" name="Rectangle: Rounded Corners 17">
+              <a:extLst>
+                <a:ext uri="{FF2B5EF4-FFF2-40B4-BE49-F238E27FC236}">
+                  <a16:creationId xmlns:a16="http://schemas.microsoft.com/office/drawing/2014/main" id="{A731C30A-EBB3-49DA-B2B0-29E66C74515A}"/>
+                </a:ext>
+              </a:extLst>
+            </p:cNvPr>
+            <p:cNvSpPr/>
+            <p:nvPr/>
+          </p:nvSpPr>
+          <p:spPr>
+            <a:xfrm>
+              <a:off x="3243179" y="1195817"/>
+              <a:ext cx="1331494" cy="689811"/>
+            </a:xfrm>
+            <a:prstGeom prst="roundRect">
+              <a:avLst/>
+            </a:prstGeom>
+            <a:noFill/>
+            <a:ln w="19050">
+              <a:solidFill>
+                <a:srgbClr val="E8718C"/>
+              </a:solidFill>
+            </a:ln>
+          </p:spPr>
+          <p:style>
+            <a:lnRef idx="1">
+              <a:schemeClr val="accent6"/>
+            </a:lnRef>
+            <a:fillRef idx="2">
+              <a:schemeClr val="accent6"/>
+            </a:fillRef>
+            <a:effectRef idx="1">
+              <a:schemeClr val="accent6"/>
+            </a:effectRef>
+            <a:fontRef idx="minor">
+              <a:schemeClr val="dk1"/>
+            </a:fontRef>
+          </p:style>
+          <p:txBody>
+            <a:bodyPr rtlCol="0" anchor="ctr"/>
+            <a:lstStyle/>
+            <a:p>
+              <a:pPr algn="ctr"/>
+              <a:r>
+                <a:rPr lang="en-US" sz="1400" dirty="0">
+                  <a:latin typeface="Times New Roman" panose="02020603050405020304" pitchFamily="18" charset="0"/>
+                  <a:cs typeface="Times New Roman" panose="02020603050405020304" pitchFamily="18" charset="0"/>
+                </a:rPr>
+                <a:t>Protein 2</a:t>
+              </a:r>
+            </a:p>
+          </p:txBody>
+        </p:sp>
+        <p:sp>
+          <p:nvSpPr>
+            <p:cNvPr id="19" name="Rectangle: Rounded Corners 18">
+              <a:extLst>
+                <a:ext uri="{FF2B5EF4-FFF2-40B4-BE49-F238E27FC236}">
+                  <a16:creationId xmlns:a16="http://schemas.microsoft.com/office/drawing/2014/main" id="{01C0B325-B647-42FD-9DF6-86FB03A66F36}"/>
+                </a:ext>
+              </a:extLst>
+            </p:cNvPr>
+            <p:cNvSpPr/>
+            <p:nvPr/>
+          </p:nvSpPr>
+          <p:spPr>
+            <a:xfrm>
+              <a:off x="3243179" y="2124254"/>
+              <a:ext cx="1331494" cy="689811"/>
+            </a:xfrm>
+            <a:prstGeom prst="roundRect">
+              <a:avLst/>
+            </a:prstGeom>
+            <a:noFill/>
+            <a:ln w="19050">
+              <a:solidFill>
+                <a:srgbClr val="E8718C"/>
+              </a:solidFill>
+            </a:ln>
+          </p:spPr>
+          <p:style>
+            <a:lnRef idx="1">
+              <a:schemeClr val="accent6"/>
+            </a:lnRef>
+            <a:fillRef idx="2">
+              <a:schemeClr val="accent6"/>
+            </a:fillRef>
+            <a:effectRef idx="1">
+              <a:schemeClr val="accent6"/>
+            </a:effectRef>
+            <a:fontRef idx="minor">
+              <a:schemeClr val="dk1"/>
+            </a:fontRef>
+          </p:style>
+          <p:txBody>
+            <a:bodyPr rtlCol="0" anchor="ctr"/>
+            <a:lstStyle/>
+            <a:p>
+              <a:pPr algn="ctr"/>
+              <a:r>
+                <a:rPr lang="en-US" sz="1400" dirty="0">
+                  <a:latin typeface="Times New Roman" panose="02020603050405020304" pitchFamily="18" charset="0"/>
+                  <a:cs typeface="Times New Roman" panose="02020603050405020304" pitchFamily="18" charset="0"/>
+                </a:rPr>
+                <a:t>Protein 3</a:t>
+              </a:r>
+            </a:p>
+          </p:txBody>
+        </p:sp>
+        <p:sp>
+          <p:nvSpPr>
+            <p:cNvPr id="20" name="Rectangle: Rounded Corners 19">
+              <a:extLst>
+                <a:ext uri="{FF2B5EF4-FFF2-40B4-BE49-F238E27FC236}">
+                  <a16:creationId xmlns:a16="http://schemas.microsoft.com/office/drawing/2014/main" id="{CE882CC2-DED2-4588-8310-A1638C54D91E}"/>
+                </a:ext>
+              </a:extLst>
+            </p:cNvPr>
+            <p:cNvSpPr/>
+            <p:nvPr/>
+          </p:nvSpPr>
+          <p:spPr>
+            <a:xfrm>
+              <a:off x="3243179" y="3335433"/>
+              <a:ext cx="1331494" cy="689811"/>
+            </a:xfrm>
+            <a:prstGeom prst="roundRect">
+              <a:avLst/>
+            </a:prstGeom>
+            <a:noFill/>
+            <a:ln w="19050">
+              <a:solidFill>
+                <a:srgbClr val="E8718C"/>
+              </a:solidFill>
+            </a:ln>
+          </p:spPr>
+          <p:style>
+            <a:lnRef idx="1">
+              <a:schemeClr val="accent6"/>
+            </a:lnRef>
+            <a:fillRef idx="2">
+              <a:schemeClr val="accent6"/>
+            </a:fillRef>
+            <a:effectRef idx="1">
+              <a:schemeClr val="accent6"/>
+            </a:effectRef>
+            <a:fontRef idx="minor">
+              <a:schemeClr val="dk1"/>
+            </a:fontRef>
+          </p:style>
+          <p:txBody>
+            <a:bodyPr rtlCol="0" anchor="ctr"/>
+            <a:lstStyle/>
+            <a:p>
+              <a:pPr algn="ctr"/>
+              <a:r>
+                <a:rPr lang="en-US" sz="1400" dirty="0">
+                  <a:latin typeface="Times New Roman" panose="02020603050405020304" pitchFamily="18" charset="0"/>
+                  <a:cs typeface="Times New Roman" panose="02020603050405020304" pitchFamily="18" charset="0"/>
+                </a:rPr>
+                <a:t>Protein 4</a:t>
+              </a:r>
+            </a:p>
+          </p:txBody>
+        </p:sp>
+        <p:sp>
+          <p:nvSpPr>
+            <p:cNvPr id="23" name="Rectangle: Rounded Corners 22">
+              <a:extLst>
+                <a:ext uri="{FF2B5EF4-FFF2-40B4-BE49-F238E27FC236}">
+                  <a16:creationId xmlns:a16="http://schemas.microsoft.com/office/drawing/2014/main" id="{36C5C4C5-FC9C-48A5-A1DE-D905C3DBCE48}"/>
+                </a:ext>
+              </a:extLst>
+            </p:cNvPr>
+            <p:cNvSpPr/>
+            <p:nvPr/>
+          </p:nvSpPr>
+          <p:spPr>
+            <a:xfrm>
+              <a:off x="3267241" y="4458381"/>
+              <a:ext cx="1331494" cy="689811"/>
+            </a:xfrm>
+            <a:prstGeom prst="roundRect">
+              <a:avLst/>
+            </a:prstGeom>
+            <a:noFill/>
+            <a:ln w="19050">
+              <a:solidFill>
+                <a:srgbClr val="E8718C"/>
+              </a:solidFill>
+            </a:ln>
+          </p:spPr>
+          <p:style>
+            <a:lnRef idx="1">
+              <a:schemeClr val="accent6"/>
+            </a:lnRef>
+            <a:fillRef idx="2">
+              <a:schemeClr val="accent6"/>
+            </a:fillRef>
+            <a:effectRef idx="1">
+              <a:schemeClr val="accent6"/>
+            </a:effectRef>
+            <a:fontRef idx="minor">
+              <a:schemeClr val="dk1"/>
+            </a:fontRef>
+          </p:style>
+          <p:txBody>
+            <a:bodyPr rtlCol="0" anchor="ctr"/>
+            <a:lstStyle/>
+            <a:p>
+              <a:pPr algn="ctr"/>
+              <a:r>
+                <a:rPr lang="en-US" sz="1400" dirty="0">
+                  <a:latin typeface="Times New Roman" panose="02020603050405020304" pitchFamily="18" charset="0"/>
+                  <a:cs typeface="Times New Roman" panose="02020603050405020304" pitchFamily="18" charset="0"/>
+                </a:rPr>
+                <a:t>Protein 5</a:t>
+              </a:r>
+            </a:p>
+          </p:txBody>
+        </p:sp>
+        <p:cxnSp>
+          <p:nvCxnSpPr>
+            <p:cNvPr id="24" name="Straight Connector 23">
+              <a:extLst>
+                <a:ext uri="{FF2B5EF4-FFF2-40B4-BE49-F238E27FC236}">
+                  <a16:creationId xmlns:a16="http://schemas.microsoft.com/office/drawing/2014/main" id="{9D72D191-D08D-492C-9F28-200093025CE2}"/>
+                </a:ext>
+              </a:extLst>
+            </p:cNvPr>
+            <p:cNvCxnSpPr>
+              <a:cxnSpLocks/>
+              <a:stCxn id="15" idx="3"/>
+              <a:endCxn id="17" idx="1"/>
+            </p:cNvCxnSpPr>
+            <p:nvPr/>
+          </p:nvCxnSpPr>
+          <p:spPr>
+            <a:xfrm flipV="1">
+              <a:off x="2104189" y="700516"/>
+              <a:ext cx="1138990" cy="950496"/>
+            </a:xfrm>
+            <a:prstGeom prst="line">
+              <a:avLst/>
+            </a:prstGeom>
+            <a:ln w="12700">
+              <a:solidFill>
+                <a:schemeClr val="tx1"/>
+              </a:solidFill>
+            </a:ln>
+          </p:spPr>
+          <p:style>
+            <a:lnRef idx="1">
+              <a:schemeClr val="accent1"/>
+            </a:lnRef>
+            <a:fillRef idx="0">
+              <a:schemeClr val="accent1"/>
+            </a:fillRef>
+            <a:effectRef idx="0">
+              <a:schemeClr val="accent1"/>
+            </a:effectRef>
+            <a:fontRef idx="minor">
+              <a:schemeClr val="tx1"/>
+            </a:fontRef>
+          </p:style>
+        </p:cxnSp>
+        <p:cxnSp>
+          <p:nvCxnSpPr>
+            <p:cNvPr id="25" name="Straight Connector 24">
+              <a:extLst>
+                <a:ext uri="{FF2B5EF4-FFF2-40B4-BE49-F238E27FC236}">
+                  <a16:creationId xmlns:a16="http://schemas.microsoft.com/office/drawing/2014/main" id="{B3353CC8-5FAA-45E1-9BEC-BFFD7404E508}"/>
+                </a:ext>
+              </a:extLst>
+            </p:cNvPr>
+            <p:cNvCxnSpPr>
+              <a:cxnSpLocks/>
+              <a:stCxn id="15" idx="3"/>
+              <a:endCxn id="18" idx="1"/>
+            </p:cNvCxnSpPr>
+            <p:nvPr/>
+          </p:nvCxnSpPr>
+          <p:spPr>
+            <a:xfrm flipV="1">
+              <a:off x="2104189" y="1540723"/>
+              <a:ext cx="1138990" cy="110291"/>
+            </a:xfrm>
+            <a:prstGeom prst="line">
+              <a:avLst/>
+            </a:prstGeom>
+            <a:ln w="12700">
+              <a:solidFill>
+                <a:schemeClr val="tx1"/>
+              </a:solidFill>
+            </a:ln>
+          </p:spPr>
+          <p:style>
+            <a:lnRef idx="1">
+              <a:schemeClr val="accent1"/>
+            </a:lnRef>
+            <a:fillRef idx="0">
+              <a:schemeClr val="accent1"/>
+            </a:fillRef>
+            <a:effectRef idx="0">
+              <a:schemeClr val="accent1"/>
+            </a:effectRef>
+            <a:fontRef idx="minor">
+              <a:schemeClr val="tx1"/>
+            </a:fontRef>
+          </p:style>
+        </p:cxnSp>
+        <p:cxnSp>
+          <p:nvCxnSpPr>
+            <p:cNvPr id="26" name="Straight Connector 25">
+              <a:extLst>
+                <a:ext uri="{FF2B5EF4-FFF2-40B4-BE49-F238E27FC236}">
+                  <a16:creationId xmlns:a16="http://schemas.microsoft.com/office/drawing/2014/main" id="{4C9E03E7-3A38-4CAD-970C-9FFAF5851D49}"/>
+                </a:ext>
+              </a:extLst>
+            </p:cNvPr>
+            <p:cNvCxnSpPr>
+              <a:cxnSpLocks/>
+              <a:stCxn id="15" idx="3"/>
+              <a:endCxn id="19" idx="1"/>
+            </p:cNvCxnSpPr>
+            <p:nvPr/>
+          </p:nvCxnSpPr>
+          <p:spPr>
+            <a:xfrm>
+              <a:off x="2104189" y="1651012"/>
+              <a:ext cx="1138990" cy="818146"/>
+            </a:xfrm>
+            <a:prstGeom prst="line">
+              <a:avLst/>
+            </a:prstGeom>
+            <a:ln w="12700">
+              <a:solidFill>
+                <a:schemeClr val="tx1"/>
+              </a:solidFill>
+            </a:ln>
+          </p:spPr>
+          <p:style>
+            <a:lnRef idx="1">
+              <a:schemeClr val="accent1"/>
+            </a:lnRef>
+            <a:fillRef idx="0">
+              <a:schemeClr val="accent1"/>
+            </a:fillRef>
+            <a:effectRef idx="0">
+              <a:schemeClr val="accent1"/>
+            </a:effectRef>
+            <a:fontRef idx="minor">
+              <a:schemeClr val="tx1"/>
+            </a:fontRef>
+          </p:style>
+        </p:cxnSp>
+        <p:cxnSp>
+          <p:nvCxnSpPr>
+            <p:cNvPr id="27" name="Straight Connector 26">
+              <a:extLst>
+                <a:ext uri="{FF2B5EF4-FFF2-40B4-BE49-F238E27FC236}">
+                  <a16:creationId xmlns:a16="http://schemas.microsoft.com/office/drawing/2014/main" id="{FA52F54B-F03B-4FF7-9E25-91A8891D33F0}"/>
+                </a:ext>
+              </a:extLst>
+            </p:cNvPr>
+            <p:cNvCxnSpPr>
+              <a:cxnSpLocks/>
+              <a:endCxn id="20" idx="1"/>
+            </p:cNvCxnSpPr>
+            <p:nvPr/>
+          </p:nvCxnSpPr>
+          <p:spPr>
+            <a:xfrm flipV="1">
+              <a:off x="2104189" y="3680337"/>
+              <a:ext cx="1138990" cy="549444"/>
+            </a:xfrm>
+            <a:prstGeom prst="line">
+              <a:avLst/>
+            </a:prstGeom>
+            <a:ln w="12700">
+              <a:solidFill>
+                <a:schemeClr val="tx1"/>
+              </a:solidFill>
+            </a:ln>
+          </p:spPr>
+          <p:style>
+            <a:lnRef idx="1">
+              <a:schemeClr val="accent1"/>
+            </a:lnRef>
+            <a:fillRef idx="0">
+              <a:schemeClr val="accent1"/>
+            </a:fillRef>
+            <a:effectRef idx="0">
+              <a:schemeClr val="accent1"/>
+            </a:effectRef>
+            <a:fontRef idx="minor">
+              <a:schemeClr val="tx1"/>
+            </a:fontRef>
+          </p:style>
+        </p:cxnSp>
+        <p:cxnSp>
+          <p:nvCxnSpPr>
+            <p:cNvPr id="28" name="Straight Connector 27">
+              <a:extLst>
+                <a:ext uri="{FF2B5EF4-FFF2-40B4-BE49-F238E27FC236}">
+                  <a16:creationId xmlns:a16="http://schemas.microsoft.com/office/drawing/2014/main" id="{889DFE9C-5A90-4324-8F92-7EACDDEF7463}"/>
+                </a:ext>
+              </a:extLst>
+            </p:cNvPr>
+            <p:cNvCxnSpPr>
+              <a:cxnSpLocks/>
+              <a:stCxn id="16" idx="3"/>
+              <a:endCxn id="23" idx="1"/>
+            </p:cNvCxnSpPr>
+            <p:nvPr/>
+          </p:nvCxnSpPr>
+          <p:spPr>
+            <a:xfrm>
+              <a:off x="2104189" y="4253846"/>
+              <a:ext cx="1163052" cy="549441"/>
+            </a:xfrm>
+            <a:prstGeom prst="line">
+              <a:avLst/>
+            </a:prstGeom>
+            <a:ln w="12700">
+              <a:solidFill>
+                <a:schemeClr val="tx1"/>
+              </a:solidFill>
+            </a:ln>
+          </p:spPr>
+          <p:style>
+            <a:lnRef idx="1">
+              <a:schemeClr val="accent1"/>
+            </a:lnRef>
+            <a:fillRef idx="0">
+              <a:schemeClr val="accent1"/>
+            </a:fillRef>
+            <a:effectRef idx="0">
+              <a:schemeClr val="accent1"/>
+            </a:effectRef>
+            <a:fontRef idx="minor">
+              <a:schemeClr val="tx1"/>
+            </a:fontRef>
+          </p:style>
+        </p:cxnSp>
+        <p:sp>
+          <p:nvSpPr>
+            <p:cNvPr id="29" name="Rectangle 28">
+              <a:extLst>
+                <a:ext uri="{FF2B5EF4-FFF2-40B4-BE49-F238E27FC236}">
+                  <a16:creationId xmlns:a16="http://schemas.microsoft.com/office/drawing/2014/main" id="{08741EFD-358F-4851-92AC-B8F0103C5422}"/>
+                </a:ext>
+              </a:extLst>
+            </p:cNvPr>
+            <p:cNvSpPr/>
+            <p:nvPr/>
+          </p:nvSpPr>
+          <p:spPr>
+            <a:xfrm>
+              <a:off x="1901661" y="2586465"/>
+              <a:ext cx="1138989" cy="689811"/>
+            </a:xfrm>
+            <a:prstGeom prst="rect">
+              <a:avLst/>
+            </a:prstGeom>
+            <a:noFill/>
+            <a:ln w="9525" cap="flat" cmpd="sng" algn="ctr">
+              <a:solidFill>
+                <a:schemeClr val="tx1"/>
+              </a:solidFill>
+              <a:prstDash val="solid"/>
+              <a:round/>
+              <a:headEnd type="none" w="med" len="med"/>
+              <a:tailEnd type="none" w="med" len="med"/>
+            </a:ln>
+          </p:spPr>
+          <p:style>
+            <a:lnRef idx="0">
+              <a:scrgbClr r="0" g="0" b="0"/>
+            </a:lnRef>
+            <a:fillRef idx="0">
+              <a:scrgbClr r="0" g="0" b="0"/>
+            </a:fillRef>
+            <a:effectRef idx="0">
+              <a:scrgbClr r="0" g="0" b="0"/>
+            </a:effectRef>
+            <a:fontRef idx="minor">
+              <a:schemeClr val="accent5"/>
+            </a:fontRef>
+          </p:style>
+          <p:txBody>
+            <a:bodyPr rtlCol="0" anchor="ctr"/>
+            <a:lstStyle/>
+            <a:p>
+              <a:pPr algn="ctr"/>
+              <a:r>
+                <a:rPr lang="en-US" sz="1400" dirty="0">
+                  <a:solidFill>
+                    <a:schemeClr val="tx1"/>
+                  </a:solidFill>
+                  <a:latin typeface="Times New Roman" panose="02020603050405020304" pitchFamily="18" charset="0"/>
+                  <a:cs typeface="Times New Roman" panose="02020603050405020304" pitchFamily="18" charset="0"/>
+                </a:rPr>
+                <a:t>Binding Pairs</a:t>
+              </a:r>
+            </a:p>
+          </p:txBody>
+        </p:sp>
+        <p:sp>
+          <p:nvSpPr>
+            <p:cNvPr id="30" name="Rectangle 29">
+              <a:extLst>
+                <a:ext uri="{FF2B5EF4-FFF2-40B4-BE49-F238E27FC236}">
+                  <a16:creationId xmlns:a16="http://schemas.microsoft.com/office/drawing/2014/main" id="{9ADAFA37-E93D-491D-B7D6-08FEB9BD9A5A}"/>
+                </a:ext>
+              </a:extLst>
+            </p:cNvPr>
+            <p:cNvSpPr/>
+            <p:nvPr/>
+          </p:nvSpPr>
+          <p:spPr>
+            <a:xfrm>
+              <a:off x="5184276" y="1206844"/>
+              <a:ext cx="3368843" cy="778044"/>
+            </a:xfrm>
+            <a:prstGeom prst="rect">
+              <a:avLst/>
+            </a:prstGeom>
+            <a:noFill/>
+            <a:ln w="9525" cap="flat" cmpd="sng" algn="ctr">
+              <a:solidFill>
+                <a:schemeClr val="tx1"/>
+              </a:solidFill>
+              <a:prstDash val="solid"/>
+              <a:round/>
+              <a:headEnd type="none" w="med" len="med"/>
+              <a:tailEnd type="none" w="med" len="med"/>
+            </a:ln>
+          </p:spPr>
+          <p:style>
+            <a:lnRef idx="0">
+              <a:scrgbClr r="0" g="0" b="0"/>
+            </a:lnRef>
+            <a:fillRef idx="0">
+              <a:scrgbClr r="0" g="0" b="0"/>
+            </a:fillRef>
+            <a:effectRef idx="0">
+              <a:scrgbClr r="0" g="0" b="0"/>
+            </a:effectRef>
+            <a:fontRef idx="minor">
+              <a:schemeClr val="accent6"/>
+            </a:fontRef>
+          </p:style>
+          <p:txBody>
+            <a:bodyPr rtlCol="0" anchor="ctr"/>
+            <a:lstStyle/>
+            <a:p>
+              <a:pPr algn="ctr"/>
+              <a:r>
+                <a:rPr lang="en-US" sz="1400" dirty="0">
+                  <a:solidFill>
+                    <a:schemeClr val="tx1"/>
+                  </a:solidFill>
+                  <a:latin typeface="Times New Roman" panose="02020603050405020304" pitchFamily="18" charset="0"/>
+                  <a:cs typeface="Times New Roman" panose="02020603050405020304" pitchFamily="18" charset="0"/>
+                </a:rPr>
+                <a:t>Maximize the similarities between proteins 1, 2, and 3</a:t>
+              </a:r>
+            </a:p>
+          </p:txBody>
+        </p:sp>
+        <p:cxnSp>
+          <p:nvCxnSpPr>
+            <p:cNvPr id="31" name="Straight Connector 30">
+              <a:extLst>
+                <a:ext uri="{FF2B5EF4-FFF2-40B4-BE49-F238E27FC236}">
+                  <a16:creationId xmlns:a16="http://schemas.microsoft.com/office/drawing/2014/main" id="{15B681BB-0149-49FE-AD6F-65211E875C25}"/>
+                </a:ext>
+              </a:extLst>
+            </p:cNvPr>
+            <p:cNvCxnSpPr>
+              <a:endCxn id="30" idx="1"/>
+            </p:cNvCxnSpPr>
+            <p:nvPr/>
+          </p:nvCxnSpPr>
+          <p:spPr>
+            <a:xfrm>
+              <a:off x="4598737" y="296455"/>
+              <a:ext cx="585539" cy="1299411"/>
+            </a:xfrm>
+            <a:prstGeom prst="line">
+              <a:avLst/>
+            </a:prstGeom>
+            <a:ln>
+              <a:solidFill>
+                <a:schemeClr val="tx1"/>
+              </a:solidFill>
+            </a:ln>
+          </p:spPr>
+          <p:style>
+            <a:lnRef idx="1">
+              <a:schemeClr val="accent6"/>
+            </a:lnRef>
+            <a:fillRef idx="0">
+              <a:schemeClr val="accent6"/>
+            </a:fillRef>
+            <a:effectRef idx="0">
+              <a:schemeClr val="accent6"/>
+            </a:effectRef>
+            <a:fontRef idx="minor">
+              <a:schemeClr val="tx1"/>
+            </a:fontRef>
+          </p:style>
+        </p:cxnSp>
+        <p:cxnSp>
+          <p:nvCxnSpPr>
+            <p:cNvPr id="32" name="Straight Connector 31">
+              <a:extLst>
+                <a:ext uri="{FF2B5EF4-FFF2-40B4-BE49-F238E27FC236}">
+                  <a16:creationId xmlns:a16="http://schemas.microsoft.com/office/drawing/2014/main" id="{5DC825E2-B990-4F8F-AEED-6223D49F3E5D}"/>
+                </a:ext>
+              </a:extLst>
+            </p:cNvPr>
+            <p:cNvCxnSpPr>
+              <a:cxnSpLocks/>
+              <a:endCxn id="30" idx="1"/>
+            </p:cNvCxnSpPr>
+            <p:nvPr/>
+          </p:nvCxnSpPr>
+          <p:spPr>
+            <a:xfrm flipV="1">
+              <a:off x="4634833" y="1595866"/>
+              <a:ext cx="549443" cy="1299412"/>
+            </a:xfrm>
+            <a:prstGeom prst="line">
+              <a:avLst/>
+            </a:prstGeom>
+            <a:ln>
+              <a:solidFill>
+                <a:schemeClr val="tx1"/>
+              </a:solidFill>
+            </a:ln>
+          </p:spPr>
+          <p:style>
+            <a:lnRef idx="1">
+              <a:schemeClr val="accent6"/>
+            </a:lnRef>
+            <a:fillRef idx="0">
+              <a:schemeClr val="accent6"/>
+            </a:fillRef>
+            <a:effectRef idx="0">
+              <a:schemeClr val="accent6"/>
+            </a:effectRef>
+            <a:fontRef idx="minor">
+              <a:schemeClr val="tx1"/>
+            </a:fontRef>
+          </p:style>
+        </p:cxnSp>
+        <p:sp>
+          <p:nvSpPr>
+            <p:cNvPr id="33" name="Rectangle 32">
+              <a:extLst>
+                <a:ext uri="{FF2B5EF4-FFF2-40B4-BE49-F238E27FC236}">
+                  <a16:creationId xmlns:a16="http://schemas.microsoft.com/office/drawing/2014/main" id="{F2D1D0A2-970E-45AF-82F8-B824F7CCC2A5}"/>
+                </a:ext>
+              </a:extLst>
+            </p:cNvPr>
+            <p:cNvSpPr/>
+            <p:nvPr/>
+          </p:nvSpPr>
+          <p:spPr>
+            <a:xfrm>
+              <a:off x="5184275" y="3750520"/>
+              <a:ext cx="3368843" cy="778044"/>
+            </a:xfrm>
+            <a:prstGeom prst="rect">
+              <a:avLst/>
+            </a:prstGeom>
+            <a:noFill/>
+            <a:ln w="9525" cap="flat" cmpd="sng" algn="ctr">
+              <a:solidFill>
+                <a:schemeClr val="tx1"/>
+              </a:solidFill>
+              <a:prstDash val="solid"/>
+              <a:round/>
+              <a:headEnd type="none" w="med" len="med"/>
+              <a:tailEnd type="none" w="med" len="med"/>
+            </a:ln>
+          </p:spPr>
+          <p:style>
+            <a:lnRef idx="0">
+              <a:scrgbClr r="0" g="0" b="0"/>
+            </a:lnRef>
+            <a:fillRef idx="0">
+              <a:scrgbClr r="0" g="0" b="0"/>
+            </a:fillRef>
+            <a:effectRef idx="0">
+              <a:scrgbClr r="0" g="0" b="0"/>
+            </a:effectRef>
+            <a:fontRef idx="minor">
+              <a:schemeClr val="accent5"/>
+            </a:fontRef>
+          </p:style>
+          <p:txBody>
+            <a:bodyPr rtlCol="0" anchor="ctr"/>
+            <a:lstStyle/>
+            <a:p>
+              <a:pPr algn="ctr"/>
+              <a:r>
+                <a:rPr lang="en-US" sz="1400" dirty="0">
+                  <a:solidFill>
+                    <a:schemeClr val="tx1"/>
+                  </a:solidFill>
+                  <a:latin typeface="Times New Roman" panose="02020603050405020304" pitchFamily="18" charset="0"/>
+                  <a:cs typeface="Times New Roman" panose="02020603050405020304" pitchFamily="18" charset="0"/>
+                </a:rPr>
+                <a:t>Maximize the similarities between proteins 1, 2, and 3</a:t>
+              </a:r>
+            </a:p>
+          </p:txBody>
+        </p:sp>
+        <p:cxnSp>
+          <p:nvCxnSpPr>
+            <p:cNvPr id="34" name="Straight Connector 33">
+              <a:extLst>
+                <a:ext uri="{FF2B5EF4-FFF2-40B4-BE49-F238E27FC236}">
+                  <a16:creationId xmlns:a16="http://schemas.microsoft.com/office/drawing/2014/main" id="{E82B51CE-55A4-419A-BCEC-C5CAC91FD7DC}"/>
+                </a:ext>
+              </a:extLst>
+            </p:cNvPr>
+            <p:cNvCxnSpPr>
+              <a:cxnSpLocks/>
+              <a:endCxn id="33" idx="1"/>
+            </p:cNvCxnSpPr>
+            <p:nvPr/>
+          </p:nvCxnSpPr>
+          <p:spPr>
+            <a:xfrm>
+              <a:off x="4574673" y="3240182"/>
+              <a:ext cx="609600" cy="899360"/>
+            </a:xfrm>
+            <a:prstGeom prst="line">
+              <a:avLst/>
+            </a:prstGeom>
+            <a:ln>
+              <a:solidFill>
+                <a:schemeClr val="tx1"/>
+              </a:solidFill>
+            </a:ln>
+          </p:spPr>
+          <p:style>
+            <a:lnRef idx="1">
+              <a:schemeClr val="accent5"/>
+            </a:lnRef>
+            <a:fillRef idx="0">
+              <a:schemeClr val="accent5"/>
+            </a:fillRef>
+            <a:effectRef idx="0">
+              <a:schemeClr val="accent5"/>
+            </a:effectRef>
+            <a:fontRef idx="minor">
+              <a:schemeClr val="tx1"/>
+            </a:fontRef>
+          </p:style>
+        </p:cxnSp>
+        <p:cxnSp>
+          <p:nvCxnSpPr>
+            <p:cNvPr id="35" name="Straight Connector 34">
+              <a:extLst>
+                <a:ext uri="{FF2B5EF4-FFF2-40B4-BE49-F238E27FC236}">
+                  <a16:creationId xmlns:a16="http://schemas.microsoft.com/office/drawing/2014/main" id="{00F20CBC-BCB3-4E26-A919-AD92D2312C98}"/>
+                </a:ext>
+              </a:extLst>
+            </p:cNvPr>
+            <p:cNvCxnSpPr>
+              <a:cxnSpLocks/>
+              <a:endCxn id="33" idx="1"/>
+            </p:cNvCxnSpPr>
+            <p:nvPr/>
+          </p:nvCxnSpPr>
+          <p:spPr>
+            <a:xfrm flipV="1">
+              <a:off x="4622802" y="4139542"/>
+              <a:ext cx="561473" cy="1116932"/>
+            </a:xfrm>
+            <a:prstGeom prst="line">
+              <a:avLst/>
+            </a:prstGeom>
+            <a:ln>
+              <a:solidFill>
+                <a:schemeClr val="tx1"/>
+              </a:solidFill>
+            </a:ln>
+          </p:spPr>
+          <p:style>
+            <a:lnRef idx="1">
+              <a:schemeClr val="accent5"/>
+            </a:lnRef>
+            <a:fillRef idx="0">
+              <a:schemeClr val="accent5"/>
+            </a:fillRef>
+            <a:effectRef idx="0">
+              <a:schemeClr val="accent5"/>
+            </a:effectRef>
+            <a:fontRef idx="minor">
+              <a:schemeClr val="tx1"/>
+            </a:fontRef>
+          </p:style>
+        </p:cxnSp>
+        <p:sp>
+          <p:nvSpPr>
+            <p:cNvPr id="36" name="Rectangle 35">
+              <a:extLst>
+                <a:ext uri="{FF2B5EF4-FFF2-40B4-BE49-F238E27FC236}">
+                  <a16:creationId xmlns:a16="http://schemas.microsoft.com/office/drawing/2014/main" id="{5E73B5D1-F28C-4723-8EB0-5CA658B1DC79}"/>
+                </a:ext>
+              </a:extLst>
+            </p:cNvPr>
+            <p:cNvSpPr/>
+            <p:nvPr/>
+          </p:nvSpPr>
+          <p:spPr>
+            <a:xfrm>
+              <a:off x="5184275" y="2434570"/>
+              <a:ext cx="3565357" cy="899359"/>
+            </a:xfrm>
+            <a:prstGeom prst="rect">
+              <a:avLst/>
+            </a:prstGeom>
+            <a:noFill/>
+            <a:ln w="9525" cap="flat" cmpd="sng" algn="ctr">
+              <a:solidFill>
+                <a:schemeClr val="tx1"/>
+              </a:solidFill>
+              <a:prstDash val="solid"/>
+              <a:round/>
+              <a:headEnd type="none" w="med" len="med"/>
+              <a:tailEnd type="none" w="med" len="med"/>
+            </a:ln>
+          </p:spPr>
+          <p:style>
+            <a:lnRef idx="0">
+              <a:scrgbClr r="0" g="0" b="0"/>
+            </a:lnRef>
+            <a:fillRef idx="0">
+              <a:scrgbClr r="0" g="0" b="0"/>
+            </a:fillRef>
+            <a:effectRef idx="0">
+              <a:scrgbClr r="0" g="0" b="0"/>
+            </a:effectRef>
+            <a:fontRef idx="minor">
+              <a:schemeClr val="accent2"/>
+            </a:fontRef>
+          </p:style>
+          <p:txBody>
+            <a:bodyPr rtlCol="0" anchor="ctr"/>
+            <a:lstStyle/>
+            <a:p>
+              <a:pPr algn="ctr"/>
+              <a:r>
+                <a:rPr lang="en-US" sz="1400" dirty="0">
+                  <a:solidFill>
+                    <a:schemeClr val="tx1"/>
+                  </a:solidFill>
+                  <a:latin typeface="Times New Roman" panose="02020603050405020304" pitchFamily="18" charset="0"/>
+                  <a:cs typeface="Times New Roman" panose="02020603050405020304" pitchFamily="18" charset="0"/>
+                </a:rPr>
+                <a:t>Maximize the dissimilarities between proteins (1, 2, 3) and (4,5)</a:t>
+              </a:r>
+            </a:p>
+          </p:txBody>
+        </p:sp>
+      </p:grpSp>
+      <p:sp>
+        <p:nvSpPr>
+          <p:cNvPr id="3" name="TextBox 2">
             <a:extLst>
               <a:ext uri="{FF2B5EF4-FFF2-40B4-BE49-F238E27FC236}">
-                <a16:creationId xmlns:a16="http://schemas.microsoft.com/office/drawing/2014/main" id="{6AA463F0-E0DD-41E8-8A87-A7F6C220DC58}"/>
+                <a16:creationId xmlns:a16="http://schemas.microsoft.com/office/drawing/2014/main" id="{2955E47D-329C-4735-8E08-25D94DE16EAE}"/>
               </a:ext>
             </a:extLst>
           </p:cNvPr>
-          <p:cNvSpPr/>
+          <p:cNvSpPr txBox="1"/>
           <p:nvPr/>
         </p:nvSpPr>
         <p:spPr>
           <a:xfrm>
-            <a:off x="836863" y="3945035"/>
-            <a:ext cx="1267326" cy="617621"/>
-          </a:xfrm>
-          <a:prstGeom prst="roundRect">
-            <a:avLst/>
-          </a:prstGeom>
-          <a:solidFill>
-            <a:srgbClr val="56B288"/>
-          </a:solidFill>
-        </p:spPr>
-        <p:style>
-          <a:lnRef idx="1">
-            <a:schemeClr val="accent4"/>
-          </a:lnRef>
-          <a:fillRef idx="2">
-            <a:schemeClr val="accent4"/>
-          </a:fillRef>
-          <a:effectRef idx="1">
-            <a:schemeClr val="accent4"/>
-          </a:effectRef>
-          <a:fontRef idx="minor">
-            <a:schemeClr val="dk1"/>
-          </a:fontRef>
-        </p:style>
-        <p:txBody>
-          <a:bodyPr rtlCol="0" anchor="ctr"/>
-          <a:lstStyle/>
-          <a:p>
-            <a:pPr algn="ctr"/>
-            <a:r>
-              <a:rPr lang="en-US" dirty="0">
-                <a:latin typeface="Times New Roman" panose="02020603050405020304" pitchFamily="18" charset="0"/>
-                <a:cs typeface="Times New Roman" panose="02020603050405020304" pitchFamily="18" charset="0"/>
-              </a:rPr>
-              <a:t>Ligand B</a:t>
-            </a:r>
-          </a:p>
-        </p:txBody>
-      </p:sp>
-      <p:sp>
-        <p:nvSpPr>
-          <p:cNvPr id="17" name="Rectangle: Rounded Corners 16">
-            <a:extLst>
-              <a:ext uri="{FF2B5EF4-FFF2-40B4-BE49-F238E27FC236}">
-                <a16:creationId xmlns:a16="http://schemas.microsoft.com/office/drawing/2014/main" id="{D23B225F-221E-47F3-8FF1-4B5E2B0282DD}"/>
-              </a:ext>
-            </a:extLst>
-          </p:cNvPr>
-          <p:cNvSpPr/>
-          <p:nvPr/>
-        </p:nvSpPr>
-        <p:spPr>
-          <a:xfrm>
-            <a:off x="3243179" y="355610"/>
-            <a:ext cx="1331494" cy="689811"/>
-          </a:xfrm>
-          <a:prstGeom prst="roundRect">
-            <a:avLst/>
-          </a:prstGeom>
-          <a:solidFill>
-            <a:srgbClr val="E8718C"/>
-          </a:solidFill>
-        </p:spPr>
-        <p:style>
-          <a:lnRef idx="1">
-            <a:schemeClr val="accent6"/>
-          </a:lnRef>
-          <a:fillRef idx="2">
-            <a:schemeClr val="accent6"/>
-          </a:fillRef>
-          <a:effectRef idx="1">
-            <a:schemeClr val="accent6"/>
-          </a:effectRef>
-          <a:fontRef idx="minor">
-            <a:schemeClr val="dk1"/>
-          </a:fontRef>
-        </p:style>
-        <p:txBody>
-          <a:bodyPr rtlCol="0" anchor="ctr"/>
-          <a:lstStyle/>
-          <a:p>
-            <a:pPr algn="ctr"/>
-            <a:r>
-              <a:rPr lang="en-US" dirty="0">
-                <a:latin typeface="Times New Roman" panose="02020603050405020304" pitchFamily="18" charset="0"/>
-                <a:cs typeface="Times New Roman" panose="02020603050405020304" pitchFamily="18" charset="0"/>
-              </a:rPr>
-              <a:t>Protein 1</a:t>
-            </a:r>
-          </a:p>
-        </p:txBody>
-      </p:sp>
-      <p:sp>
-        <p:nvSpPr>
-          <p:cNvPr id="18" name="Rectangle: Rounded Corners 17">
-            <a:extLst>
-              <a:ext uri="{FF2B5EF4-FFF2-40B4-BE49-F238E27FC236}">
-                <a16:creationId xmlns:a16="http://schemas.microsoft.com/office/drawing/2014/main" id="{A731C30A-EBB3-49DA-B2B0-29E66C74515A}"/>
-              </a:ext>
-            </a:extLst>
-          </p:cNvPr>
-          <p:cNvSpPr/>
-          <p:nvPr/>
-        </p:nvSpPr>
-        <p:spPr>
-          <a:xfrm>
-            <a:off x="3243179" y="1195817"/>
-            <a:ext cx="1331494" cy="689811"/>
-          </a:xfrm>
-          <a:prstGeom prst="roundRect">
-            <a:avLst/>
-          </a:prstGeom>
-          <a:solidFill>
-            <a:srgbClr val="E8718C"/>
-          </a:solidFill>
-        </p:spPr>
-        <p:style>
-          <a:lnRef idx="1">
-            <a:schemeClr val="accent6"/>
-          </a:lnRef>
-          <a:fillRef idx="2">
-            <a:schemeClr val="accent6"/>
-          </a:fillRef>
-          <a:effectRef idx="1">
-            <a:schemeClr val="accent6"/>
-          </a:effectRef>
-          <a:fontRef idx="minor">
-            <a:schemeClr val="dk1"/>
-          </a:fontRef>
-        </p:style>
-        <p:txBody>
-          <a:bodyPr rtlCol="0" anchor="ctr"/>
-          <a:lstStyle/>
-          <a:p>
-            <a:pPr algn="ctr"/>
-            <a:r>
-              <a:rPr lang="en-US" dirty="0">
-                <a:latin typeface="Times New Roman" panose="02020603050405020304" pitchFamily="18" charset="0"/>
-                <a:cs typeface="Times New Roman" panose="02020603050405020304" pitchFamily="18" charset="0"/>
-              </a:rPr>
-              <a:t>Protein 2</a:t>
-            </a:r>
-          </a:p>
-        </p:txBody>
-      </p:sp>
-      <p:sp>
-        <p:nvSpPr>
-          <p:cNvPr id="19" name="Rectangle: Rounded Corners 18">
-            <a:extLst>
-              <a:ext uri="{FF2B5EF4-FFF2-40B4-BE49-F238E27FC236}">
-                <a16:creationId xmlns:a16="http://schemas.microsoft.com/office/drawing/2014/main" id="{01C0B325-B647-42FD-9DF6-86FB03A66F36}"/>
-              </a:ext>
-            </a:extLst>
-          </p:cNvPr>
-          <p:cNvSpPr/>
-          <p:nvPr/>
-        </p:nvSpPr>
-        <p:spPr>
-          <a:xfrm>
-            <a:off x="3243179" y="2124254"/>
-            <a:ext cx="1331494" cy="689811"/>
-          </a:xfrm>
-          <a:prstGeom prst="roundRect">
-            <a:avLst/>
-          </a:prstGeom>
-          <a:solidFill>
-            <a:srgbClr val="E8718C"/>
-          </a:solidFill>
-        </p:spPr>
-        <p:style>
-          <a:lnRef idx="1">
-            <a:schemeClr val="accent6"/>
-          </a:lnRef>
-          <a:fillRef idx="2">
-            <a:schemeClr val="accent6"/>
-          </a:fillRef>
-          <a:effectRef idx="1">
-            <a:schemeClr val="accent6"/>
-          </a:effectRef>
-          <a:fontRef idx="minor">
-            <a:schemeClr val="dk1"/>
-          </a:fontRef>
-        </p:style>
-        <p:txBody>
-          <a:bodyPr rtlCol="0" anchor="ctr"/>
-          <a:lstStyle/>
-          <a:p>
-            <a:pPr algn="ctr"/>
-            <a:r>
-              <a:rPr lang="en-US" dirty="0">
-                <a:latin typeface="Times New Roman" panose="02020603050405020304" pitchFamily="18" charset="0"/>
-                <a:cs typeface="Times New Roman" panose="02020603050405020304" pitchFamily="18" charset="0"/>
-              </a:rPr>
-              <a:t>Protein 3</a:t>
-            </a:r>
-          </a:p>
-        </p:txBody>
-      </p:sp>
-      <p:sp>
-        <p:nvSpPr>
-          <p:cNvPr id="20" name="Rectangle: Rounded Corners 19">
-            <a:extLst>
-              <a:ext uri="{FF2B5EF4-FFF2-40B4-BE49-F238E27FC236}">
-                <a16:creationId xmlns:a16="http://schemas.microsoft.com/office/drawing/2014/main" id="{CE882CC2-DED2-4588-8310-A1638C54D91E}"/>
-              </a:ext>
-            </a:extLst>
-          </p:cNvPr>
-          <p:cNvSpPr/>
-          <p:nvPr/>
-        </p:nvSpPr>
-        <p:spPr>
-          <a:xfrm>
-            <a:off x="3243179" y="3335433"/>
-            <a:ext cx="1331494" cy="689811"/>
-          </a:xfrm>
-          <a:prstGeom prst="roundRect">
-            <a:avLst/>
-          </a:prstGeom>
-          <a:solidFill>
-            <a:srgbClr val="E8718C"/>
-          </a:solidFill>
-        </p:spPr>
-        <p:style>
-          <a:lnRef idx="1">
-            <a:schemeClr val="accent6"/>
-          </a:lnRef>
-          <a:fillRef idx="2">
-            <a:schemeClr val="accent6"/>
-          </a:fillRef>
-          <a:effectRef idx="1">
-            <a:schemeClr val="accent6"/>
-          </a:effectRef>
-          <a:fontRef idx="minor">
-            <a:schemeClr val="dk1"/>
-          </a:fontRef>
-        </p:style>
-        <p:txBody>
-          <a:bodyPr rtlCol="0" anchor="ctr"/>
-          <a:lstStyle/>
-          <a:p>
-            <a:pPr algn="ctr"/>
-            <a:r>
-              <a:rPr lang="en-US" dirty="0">
-                <a:latin typeface="Times New Roman" panose="02020603050405020304" pitchFamily="18" charset="0"/>
-                <a:cs typeface="Times New Roman" panose="02020603050405020304" pitchFamily="18" charset="0"/>
-              </a:rPr>
-              <a:t>Protein 4</a:t>
-            </a:r>
-          </a:p>
-        </p:txBody>
-      </p:sp>
-      <p:sp>
-        <p:nvSpPr>
-          <p:cNvPr id="23" name="Rectangle: Rounded Corners 22">
-            <a:extLst>
-              <a:ext uri="{FF2B5EF4-FFF2-40B4-BE49-F238E27FC236}">
-                <a16:creationId xmlns:a16="http://schemas.microsoft.com/office/drawing/2014/main" id="{36C5C4C5-FC9C-48A5-A1DE-D905C3DBCE48}"/>
-              </a:ext>
-            </a:extLst>
-          </p:cNvPr>
-          <p:cNvSpPr/>
-          <p:nvPr/>
-        </p:nvSpPr>
-        <p:spPr>
-          <a:xfrm>
-            <a:off x="3267241" y="4458381"/>
-            <a:ext cx="1331494" cy="689811"/>
-          </a:xfrm>
-          <a:prstGeom prst="roundRect">
-            <a:avLst/>
-          </a:prstGeom>
-          <a:solidFill>
-            <a:srgbClr val="E8718C"/>
-          </a:solidFill>
-        </p:spPr>
-        <p:style>
-          <a:lnRef idx="1">
-            <a:schemeClr val="accent6"/>
-          </a:lnRef>
-          <a:fillRef idx="2">
-            <a:schemeClr val="accent6"/>
-          </a:fillRef>
-          <a:effectRef idx="1">
-            <a:schemeClr val="accent6"/>
-          </a:effectRef>
-          <a:fontRef idx="minor">
-            <a:schemeClr val="dk1"/>
-          </a:fontRef>
-        </p:style>
-        <p:txBody>
-          <a:bodyPr rtlCol="0" anchor="ctr"/>
-          <a:lstStyle/>
-          <a:p>
-            <a:pPr algn="ctr"/>
-            <a:r>
-              <a:rPr lang="en-US" dirty="0">
-                <a:latin typeface="Times New Roman" panose="02020603050405020304" pitchFamily="18" charset="0"/>
-                <a:cs typeface="Times New Roman" panose="02020603050405020304" pitchFamily="18" charset="0"/>
-              </a:rPr>
-              <a:t>Protein 5</a:t>
-            </a:r>
-          </a:p>
-        </p:txBody>
-      </p:sp>
-      <p:cxnSp>
-        <p:nvCxnSpPr>
-          <p:cNvPr id="24" name="Straight Connector 23">
-            <a:extLst>
-              <a:ext uri="{FF2B5EF4-FFF2-40B4-BE49-F238E27FC236}">
-                <a16:creationId xmlns:a16="http://schemas.microsoft.com/office/drawing/2014/main" id="{9D72D191-D08D-492C-9F28-200093025CE2}"/>
-              </a:ext>
-            </a:extLst>
-          </p:cNvPr>
-          <p:cNvCxnSpPr>
-            <a:cxnSpLocks/>
-            <a:stCxn id="15" idx="3"/>
-            <a:endCxn id="17" idx="1"/>
-          </p:cNvCxnSpPr>
-          <p:nvPr/>
-        </p:nvCxnSpPr>
-        <p:spPr>
-          <a:xfrm flipV="1">
-            <a:off x="2104189" y="700516"/>
-            <a:ext cx="1138990" cy="950496"/>
-          </a:xfrm>
-          <a:prstGeom prst="line">
-            <a:avLst/>
-          </a:prstGeom>
-          <a:ln w="12700">
-            <a:solidFill>
-              <a:schemeClr val="tx1"/>
-            </a:solidFill>
-          </a:ln>
-        </p:spPr>
-        <p:style>
-          <a:lnRef idx="1">
-            <a:schemeClr val="accent1"/>
-          </a:lnRef>
-          <a:fillRef idx="0">
-            <a:schemeClr val="accent1"/>
-          </a:fillRef>
-          <a:effectRef idx="0">
-            <a:schemeClr val="accent1"/>
-          </a:effectRef>
-          <a:fontRef idx="minor">
-            <a:schemeClr val="tx1"/>
-          </a:fontRef>
-        </p:style>
-      </p:cxnSp>
-      <p:cxnSp>
-        <p:nvCxnSpPr>
-          <p:cNvPr id="25" name="Straight Connector 24">
-            <a:extLst>
-              <a:ext uri="{FF2B5EF4-FFF2-40B4-BE49-F238E27FC236}">
-                <a16:creationId xmlns:a16="http://schemas.microsoft.com/office/drawing/2014/main" id="{B3353CC8-5FAA-45E1-9BEC-BFFD7404E508}"/>
-              </a:ext>
-            </a:extLst>
-          </p:cNvPr>
-          <p:cNvCxnSpPr>
-            <a:cxnSpLocks/>
-            <a:stCxn id="15" idx="3"/>
-            <a:endCxn id="18" idx="1"/>
-          </p:cNvCxnSpPr>
-          <p:nvPr/>
-        </p:nvCxnSpPr>
-        <p:spPr>
-          <a:xfrm flipV="1">
-            <a:off x="2104189" y="1540723"/>
-            <a:ext cx="1138990" cy="110291"/>
-          </a:xfrm>
-          <a:prstGeom prst="line">
-            <a:avLst/>
-          </a:prstGeom>
-          <a:ln w="12700">
-            <a:solidFill>
-              <a:schemeClr val="tx1"/>
-            </a:solidFill>
-          </a:ln>
-        </p:spPr>
-        <p:style>
-          <a:lnRef idx="1">
-            <a:schemeClr val="accent1"/>
-          </a:lnRef>
-          <a:fillRef idx="0">
-            <a:schemeClr val="accent1"/>
-          </a:fillRef>
-          <a:effectRef idx="0">
-            <a:schemeClr val="accent1"/>
-          </a:effectRef>
-          <a:fontRef idx="minor">
-            <a:schemeClr val="tx1"/>
-          </a:fontRef>
-        </p:style>
-      </p:cxnSp>
-      <p:cxnSp>
-        <p:nvCxnSpPr>
-          <p:cNvPr id="26" name="Straight Connector 25">
-            <a:extLst>
-              <a:ext uri="{FF2B5EF4-FFF2-40B4-BE49-F238E27FC236}">
-                <a16:creationId xmlns:a16="http://schemas.microsoft.com/office/drawing/2014/main" id="{4C9E03E7-3A38-4CAD-970C-9FFAF5851D49}"/>
-              </a:ext>
-            </a:extLst>
-          </p:cNvPr>
-          <p:cNvCxnSpPr>
-            <a:cxnSpLocks/>
-            <a:stCxn id="15" idx="3"/>
-            <a:endCxn id="19" idx="1"/>
-          </p:cNvCxnSpPr>
-          <p:nvPr/>
-        </p:nvCxnSpPr>
-        <p:spPr>
-          <a:xfrm>
-            <a:off x="2104189" y="1651012"/>
-            <a:ext cx="1138990" cy="818146"/>
-          </a:xfrm>
-          <a:prstGeom prst="line">
-            <a:avLst/>
-          </a:prstGeom>
-          <a:ln w="12700">
-            <a:solidFill>
-              <a:schemeClr val="tx1"/>
-            </a:solidFill>
-          </a:ln>
-        </p:spPr>
-        <p:style>
-          <a:lnRef idx="1">
-            <a:schemeClr val="accent1"/>
-          </a:lnRef>
-          <a:fillRef idx="0">
-            <a:schemeClr val="accent1"/>
-          </a:fillRef>
-          <a:effectRef idx="0">
-            <a:schemeClr val="accent1"/>
-          </a:effectRef>
-          <a:fontRef idx="minor">
-            <a:schemeClr val="tx1"/>
-          </a:fontRef>
-        </p:style>
-      </p:cxnSp>
-      <p:cxnSp>
-        <p:nvCxnSpPr>
-          <p:cNvPr id="27" name="Straight Connector 26">
-            <a:extLst>
-              <a:ext uri="{FF2B5EF4-FFF2-40B4-BE49-F238E27FC236}">
-                <a16:creationId xmlns:a16="http://schemas.microsoft.com/office/drawing/2014/main" id="{FA52F54B-F03B-4FF7-9E25-91A8891D33F0}"/>
-              </a:ext>
-            </a:extLst>
-          </p:cNvPr>
-          <p:cNvCxnSpPr>
-            <a:cxnSpLocks/>
-            <a:endCxn id="20" idx="1"/>
-          </p:cNvCxnSpPr>
-          <p:nvPr/>
-        </p:nvCxnSpPr>
-        <p:spPr>
-          <a:xfrm flipV="1">
-            <a:off x="2104189" y="3680337"/>
-            <a:ext cx="1138990" cy="549444"/>
-          </a:xfrm>
-          <a:prstGeom prst="line">
-            <a:avLst/>
-          </a:prstGeom>
-          <a:ln w="12700">
-            <a:solidFill>
-              <a:schemeClr val="tx1"/>
-            </a:solidFill>
-          </a:ln>
-        </p:spPr>
-        <p:style>
-          <a:lnRef idx="1">
-            <a:schemeClr val="accent1"/>
-          </a:lnRef>
-          <a:fillRef idx="0">
-            <a:schemeClr val="accent1"/>
-          </a:fillRef>
-          <a:effectRef idx="0">
-            <a:schemeClr val="accent1"/>
-          </a:effectRef>
-          <a:fontRef idx="minor">
-            <a:schemeClr val="tx1"/>
-          </a:fontRef>
-        </p:style>
-      </p:cxnSp>
-      <p:cxnSp>
-        <p:nvCxnSpPr>
-          <p:cNvPr id="28" name="Straight Connector 27">
-            <a:extLst>
-              <a:ext uri="{FF2B5EF4-FFF2-40B4-BE49-F238E27FC236}">
-                <a16:creationId xmlns:a16="http://schemas.microsoft.com/office/drawing/2014/main" id="{889DFE9C-5A90-4324-8F92-7EACDDEF7463}"/>
-              </a:ext>
-            </a:extLst>
-          </p:cNvPr>
-          <p:cNvCxnSpPr>
-            <a:cxnSpLocks/>
-            <a:stCxn id="16" idx="3"/>
-            <a:endCxn id="23" idx="1"/>
-          </p:cNvCxnSpPr>
-          <p:nvPr/>
-        </p:nvCxnSpPr>
-        <p:spPr>
-          <a:xfrm>
-            <a:off x="2104189" y="4253846"/>
-            <a:ext cx="1163052" cy="549441"/>
-          </a:xfrm>
-          <a:prstGeom prst="line">
-            <a:avLst/>
-          </a:prstGeom>
-          <a:ln w="12700">
-            <a:solidFill>
-              <a:schemeClr val="tx1"/>
-            </a:solidFill>
-          </a:ln>
-        </p:spPr>
-        <p:style>
-          <a:lnRef idx="1">
-            <a:schemeClr val="accent1"/>
-          </a:lnRef>
-          <a:fillRef idx="0">
-            <a:schemeClr val="accent1"/>
-          </a:fillRef>
-          <a:effectRef idx="0">
-            <a:schemeClr val="accent1"/>
-          </a:effectRef>
-          <a:fontRef idx="minor">
-            <a:schemeClr val="tx1"/>
-          </a:fontRef>
-        </p:style>
-      </p:cxnSp>
-      <p:sp>
-        <p:nvSpPr>
-          <p:cNvPr id="29" name="Rectangle 28">
-            <a:extLst>
-              <a:ext uri="{FF2B5EF4-FFF2-40B4-BE49-F238E27FC236}">
-                <a16:creationId xmlns:a16="http://schemas.microsoft.com/office/drawing/2014/main" id="{08741EFD-358F-4851-92AC-B8F0103C5422}"/>
-              </a:ext>
-            </a:extLst>
-          </p:cNvPr>
-          <p:cNvSpPr/>
-          <p:nvPr/>
-        </p:nvSpPr>
-        <p:spPr>
-          <a:xfrm>
-            <a:off x="2054061" y="2732850"/>
-            <a:ext cx="986589" cy="543426"/>
+            <a:off x="200209" y="137363"/>
+            <a:ext cx="407484" cy="461665"/>
           </a:xfrm>
           <a:prstGeom prst="rect">
             <a:avLst/>
           </a:prstGeom>
           <a:noFill/>
-          <a:ln w="9525" cap="flat" cmpd="sng" algn="ctr">
-            <a:solidFill>
-              <a:schemeClr val="tx1"/>
-            </a:solidFill>
-            <a:prstDash val="solid"/>
-            <a:round/>
-            <a:headEnd type="none" w="med" len="med"/>
-            <a:tailEnd type="none" w="med" len="med"/>
-          </a:ln>
         </p:spPr>
-        <p:style>
-          <a:lnRef idx="0">
-            <a:scrgbClr r="0" g="0" b="0"/>
-          </a:lnRef>
-          <a:fillRef idx="0">
-            <a:scrgbClr r="0" g="0" b="0"/>
-          </a:fillRef>
-          <a:effectRef idx="0">
-            <a:scrgbClr r="0" g="0" b="0"/>
-          </a:effectRef>
-          <a:fontRef idx="minor">
-            <a:schemeClr val="accent5"/>
-          </a:fontRef>
-        </p:style>
-        <p:txBody>
-          <a:bodyPr rtlCol="0" anchor="ctr"/>
+        <p:txBody>
+          <a:bodyPr wrap="none" rtlCol="0">
+            <a:spAutoFit/>
+          </a:bodyPr>
           <a:lstStyle/>
           <a:p>
-            <a:pPr algn="ctr"/>
-            <a:r>
-              <a:rPr lang="en-US" dirty="0">
+            <a:r>
+              <a:rPr lang="en-US" sz="2400" b="1" dirty="0">
+                <a:latin typeface="Times New Roman" panose="02020603050405020304" pitchFamily="18" charset="0"/>
+                <a:cs typeface="Times New Roman" panose="02020603050405020304" pitchFamily="18" charset="0"/>
+              </a:rPr>
+              <a:t>A</a:t>
+            </a:r>
+          </a:p>
+        </p:txBody>
+      </p:sp>
+      <p:sp>
+        <p:nvSpPr>
+          <p:cNvPr id="37" name="TextBox 36">
+            <a:extLst>
+              <a:ext uri="{FF2B5EF4-FFF2-40B4-BE49-F238E27FC236}">
+                <a16:creationId xmlns:a16="http://schemas.microsoft.com/office/drawing/2014/main" id="{B11E5811-2BA3-4B5B-8774-8468A2E229FE}"/>
+              </a:ext>
+            </a:extLst>
+          </p:cNvPr>
+          <p:cNvSpPr txBox="1"/>
+          <p:nvPr/>
+        </p:nvSpPr>
+        <p:spPr>
+          <a:xfrm>
+            <a:off x="5178414" y="137363"/>
+            <a:ext cx="389850" cy="461665"/>
+          </a:xfrm>
+          <a:prstGeom prst="rect">
+            <a:avLst/>
+          </a:prstGeom>
+          <a:noFill/>
+        </p:spPr>
+        <p:txBody>
+          <a:bodyPr wrap="none" rtlCol="0">
+            <a:spAutoFit/>
+          </a:bodyPr>
+          <a:lstStyle/>
+          <a:p>
+            <a:r>
+              <a:rPr lang="en-US" sz="2400" b="1" dirty="0">
+                <a:latin typeface="Times New Roman" panose="02020603050405020304" pitchFamily="18" charset="0"/>
+                <a:cs typeface="Times New Roman" panose="02020603050405020304" pitchFamily="18" charset="0"/>
+              </a:rPr>
+              <a:t>B</a:t>
+            </a:r>
+          </a:p>
+        </p:txBody>
+      </p:sp>
+      <p:grpSp>
+        <p:nvGrpSpPr>
+          <p:cNvPr id="38" name="Group 37">
+            <a:extLst>
+              <a:ext uri="{FF2B5EF4-FFF2-40B4-BE49-F238E27FC236}">
+                <a16:creationId xmlns:a16="http://schemas.microsoft.com/office/drawing/2014/main" id="{EFB80EFC-6BAE-4B74-BE73-CAAC857B02A5}"/>
+              </a:ext>
+            </a:extLst>
+          </p:cNvPr>
+          <p:cNvGrpSpPr/>
+          <p:nvPr/>
+        </p:nvGrpSpPr>
+        <p:grpSpPr>
+          <a:xfrm>
+            <a:off x="1956308" y="53894"/>
+            <a:ext cx="2504214" cy="5187216"/>
+            <a:chOff x="1107542" y="-41227"/>
+            <a:chExt cx="2479589" cy="9178313"/>
+          </a:xfrm>
+        </p:grpSpPr>
+        <p:pic>
+          <p:nvPicPr>
+            <p:cNvPr id="39" name="Picture 38">
+              <a:extLst>
+                <a:ext uri="{FF2B5EF4-FFF2-40B4-BE49-F238E27FC236}">
+                  <a16:creationId xmlns:a16="http://schemas.microsoft.com/office/drawing/2014/main" id="{E8DEE3B2-E04C-4186-867C-4C423194FA78}"/>
+                </a:ext>
+              </a:extLst>
+            </p:cNvPr>
+            <p:cNvPicPr>
+              <a:picLocks noChangeAspect="1"/>
+            </p:cNvPicPr>
+            <p:nvPr/>
+          </p:nvPicPr>
+          <p:blipFill>
+            <a:blip r:embed="rId2"/>
+            <a:stretch>
+              <a:fillRect/>
+            </a:stretch>
+          </p:blipFill>
+          <p:spPr>
+            <a:xfrm>
+              <a:off x="1753796" y="-41227"/>
+              <a:ext cx="1128281" cy="1307046"/>
+            </a:xfrm>
+            <a:prstGeom prst="rect">
+              <a:avLst/>
+            </a:prstGeom>
+          </p:spPr>
+        </p:pic>
+        <p:pic>
+          <p:nvPicPr>
+            <p:cNvPr id="40" name="Picture 39">
+              <a:extLst>
+                <a:ext uri="{FF2B5EF4-FFF2-40B4-BE49-F238E27FC236}">
+                  <a16:creationId xmlns:a16="http://schemas.microsoft.com/office/drawing/2014/main" id="{516CCF2C-3DA2-4BF0-A417-3793801EDCCB}"/>
+                </a:ext>
+              </a:extLst>
+            </p:cNvPr>
+            <p:cNvPicPr>
+              <a:picLocks noChangeAspect="1"/>
+            </p:cNvPicPr>
+            <p:nvPr/>
+          </p:nvPicPr>
+          <p:blipFill>
+            <a:blip r:embed="rId2"/>
+            <a:stretch>
+              <a:fillRect/>
+            </a:stretch>
+          </p:blipFill>
+          <p:spPr>
+            <a:xfrm>
+              <a:off x="1859577" y="7368567"/>
+              <a:ext cx="1005517" cy="1299011"/>
+            </a:xfrm>
+            <a:prstGeom prst="rect">
+              <a:avLst/>
+            </a:prstGeom>
+          </p:spPr>
+        </p:pic>
+        <p:sp>
+          <p:nvSpPr>
+            <p:cNvPr id="41" name="Flowchart: Manual Operation 40">
+              <a:extLst>
+                <a:ext uri="{FF2B5EF4-FFF2-40B4-BE49-F238E27FC236}">
+                  <a16:creationId xmlns:a16="http://schemas.microsoft.com/office/drawing/2014/main" id="{4979E676-C701-42B9-BE89-82C6ADB020A9}"/>
+                </a:ext>
+              </a:extLst>
+            </p:cNvPr>
+            <p:cNvSpPr/>
+            <p:nvPr/>
+          </p:nvSpPr>
+          <p:spPr>
+            <a:xfrm>
+              <a:off x="1443235" y="2226548"/>
+              <a:ext cx="1808207" cy="1290820"/>
+            </a:xfrm>
+            <a:prstGeom prst="flowChartManualOperation">
+              <a:avLst/>
+            </a:prstGeom>
+            <a:noFill/>
+            <a:ln>
+              <a:solidFill>
+                <a:schemeClr val="tx1"/>
+              </a:solidFill>
+            </a:ln>
+          </p:spPr>
+          <p:style>
+            <a:lnRef idx="2">
+              <a:schemeClr val="accent1">
+                <a:shade val="50000"/>
+              </a:schemeClr>
+            </a:lnRef>
+            <a:fillRef idx="1">
+              <a:schemeClr val="accent1"/>
+            </a:fillRef>
+            <a:effectRef idx="0">
+              <a:schemeClr val="accent1"/>
+            </a:effectRef>
+            <a:fontRef idx="minor">
+              <a:schemeClr val="lt1"/>
+            </a:fontRef>
+          </p:style>
+          <p:txBody>
+            <a:bodyPr rtlCol="0" anchor="ctr"/>
+            <a:lstStyle/>
+            <a:p>
+              <a:pPr algn="ctr"/>
+              <a:r>
+                <a:rPr lang="en-US" sz="1400" dirty="0">
+                  <a:solidFill>
+                    <a:schemeClr val="tx1"/>
+                  </a:solidFill>
+                  <a:latin typeface="Times New Roman" panose="02020603050405020304" pitchFamily="18" charset="0"/>
+                  <a:cs typeface="Times New Roman" panose="02020603050405020304" pitchFamily="18" charset="0"/>
+                </a:rPr>
+                <a:t>Encoder Neural Network</a:t>
+              </a:r>
+            </a:p>
+          </p:txBody>
+        </p:sp>
+        <p:sp>
+          <p:nvSpPr>
+            <p:cNvPr id="42" name="Rectangle: Rounded Corners 41">
+              <a:extLst>
+                <a:ext uri="{FF2B5EF4-FFF2-40B4-BE49-F238E27FC236}">
+                  <a16:creationId xmlns:a16="http://schemas.microsoft.com/office/drawing/2014/main" id="{7D9751D7-3CEF-4B23-AE59-225DA17A8761}"/>
+                </a:ext>
+              </a:extLst>
+            </p:cNvPr>
+            <p:cNvSpPr/>
+            <p:nvPr/>
+          </p:nvSpPr>
+          <p:spPr>
+            <a:xfrm>
+              <a:off x="1107542" y="3968997"/>
+              <a:ext cx="2479589" cy="1290820"/>
+            </a:xfrm>
+            <a:prstGeom prst="roundRect">
+              <a:avLst/>
+            </a:prstGeom>
+            <a:noFill/>
+            <a:ln>
+              <a:solidFill>
+                <a:schemeClr val="tx1"/>
+              </a:solidFill>
+            </a:ln>
+          </p:spPr>
+          <p:style>
+            <a:lnRef idx="2">
+              <a:schemeClr val="accent1">
+                <a:shade val="50000"/>
+              </a:schemeClr>
+            </a:lnRef>
+            <a:fillRef idx="1">
+              <a:schemeClr val="accent1"/>
+            </a:fillRef>
+            <a:effectRef idx="0">
+              <a:schemeClr val="accent1"/>
+            </a:effectRef>
+            <a:fontRef idx="minor">
+              <a:schemeClr val="lt1"/>
+            </a:fontRef>
+          </p:style>
+          <p:txBody>
+            <a:bodyPr rtlCol="0" anchor="ctr"/>
+            <a:lstStyle/>
+            <a:p>
+              <a:pPr algn="ctr"/>
+              <a:r>
+                <a:rPr lang="en-US" sz="1400" dirty="0">
+                  <a:solidFill>
+                    <a:schemeClr val="tx1"/>
+                  </a:solidFill>
+                </a:rPr>
+                <a:t>Latent Representation (Embeddings)</a:t>
+              </a:r>
+            </a:p>
+          </p:txBody>
+        </p:sp>
+        <p:sp>
+          <p:nvSpPr>
+            <p:cNvPr id="43" name="Flowchart: Manual Operation 42">
+              <a:extLst>
+                <a:ext uri="{FF2B5EF4-FFF2-40B4-BE49-F238E27FC236}">
+                  <a16:creationId xmlns:a16="http://schemas.microsoft.com/office/drawing/2014/main" id="{97131406-6E4F-4372-B9CA-189C3321C0BC}"/>
+                </a:ext>
+              </a:extLst>
+            </p:cNvPr>
+            <p:cNvSpPr/>
+            <p:nvPr/>
+          </p:nvSpPr>
+          <p:spPr>
+            <a:xfrm rot="10800000">
+              <a:off x="1443232" y="5690580"/>
+              <a:ext cx="1808207" cy="1290820"/>
+            </a:xfrm>
+            <a:prstGeom prst="flowChartManualOperation">
+              <a:avLst/>
+            </a:prstGeom>
+            <a:noFill/>
+            <a:ln>
+              <a:solidFill>
+                <a:schemeClr val="tx1"/>
+              </a:solidFill>
+            </a:ln>
+          </p:spPr>
+          <p:style>
+            <a:lnRef idx="2">
+              <a:schemeClr val="accent1">
+                <a:shade val="50000"/>
+              </a:schemeClr>
+            </a:lnRef>
+            <a:fillRef idx="1">
+              <a:schemeClr val="accent1"/>
+            </a:fillRef>
+            <a:effectRef idx="0">
+              <a:schemeClr val="accent1"/>
+            </a:effectRef>
+            <a:fontRef idx="minor">
+              <a:schemeClr val="lt1"/>
+            </a:fontRef>
+          </p:style>
+          <p:txBody>
+            <a:bodyPr rtlCol="0" anchor="ctr"/>
+            <a:lstStyle/>
+            <a:p>
+              <a:pPr algn="ctr"/>
+              <a:endParaRPr lang="en-US" dirty="0">
                 <a:solidFill>
                   <a:schemeClr val="tx1"/>
                 </a:solidFill>
                 <a:latin typeface="Times New Roman" panose="02020603050405020304" pitchFamily="18" charset="0"/>
                 <a:cs typeface="Times New Roman" panose="02020603050405020304" pitchFamily="18" charset="0"/>
-              </a:rPr>
-              <a:t>Binding Pairs</a:t>
-            </a:r>
-          </a:p>
-        </p:txBody>
-      </p:sp>
-      <p:sp>
-        <p:nvSpPr>
-          <p:cNvPr id="30" name="Rectangle 29">
-            <a:extLst>
-              <a:ext uri="{FF2B5EF4-FFF2-40B4-BE49-F238E27FC236}">
-                <a16:creationId xmlns:a16="http://schemas.microsoft.com/office/drawing/2014/main" id="{9ADAFA37-E93D-491D-B7D6-08FEB9BD9A5A}"/>
-              </a:ext>
-            </a:extLst>
-          </p:cNvPr>
-          <p:cNvSpPr/>
-          <p:nvPr/>
-        </p:nvSpPr>
-        <p:spPr>
-          <a:xfrm>
-            <a:off x="5184276" y="1206844"/>
-            <a:ext cx="3368843" cy="778044"/>
-          </a:xfrm>
-          <a:prstGeom prst="rect">
-            <a:avLst/>
-          </a:prstGeom>
-          <a:noFill/>
-          <a:ln w="9525" cap="flat" cmpd="sng" algn="ctr">
-            <a:solidFill>
-              <a:schemeClr val="tx1"/>
-            </a:solidFill>
-            <a:prstDash val="solid"/>
-            <a:round/>
-            <a:headEnd type="none" w="med" len="med"/>
-            <a:tailEnd type="none" w="med" len="med"/>
-          </a:ln>
-        </p:spPr>
-        <p:style>
-          <a:lnRef idx="0">
-            <a:scrgbClr r="0" g="0" b="0"/>
-          </a:lnRef>
-          <a:fillRef idx="0">
-            <a:scrgbClr r="0" g="0" b="0"/>
-          </a:fillRef>
-          <a:effectRef idx="0">
-            <a:scrgbClr r="0" g="0" b="0"/>
-          </a:effectRef>
-          <a:fontRef idx="minor">
-            <a:schemeClr val="accent6"/>
-          </a:fontRef>
-        </p:style>
-        <p:txBody>
-          <a:bodyPr rtlCol="0" anchor="ctr"/>
-          <a:lstStyle/>
-          <a:p>
-            <a:pPr algn="ctr"/>
-            <a:r>
-              <a:rPr lang="en-US" dirty="0">
-                <a:latin typeface="Times New Roman" panose="02020603050405020304" pitchFamily="18" charset="0"/>
-                <a:cs typeface="Times New Roman" panose="02020603050405020304" pitchFamily="18" charset="0"/>
-              </a:rPr>
-              <a:t>Maximize the similarities between proteins 1, 2, and 3</a:t>
-            </a:r>
-          </a:p>
-        </p:txBody>
-      </p:sp>
-      <p:cxnSp>
-        <p:nvCxnSpPr>
-          <p:cNvPr id="31" name="Straight Connector 30">
-            <a:extLst>
-              <a:ext uri="{FF2B5EF4-FFF2-40B4-BE49-F238E27FC236}">
-                <a16:creationId xmlns:a16="http://schemas.microsoft.com/office/drawing/2014/main" id="{15B681BB-0149-49FE-AD6F-65211E875C25}"/>
-              </a:ext>
-            </a:extLst>
-          </p:cNvPr>
-          <p:cNvCxnSpPr>
-            <a:endCxn id="30" idx="1"/>
-          </p:cNvCxnSpPr>
-          <p:nvPr/>
-        </p:nvCxnSpPr>
-        <p:spPr>
-          <a:xfrm>
-            <a:off x="4598737" y="296455"/>
-            <a:ext cx="585539" cy="1299411"/>
-          </a:xfrm>
-          <a:prstGeom prst="line">
-            <a:avLst/>
-          </a:prstGeom>
-          <a:ln>
-            <a:solidFill>
-              <a:schemeClr val="tx1"/>
-            </a:solidFill>
-          </a:ln>
-        </p:spPr>
-        <p:style>
-          <a:lnRef idx="1">
-            <a:schemeClr val="accent6"/>
-          </a:lnRef>
-          <a:fillRef idx="0">
-            <a:schemeClr val="accent6"/>
-          </a:fillRef>
-          <a:effectRef idx="0">
-            <a:schemeClr val="accent6"/>
-          </a:effectRef>
-          <a:fontRef idx="minor">
-            <a:schemeClr val="tx1"/>
-          </a:fontRef>
-        </p:style>
-      </p:cxnSp>
-      <p:cxnSp>
-        <p:nvCxnSpPr>
-          <p:cNvPr id="32" name="Straight Connector 31">
-            <a:extLst>
-              <a:ext uri="{FF2B5EF4-FFF2-40B4-BE49-F238E27FC236}">
-                <a16:creationId xmlns:a16="http://schemas.microsoft.com/office/drawing/2014/main" id="{5DC825E2-B990-4F8F-AEED-6223D49F3E5D}"/>
-              </a:ext>
-            </a:extLst>
-          </p:cNvPr>
-          <p:cNvCxnSpPr>
-            <a:cxnSpLocks/>
-            <a:endCxn id="30" idx="1"/>
-          </p:cNvCxnSpPr>
-          <p:nvPr/>
-        </p:nvCxnSpPr>
-        <p:spPr>
-          <a:xfrm flipV="1">
-            <a:off x="4634833" y="1595866"/>
-            <a:ext cx="549443" cy="1299412"/>
-          </a:xfrm>
-          <a:prstGeom prst="line">
-            <a:avLst/>
-          </a:prstGeom>
-          <a:ln>
-            <a:solidFill>
-              <a:schemeClr val="tx1"/>
-            </a:solidFill>
-          </a:ln>
-        </p:spPr>
-        <p:style>
-          <a:lnRef idx="1">
-            <a:schemeClr val="accent6"/>
-          </a:lnRef>
-          <a:fillRef idx="0">
-            <a:schemeClr val="accent6"/>
-          </a:fillRef>
-          <a:effectRef idx="0">
-            <a:schemeClr val="accent6"/>
-          </a:effectRef>
-          <a:fontRef idx="minor">
-            <a:schemeClr val="tx1"/>
-          </a:fontRef>
-        </p:style>
-      </p:cxnSp>
-      <p:sp>
-        <p:nvSpPr>
-          <p:cNvPr id="33" name="Rectangle 32">
-            <a:extLst>
-              <a:ext uri="{FF2B5EF4-FFF2-40B4-BE49-F238E27FC236}">
-                <a16:creationId xmlns:a16="http://schemas.microsoft.com/office/drawing/2014/main" id="{F2D1D0A2-970E-45AF-82F8-B824F7CCC2A5}"/>
-              </a:ext>
-            </a:extLst>
-          </p:cNvPr>
-          <p:cNvSpPr/>
-          <p:nvPr/>
-        </p:nvSpPr>
-        <p:spPr>
-          <a:xfrm>
-            <a:off x="5184275" y="3750520"/>
-            <a:ext cx="3368843" cy="778044"/>
-          </a:xfrm>
-          <a:prstGeom prst="rect">
-            <a:avLst/>
-          </a:prstGeom>
-          <a:noFill/>
-          <a:ln w="9525" cap="flat" cmpd="sng" algn="ctr">
-            <a:solidFill>
-              <a:schemeClr val="tx1"/>
-            </a:solidFill>
-            <a:prstDash val="solid"/>
-            <a:round/>
-            <a:headEnd type="none" w="med" len="med"/>
-            <a:tailEnd type="none" w="med" len="med"/>
-          </a:ln>
-        </p:spPr>
-        <p:style>
-          <a:lnRef idx="0">
-            <a:scrgbClr r="0" g="0" b="0"/>
-          </a:lnRef>
-          <a:fillRef idx="0">
-            <a:scrgbClr r="0" g="0" b="0"/>
-          </a:fillRef>
-          <a:effectRef idx="0">
-            <a:scrgbClr r="0" g="0" b="0"/>
-          </a:effectRef>
-          <a:fontRef idx="minor">
-            <a:schemeClr val="accent5"/>
-          </a:fontRef>
-        </p:style>
-        <p:txBody>
-          <a:bodyPr rtlCol="0" anchor="ctr"/>
-          <a:lstStyle/>
-          <a:p>
-            <a:pPr algn="ctr"/>
-            <a:r>
-              <a:rPr lang="en-US" dirty="0">
-                <a:solidFill>
-                  <a:schemeClr val="accent6"/>
-                </a:solidFill>
-                <a:latin typeface="Times New Roman" panose="02020603050405020304" pitchFamily="18" charset="0"/>
-                <a:cs typeface="Times New Roman" panose="02020603050405020304" pitchFamily="18" charset="0"/>
-              </a:rPr>
-              <a:t>Maximize the similarities between proteins 1, 2, and 3</a:t>
-            </a:r>
-          </a:p>
-        </p:txBody>
-      </p:sp>
-      <p:cxnSp>
-        <p:nvCxnSpPr>
-          <p:cNvPr id="34" name="Straight Connector 33">
-            <a:extLst>
-              <a:ext uri="{FF2B5EF4-FFF2-40B4-BE49-F238E27FC236}">
-                <a16:creationId xmlns:a16="http://schemas.microsoft.com/office/drawing/2014/main" id="{E82B51CE-55A4-419A-BCEC-C5CAC91FD7DC}"/>
-              </a:ext>
-            </a:extLst>
-          </p:cNvPr>
-          <p:cNvCxnSpPr>
-            <a:cxnSpLocks/>
-            <a:endCxn id="33" idx="1"/>
-          </p:cNvCxnSpPr>
-          <p:nvPr/>
-        </p:nvCxnSpPr>
-        <p:spPr>
-          <a:xfrm>
-            <a:off x="4574673" y="3240182"/>
-            <a:ext cx="609600" cy="899360"/>
-          </a:xfrm>
-          <a:prstGeom prst="line">
-            <a:avLst/>
-          </a:prstGeom>
-          <a:ln>
-            <a:solidFill>
-              <a:schemeClr val="tx1"/>
-            </a:solidFill>
-          </a:ln>
-        </p:spPr>
-        <p:style>
-          <a:lnRef idx="1">
-            <a:schemeClr val="accent5"/>
-          </a:lnRef>
-          <a:fillRef idx="0">
-            <a:schemeClr val="accent5"/>
-          </a:fillRef>
-          <a:effectRef idx="0">
-            <a:schemeClr val="accent5"/>
-          </a:effectRef>
-          <a:fontRef idx="minor">
-            <a:schemeClr val="tx1"/>
-          </a:fontRef>
-        </p:style>
-      </p:cxnSp>
-      <p:cxnSp>
-        <p:nvCxnSpPr>
-          <p:cNvPr id="35" name="Straight Connector 34">
-            <a:extLst>
-              <a:ext uri="{FF2B5EF4-FFF2-40B4-BE49-F238E27FC236}">
-                <a16:creationId xmlns:a16="http://schemas.microsoft.com/office/drawing/2014/main" id="{00F20CBC-BCB3-4E26-A919-AD92D2312C98}"/>
-              </a:ext>
-            </a:extLst>
-          </p:cNvPr>
-          <p:cNvCxnSpPr>
-            <a:cxnSpLocks/>
-            <a:endCxn id="33" idx="1"/>
-          </p:cNvCxnSpPr>
-          <p:nvPr/>
-        </p:nvCxnSpPr>
-        <p:spPr>
-          <a:xfrm flipV="1">
-            <a:off x="4622802" y="4139542"/>
-            <a:ext cx="561473" cy="1116932"/>
-          </a:xfrm>
-          <a:prstGeom prst="line">
-            <a:avLst/>
-          </a:prstGeom>
-          <a:ln>
-            <a:solidFill>
-              <a:schemeClr val="tx1"/>
-            </a:solidFill>
-          </a:ln>
-        </p:spPr>
-        <p:style>
-          <a:lnRef idx="1">
-            <a:schemeClr val="accent5"/>
-          </a:lnRef>
-          <a:fillRef idx="0">
-            <a:schemeClr val="accent5"/>
-          </a:fillRef>
-          <a:effectRef idx="0">
-            <a:schemeClr val="accent5"/>
-          </a:effectRef>
-          <a:fontRef idx="minor">
-            <a:schemeClr val="tx1"/>
-          </a:fontRef>
-        </p:style>
-      </p:cxnSp>
-      <p:sp>
-        <p:nvSpPr>
-          <p:cNvPr id="36" name="Rectangle 35">
-            <a:extLst>
-              <a:ext uri="{FF2B5EF4-FFF2-40B4-BE49-F238E27FC236}">
-                <a16:creationId xmlns:a16="http://schemas.microsoft.com/office/drawing/2014/main" id="{5E73B5D1-F28C-4723-8EB0-5CA658B1DC79}"/>
-              </a:ext>
-            </a:extLst>
-          </p:cNvPr>
-          <p:cNvSpPr/>
-          <p:nvPr/>
-        </p:nvSpPr>
-        <p:spPr>
-          <a:xfrm>
-            <a:off x="5184275" y="2434570"/>
-            <a:ext cx="3565357" cy="899359"/>
-          </a:xfrm>
-          <a:prstGeom prst="rect">
-            <a:avLst/>
-          </a:prstGeom>
-          <a:noFill/>
-          <a:ln w="9525" cap="flat" cmpd="sng" algn="ctr">
-            <a:solidFill>
-              <a:schemeClr val="tx1"/>
-            </a:solidFill>
-            <a:prstDash val="solid"/>
-            <a:round/>
-            <a:headEnd type="none" w="med" len="med"/>
-            <a:tailEnd type="none" w="med" len="med"/>
-          </a:ln>
-        </p:spPr>
-        <p:style>
-          <a:lnRef idx="0">
-            <a:scrgbClr r="0" g="0" b="0"/>
-          </a:lnRef>
-          <a:fillRef idx="0">
-            <a:scrgbClr r="0" g="0" b="0"/>
-          </a:fillRef>
-          <a:effectRef idx="0">
-            <a:scrgbClr r="0" g="0" b="0"/>
-          </a:effectRef>
-          <a:fontRef idx="minor">
-            <a:schemeClr val="accent2"/>
-          </a:fontRef>
-        </p:style>
-        <p:txBody>
-          <a:bodyPr rtlCol="0" anchor="ctr"/>
-          <a:lstStyle/>
-          <a:p>
-            <a:pPr algn="ctr"/>
-            <a:r>
-              <a:rPr lang="en-US" dirty="0">
-                <a:solidFill>
-                  <a:schemeClr val="tx1"/>
-                </a:solidFill>
-                <a:latin typeface="Times New Roman" panose="02020603050405020304" pitchFamily="18" charset="0"/>
-                <a:cs typeface="Times New Roman" panose="02020603050405020304" pitchFamily="18" charset="0"/>
-              </a:rPr>
-              <a:t>Maximize the dissimilarities between proteins (1, 2, 3) and (4,5)</a:t>
-            </a:r>
-          </a:p>
-        </p:txBody>
-      </p:sp>
+              </a:endParaRPr>
+            </a:p>
+          </p:txBody>
+        </p:sp>
+        <p:sp>
+          <p:nvSpPr>
+            <p:cNvPr id="44" name="TextBox 43">
+              <a:extLst>
+                <a:ext uri="{FF2B5EF4-FFF2-40B4-BE49-F238E27FC236}">
+                  <a16:creationId xmlns:a16="http://schemas.microsoft.com/office/drawing/2014/main" id="{DE1403C8-AE11-4632-8380-6E5C82CE4778}"/>
+                </a:ext>
+              </a:extLst>
+            </p:cNvPr>
+            <p:cNvSpPr txBox="1"/>
+            <p:nvPr/>
+          </p:nvSpPr>
+          <p:spPr>
+            <a:xfrm>
+              <a:off x="1948954" y="5674258"/>
+              <a:ext cx="1108015" cy="1307000"/>
+            </a:xfrm>
+            <a:prstGeom prst="rect">
+              <a:avLst/>
+            </a:prstGeom>
+            <a:noFill/>
+          </p:spPr>
+          <p:txBody>
+            <a:bodyPr wrap="square" rtlCol="0">
+              <a:spAutoFit/>
+            </a:bodyPr>
+            <a:lstStyle/>
+            <a:p>
+              <a:r>
+                <a:rPr lang="en-US" sz="1400" dirty="0">
+                  <a:latin typeface="Times New Roman" panose="02020603050405020304" pitchFamily="18" charset="0"/>
+                  <a:cs typeface="Times New Roman" panose="02020603050405020304" pitchFamily="18" charset="0"/>
+                </a:rPr>
+                <a:t>Decoder Neural Network</a:t>
+              </a:r>
+            </a:p>
+          </p:txBody>
+        </p:sp>
+        <p:sp>
+          <p:nvSpPr>
+            <p:cNvPr id="45" name="TextBox 44">
+              <a:extLst>
+                <a:ext uri="{FF2B5EF4-FFF2-40B4-BE49-F238E27FC236}">
+                  <a16:creationId xmlns:a16="http://schemas.microsoft.com/office/drawing/2014/main" id="{1FA5334C-7AFE-4856-AF78-F0A98BD266D5}"/>
+                </a:ext>
+              </a:extLst>
+            </p:cNvPr>
+            <p:cNvSpPr txBox="1"/>
+            <p:nvPr/>
+          </p:nvSpPr>
+          <p:spPr>
+            <a:xfrm>
+              <a:off x="1869191" y="1198984"/>
+              <a:ext cx="855840" cy="544584"/>
+            </a:xfrm>
+            <a:prstGeom prst="rect">
+              <a:avLst/>
+            </a:prstGeom>
+            <a:noFill/>
+          </p:spPr>
+          <p:txBody>
+            <a:bodyPr wrap="none" rtlCol="0">
+              <a:spAutoFit/>
+            </a:bodyPr>
+            <a:lstStyle/>
+            <a:p>
+              <a:r>
+                <a:rPr lang="en-US" sz="1400" dirty="0">
+                  <a:latin typeface="Times New Roman" panose="02020603050405020304" pitchFamily="18" charset="0"/>
+                  <a:cs typeface="Times New Roman" panose="02020603050405020304" pitchFamily="18" charset="0"/>
+                </a:rPr>
+                <a:t>Molecule</a:t>
+              </a:r>
+            </a:p>
+          </p:txBody>
+        </p:sp>
+        <p:sp>
+          <p:nvSpPr>
+            <p:cNvPr id="46" name="TextBox 45">
+              <a:extLst>
+                <a:ext uri="{FF2B5EF4-FFF2-40B4-BE49-F238E27FC236}">
+                  <a16:creationId xmlns:a16="http://schemas.microsoft.com/office/drawing/2014/main" id="{15E7E3CF-1968-4309-BDA9-6518E4D7FE5D}"/>
+                </a:ext>
+              </a:extLst>
+            </p:cNvPr>
+            <p:cNvSpPr txBox="1"/>
+            <p:nvPr/>
+          </p:nvSpPr>
+          <p:spPr>
+            <a:xfrm>
+              <a:off x="1402692" y="8592502"/>
+              <a:ext cx="1919290" cy="544584"/>
+            </a:xfrm>
+            <a:prstGeom prst="rect">
+              <a:avLst/>
+            </a:prstGeom>
+            <a:noFill/>
+          </p:spPr>
+          <p:txBody>
+            <a:bodyPr wrap="none" rtlCol="0">
+              <a:spAutoFit/>
+            </a:bodyPr>
+            <a:lstStyle/>
+            <a:p>
+              <a:r>
+                <a:rPr lang="en-US" sz="1400" dirty="0">
+                  <a:latin typeface="Times New Roman" panose="02020603050405020304" pitchFamily="18" charset="0"/>
+                  <a:cs typeface="Times New Roman" panose="02020603050405020304" pitchFamily="18" charset="0"/>
+                </a:rPr>
+                <a:t>Reconstructed Molecule</a:t>
+              </a:r>
+            </a:p>
+          </p:txBody>
+        </p:sp>
+        <p:sp>
+          <p:nvSpPr>
+            <p:cNvPr id="47" name="Arrow: Down 46">
+              <a:extLst>
+                <a:ext uri="{FF2B5EF4-FFF2-40B4-BE49-F238E27FC236}">
+                  <a16:creationId xmlns:a16="http://schemas.microsoft.com/office/drawing/2014/main" id="{CD85E18C-1038-4094-AD44-CAAE7289A2C9}"/>
+                </a:ext>
+              </a:extLst>
+            </p:cNvPr>
+            <p:cNvSpPr/>
+            <p:nvPr/>
+          </p:nvSpPr>
+          <p:spPr>
+            <a:xfrm>
+              <a:off x="2083727" y="1822894"/>
+              <a:ext cx="527221" cy="403654"/>
+            </a:xfrm>
+            <a:prstGeom prst="downArrow">
+              <a:avLst/>
+            </a:prstGeom>
+            <a:noFill/>
+            <a:ln>
+              <a:solidFill>
+                <a:schemeClr val="tx1"/>
+              </a:solidFill>
+            </a:ln>
+          </p:spPr>
+          <p:style>
+            <a:lnRef idx="2">
+              <a:schemeClr val="accent1">
+                <a:shade val="50000"/>
+              </a:schemeClr>
+            </a:lnRef>
+            <a:fillRef idx="1">
+              <a:schemeClr val="accent1"/>
+            </a:fillRef>
+            <a:effectRef idx="0">
+              <a:schemeClr val="accent1"/>
+            </a:effectRef>
+            <a:fontRef idx="minor">
+              <a:schemeClr val="lt1"/>
+            </a:fontRef>
+          </p:style>
+          <p:txBody>
+            <a:bodyPr rtlCol="0" anchor="ctr"/>
+            <a:lstStyle/>
+            <a:p>
+              <a:pPr algn="ctr"/>
+              <a:endParaRPr lang="en-US"/>
+            </a:p>
+          </p:txBody>
+        </p:sp>
+        <p:sp>
+          <p:nvSpPr>
+            <p:cNvPr id="48" name="Arrow: Down 47">
+              <a:extLst>
+                <a:ext uri="{FF2B5EF4-FFF2-40B4-BE49-F238E27FC236}">
+                  <a16:creationId xmlns:a16="http://schemas.microsoft.com/office/drawing/2014/main" id="{5935EC0A-B641-4764-9F76-C7218FCD2875}"/>
+                </a:ext>
+              </a:extLst>
+            </p:cNvPr>
+            <p:cNvSpPr/>
+            <p:nvPr/>
+          </p:nvSpPr>
+          <p:spPr>
+            <a:xfrm>
+              <a:off x="2098727" y="3533593"/>
+              <a:ext cx="527221" cy="403654"/>
+            </a:xfrm>
+            <a:prstGeom prst="downArrow">
+              <a:avLst/>
+            </a:prstGeom>
+            <a:noFill/>
+            <a:ln>
+              <a:solidFill>
+                <a:schemeClr val="tx1"/>
+              </a:solidFill>
+            </a:ln>
+          </p:spPr>
+          <p:style>
+            <a:lnRef idx="2">
+              <a:schemeClr val="accent1">
+                <a:shade val="50000"/>
+              </a:schemeClr>
+            </a:lnRef>
+            <a:fillRef idx="1">
+              <a:schemeClr val="accent1"/>
+            </a:fillRef>
+            <a:effectRef idx="0">
+              <a:schemeClr val="accent1"/>
+            </a:effectRef>
+            <a:fontRef idx="minor">
+              <a:schemeClr val="lt1"/>
+            </a:fontRef>
+          </p:style>
+          <p:txBody>
+            <a:bodyPr rtlCol="0" anchor="ctr"/>
+            <a:lstStyle/>
+            <a:p>
+              <a:pPr algn="ctr"/>
+              <a:endParaRPr lang="en-US"/>
+            </a:p>
+          </p:txBody>
+        </p:sp>
+        <p:sp>
+          <p:nvSpPr>
+            <p:cNvPr id="49" name="Arrow: Down 48">
+              <a:extLst>
+                <a:ext uri="{FF2B5EF4-FFF2-40B4-BE49-F238E27FC236}">
+                  <a16:creationId xmlns:a16="http://schemas.microsoft.com/office/drawing/2014/main" id="{77338226-1D45-4759-B2FF-16B7195B4D1B}"/>
+                </a:ext>
+              </a:extLst>
+            </p:cNvPr>
+            <p:cNvSpPr/>
+            <p:nvPr/>
+          </p:nvSpPr>
+          <p:spPr>
+            <a:xfrm>
+              <a:off x="2098727" y="5270605"/>
+              <a:ext cx="527221" cy="403654"/>
+            </a:xfrm>
+            <a:prstGeom prst="downArrow">
+              <a:avLst/>
+            </a:prstGeom>
+            <a:noFill/>
+            <a:ln>
+              <a:solidFill>
+                <a:schemeClr val="tx1"/>
+              </a:solidFill>
+            </a:ln>
+          </p:spPr>
+          <p:style>
+            <a:lnRef idx="2">
+              <a:schemeClr val="accent1">
+                <a:shade val="50000"/>
+              </a:schemeClr>
+            </a:lnRef>
+            <a:fillRef idx="1">
+              <a:schemeClr val="accent1"/>
+            </a:fillRef>
+            <a:effectRef idx="0">
+              <a:schemeClr val="accent1"/>
+            </a:effectRef>
+            <a:fontRef idx="minor">
+              <a:schemeClr val="lt1"/>
+            </a:fontRef>
+          </p:style>
+          <p:txBody>
+            <a:bodyPr rtlCol="0" anchor="ctr"/>
+            <a:lstStyle/>
+            <a:p>
+              <a:pPr algn="ctr"/>
+              <a:endParaRPr lang="en-US"/>
+            </a:p>
+          </p:txBody>
+        </p:sp>
+        <p:sp>
+          <p:nvSpPr>
+            <p:cNvPr id="50" name="Arrow: Down 49">
+              <a:extLst>
+                <a:ext uri="{FF2B5EF4-FFF2-40B4-BE49-F238E27FC236}">
+                  <a16:creationId xmlns:a16="http://schemas.microsoft.com/office/drawing/2014/main" id="{DF2FF94E-920C-4761-958E-2B01B1B0A48A}"/>
+                </a:ext>
+              </a:extLst>
+            </p:cNvPr>
+            <p:cNvSpPr/>
+            <p:nvPr/>
+          </p:nvSpPr>
+          <p:spPr>
+            <a:xfrm>
+              <a:off x="2098727" y="6978249"/>
+              <a:ext cx="527221" cy="403654"/>
+            </a:xfrm>
+            <a:prstGeom prst="downArrow">
+              <a:avLst/>
+            </a:prstGeom>
+            <a:noFill/>
+            <a:ln>
+              <a:solidFill>
+                <a:schemeClr val="tx1"/>
+              </a:solidFill>
+            </a:ln>
+          </p:spPr>
+          <p:style>
+            <a:lnRef idx="2">
+              <a:schemeClr val="accent1">
+                <a:shade val="50000"/>
+              </a:schemeClr>
+            </a:lnRef>
+            <a:fillRef idx="1">
+              <a:schemeClr val="accent1"/>
+            </a:fillRef>
+            <a:effectRef idx="0">
+              <a:schemeClr val="accent1"/>
+            </a:effectRef>
+            <a:fontRef idx="minor">
+              <a:schemeClr val="lt1"/>
+            </a:fontRef>
+          </p:style>
+          <p:txBody>
+            <a:bodyPr rtlCol="0" anchor="ctr"/>
+            <a:lstStyle/>
+            <a:p>
+              <a:pPr algn="ctr"/>
+              <a:endParaRPr lang="en-US"/>
+            </a:p>
+          </p:txBody>
+        </p:sp>
+      </p:grpSp>
     </p:spTree>
     <p:extLst>
       <p:ext uri="{BB962C8B-B14F-4D97-AF65-F5344CB8AC3E}">

</xml_diff>

<commit_message>
Updating figures in SI
</commit_message>
<xml_diff>
--- a/Images/SI4.pptx
+++ b/Images/SI4.pptx
@@ -2,7 +2,7 @@
 <file path=ppt/presentation.xml><?xml version="1.0" encoding="utf-8"?>
 <p:presentation xmlns:a="http://schemas.openxmlformats.org/drawingml/2006/main" xmlns:r="http://schemas.openxmlformats.org/officeDocument/2006/relationships" xmlns:p="http://schemas.openxmlformats.org/presentationml/2006/main" saveSubsetFonts="1">
   <p:sldMasterIdLst>
-    <p:sldMasterId id="2147483720" r:id="rId1"/>
+    <p:sldMasterId id="2147483756" r:id="rId1"/>
   </p:sldMasterIdLst>
   <p:notesMasterIdLst>
     <p:notesMasterId r:id="rId3"/>
@@ -10,7 +10,7 @@
   <p:sldIdLst>
     <p:sldId id="258" r:id="rId2"/>
   </p:sldIdLst>
-  <p:sldSz cx="14630400" cy="5486400"/>
+  <p:sldSz cx="23774400" cy="10972800"/>
   <p:notesSz cx="6858000" cy="9144000"/>
   <p:defaultTextStyle>
     <a:defPPr>
@@ -197,7 +197,7 @@
           <a:p>
             <a:fld id="{0C45F89B-D0D3-4AC5-836F-869636F86470}" type="datetimeFigureOut">
               <a:rPr lang="en-US" smtClean="0"/>
-              <a:t>9/25/2021</a:t>
+              <a:t>9/30/2021</a:t>
             </a:fld>
             <a:endParaRPr lang="en-US"/>
           </a:p>
@@ -215,8 +215,8 @@
         </p:nvSpPr>
         <p:spPr>
           <a:xfrm>
-            <a:off x="-685800" y="1143000"/>
-            <a:ext cx="8229600" cy="3086100"/>
+            <a:off x="85725" y="1143000"/>
+            <a:ext cx="6686550" cy="3086100"/>
           </a:xfrm>
           <a:prstGeom prst="rect">
             <a:avLst/>
@@ -493,15 +493,15 @@
         </p:nvSpPr>
         <p:spPr>
           <a:xfrm>
-            <a:off x="1828800" y="897890"/>
-            <a:ext cx="10972800" cy="1910080"/>
+            <a:off x="2971800" y="1795781"/>
+            <a:ext cx="17830800" cy="3820160"/>
           </a:xfrm>
         </p:spPr>
         <p:txBody>
           <a:bodyPr anchor="b"/>
           <a:lstStyle>
             <a:lvl1pPr algn="ctr">
-              <a:defRPr sz="4800"/>
+              <a:defRPr sz="9600"/>
             </a:lvl1pPr>
           </a:lstStyle>
           <a:p>
@@ -525,8 +525,8 @@
         </p:nvSpPr>
         <p:spPr>
           <a:xfrm>
-            <a:off x="1828800" y="2881630"/>
-            <a:ext cx="10972800" cy="1324610"/>
+            <a:off x="2971800" y="5763261"/>
+            <a:ext cx="17830800" cy="2649219"/>
           </a:xfrm>
         </p:spPr>
         <p:txBody>
@@ -534,39 +534,39 @@
           <a:lstStyle>
             <a:lvl1pPr marL="0" indent="0" algn="ctr">
               <a:buNone/>
-              <a:defRPr sz="1920"/>
+              <a:defRPr sz="3840"/>
             </a:lvl1pPr>
-            <a:lvl2pPr marL="365760" indent="0" algn="ctr">
-              <a:buNone/>
-              <a:defRPr sz="1600"/>
+            <a:lvl2pPr marL="731520" indent="0" algn="ctr">
+              <a:buNone/>
+              <a:defRPr sz="3200"/>
             </a:lvl2pPr>
-            <a:lvl3pPr marL="731520" indent="0" algn="ctr">
-              <a:buNone/>
-              <a:defRPr sz="1440"/>
+            <a:lvl3pPr marL="1463040" indent="0" algn="ctr">
+              <a:buNone/>
+              <a:defRPr sz="2880"/>
             </a:lvl3pPr>
-            <a:lvl4pPr marL="1097280" indent="0" algn="ctr">
-              <a:buNone/>
-              <a:defRPr sz="1280"/>
+            <a:lvl4pPr marL="2194560" indent="0" algn="ctr">
+              <a:buNone/>
+              <a:defRPr sz="2560"/>
             </a:lvl4pPr>
-            <a:lvl5pPr marL="1463040" indent="0" algn="ctr">
-              <a:buNone/>
-              <a:defRPr sz="1280"/>
+            <a:lvl5pPr marL="2926080" indent="0" algn="ctr">
+              <a:buNone/>
+              <a:defRPr sz="2560"/>
             </a:lvl5pPr>
-            <a:lvl6pPr marL="1828800" indent="0" algn="ctr">
-              <a:buNone/>
-              <a:defRPr sz="1280"/>
+            <a:lvl6pPr marL="3657600" indent="0" algn="ctr">
+              <a:buNone/>
+              <a:defRPr sz="2560"/>
             </a:lvl6pPr>
-            <a:lvl7pPr marL="2194560" indent="0" algn="ctr">
-              <a:buNone/>
-              <a:defRPr sz="1280"/>
+            <a:lvl7pPr marL="4389120" indent="0" algn="ctr">
+              <a:buNone/>
+              <a:defRPr sz="2560"/>
             </a:lvl7pPr>
-            <a:lvl8pPr marL="2560320" indent="0" algn="ctr">
-              <a:buNone/>
-              <a:defRPr sz="1280"/>
+            <a:lvl8pPr marL="5120640" indent="0" algn="ctr">
+              <a:buNone/>
+              <a:defRPr sz="2560"/>
             </a:lvl8pPr>
-            <a:lvl9pPr marL="2926080" indent="0" algn="ctr">
-              <a:buNone/>
-              <a:defRPr sz="1280"/>
+            <a:lvl9pPr marL="5852160" indent="0" algn="ctr">
+              <a:buNone/>
+              <a:defRPr sz="2560"/>
             </a:lvl9pPr>
           </a:lstStyle>
           <a:p>
@@ -595,7 +595,7 @@
           <a:p>
             <a:fld id="{1516511B-B61A-47A9-97DC-35FBB5E54714}" type="datetimeFigureOut">
               <a:rPr lang="en-US" smtClean="0"/>
-              <a:t>9/25/2021</a:t>
+              <a:t>9/30/2021</a:t>
             </a:fld>
             <a:endParaRPr lang="en-US"/>
           </a:p>
@@ -646,7 +646,7 @@
     </p:spTree>
     <p:extLst>
       <p:ext uri="{BB962C8B-B14F-4D97-AF65-F5344CB8AC3E}">
-        <p14:creationId xmlns:p14="http://schemas.microsoft.com/office/powerpoint/2010/main" val="3589276722"/>
+        <p14:creationId xmlns:p14="http://schemas.microsoft.com/office/powerpoint/2010/main" val="1014636359"/>
       </p:ext>
     </p:extLst>
   </p:cSld>
@@ -765,7 +765,7 @@
           <a:p>
             <a:fld id="{1516511B-B61A-47A9-97DC-35FBB5E54714}" type="datetimeFigureOut">
               <a:rPr lang="en-US" smtClean="0"/>
-              <a:t>9/25/2021</a:t>
+              <a:t>9/30/2021</a:t>
             </a:fld>
             <a:endParaRPr lang="en-US"/>
           </a:p>
@@ -816,7 +816,7 @@
     </p:spTree>
     <p:extLst>
       <p:ext uri="{BB962C8B-B14F-4D97-AF65-F5344CB8AC3E}">
-        <p14:creationId xmlns:p14="http://schemas.microsoft.com/office/powerpoint/2010/main" val="349306363"/>
+        <p14:creationId xmlns:p14="http://schemas.microsoft.com/office/powerpoint/2010/main" val="4114235073"/>
       </p:ext>
     </p:extLst>
   </p:cSld>
@@ -855,8 +855,8 @@
         </p:nvSpPr>
         <p:spPr>
           <a:xfrm>
-            <a:off x="10469880" y="292100"/>
-            <a:ext cx="3154680" cy="4649470"/>
+            <a:off x="17013555" y="584200"/>
+            <a:ext cx="5126355" cy="9298941"/>
           </a:xfrm>
         </p:spPr>
         <p:txBody>
@@ -883,8 +883,8 @@
         </p:nvSpPr>
         <p:spPr>
           <a:xfrm>
-            <a:off x="1005840" y="292100"/>
-            <a:ext cx="9281160" cy="4649470"/>
+            <a:off x="1634490" y="584200"/>
+            <a:ext cx="15081885" cy="9298941"/>
           </a:xfrm>
         </p:spPr>
         <p:txBody>
@@ -945,7 +945,7 @@
           <a:p>
             <a:fld id="{1516511B-B61A-47A9-97DC-35FBB5E54714}" type="datetimeFigureOut">
               <a:rPr lang="en-US" smtClean="0"/>
-              <a:t>9/25/2021</a:t>
+              <a:t>9/30/2021</a:t>
             </a:fld>
             <a:endParaRPr lang="en-US"/>
           </a:p>
@@ -996,7 +996,7 @@
     </p:spTree>
     <p:extLst>
       <p:ext uri="{BB962C8B-B14F-4D97-AF65-F5344CB8AC3E}">
-        <p14:creationId xmlns:p14="http://schemas.microsoft.com/office/powerpoint/2010/main" val="53200663"/>
+        <p14:creationId xmlns:p14="http://schemas.microsoft.com/office/powerpoint/2010/main" val="3061782534"/>
       </p:ext>
     </p:extLst>
   </p:cSld>
@@ -1115,7 +1115,7 @@
           <a:p>
             <a:fld id="{1516511B-B61A-47A9-97DC-35FBB5E54714}" type="datetimeFigureOut">
               <a:rPr lang="en-US" smtClean="0"/>
-              <a:t>9/25/2021</a:t>
+              <a:t>9/30/2021</a:t>
             </a:fld>
             <a:endParaRPr lang="en-US"/>
           </a:p>
@@ -1166,7 +1166,7 @@
     </p:spTree>
     <p:extLst>
       <p:ext uri="{BB962C8B-B14F-4D97-AF65-F5344CB8AC3E}">
-        <p14:creationId xmlns:p14="http://schemas.microsoft.com/office/powerpoint/2010/main" val="2398735839"/>
+        <p14:creationId xmlns:p14="http://schemas.microsoft.com/office/powerpoint/2010/main" val="4209595584"/>
       </p:ext>
     </p:extLst>
   </p:cSld>
@@ -1205,15 +1205,15 @@
         </p:nvSpPr>
         <p:spPr>
           <a:xfrm>
-            <a:off x="998220" y="1367791"/>
-            <a:ext cx="12618720" cy="2282190"/>
+            <a:off x="1622108" y="2735582"/>
+            <a:ext cx="20505420" cy="4564379"/>
           </a:xfrm>
         </p:spPr>
         <p:txBody>
           <a:bodyPr anchor="b"/>
           <a:lstStyle>
             <a:lvl1pPr>
-              <a:defRPr sz="4800"/>
+              <a:defRPr sz="9600"/>
             </a:lvl1pPr>
           </a:lstStyle>
           <a:p>
@@ -1237,8 +1237,8 @@
         </p:nvSpPr>
         <p:spPr>
           <a:xfrm>
-            <a:off x="998220" y="3671571"/>
-            <a:ext cx="12618720" cy="1200150"/>
+            <a:off x="1622108" y="7343142"/>
+            <a:ext cx="20505420" cy="2400299"/>
           </a:xfrm>
         </p:spPr>
         <p:txBody>
@@ -1246,7 +1246,7 @@
           <a:lstStyle>
             <a:lvl1pPr marL="0" indent="0">
               <a:buNone/>
-              <a:defRPr sz="1920">
+              <a:defRPr sz="3840">
                 <a:solidFill>
                   <a:schemeClr val="tx1">
                     <a:tint val="75000"/>
@@ -1254,9 +1254,9 @@
                 </a:solidFill>
               </a:defRPr>
             </a:lvl1pPr>
-            <a:lvl2pPr marL="365760" indent="0">
-              <a:buNone/>
-              <a:defRPr sz="1600">
+            <a:lvl2pPr marL="731520" indent="0">
+              <a:buNone/>
+              <a:defRPr sz="3200">
                 <a:solidFill>
                   <a:schemeClr val="tx1">
                     <a:tint val="75000"/>
@@ -1264,9 +1264,9 @@
                 </a:solidFill>
               </a:defRPr>
             </a:lvl2pPr>
-            <a:lvl3pPr marL="731520" indent="0">
-              <a:buNone/>
-              <a:defRPr sz="1440">
+            <a:lvl3pPr marL="1463040" indent="0">
+              <a:buNone/>
+              <a:defRPr sz="2880">
                 <a:solidFill>
                   <a:schemeClr val="tx1">
                     <a:tint val="75000"/>
@@ -1274,9 +1274,9 @@
                 </a:solidFill>
               </a:defRPr>
             </a:lvl3pPr>
-            <a:lvl4pPr marL="1097280" indent="0">
-              <a:buNone/>
-              <a:defRPr sz="1280">
+            <a:lvl4pPr marL="2194560" indent="0">
+              <a:buNone/>
+              <a:defRPr sz="2560">
                 <a:solidFill>
                   <a:schemeClr val="tx1">
                     <a:tint val="75000"/>
@@ -1284,9 +1284,9 @@
                 </a:solidFill>
               </a:defRPr>
             </a:lvl4pPr>
-            <a:lvl5pPr marL="1463040" indent="0">
-              <a:buNone/>
-              <a:defRPr sz="1280">
+            <a:lvl5pPr marL="2926080" indent="0">
+              <a:buNone/>
+              <a:defRPr sz="2560">
                 <a:solidFill>
                   <a:schemeClr val="tx1">
                     <a:tint val="75000"/>
@@ -1294,9 +1294,9 @@
                 </a:solidFill>
               </a:defRPr>
             </a:lvl5pPr>
-            <a:lvl6pPr marL="1828800" indent="0">
-              <a:buNone/>
-              <a:defRPr sz="1280">
+            <a:lvl6pPr marL="3657600" indent="0">
+              <a:buNone/>
+              <a:defRPr sz="2560">
                 <a:solidFill>
                   <a:schemeClr val="tx1">
                     <a:tint val="75000"/>
@@ -1304,9 +1304,9 @@
                 </a:solidFill>
               </a:defRPr>
             </a:lvl6pPr>
-            <a:lvl7pPr marL="2194560" indent="0">
-              <a:buNone/>
-              <a:defRPr sz="1280">
+            <a:lvl7pPr marL="4389120" indent="0">
+              <a:buNone/>
+              <a:defRPr sz="2560">
                 <a:solidFill>
                   <a:schemeClr val="tx1">
                     <a:tint val="75000"/>
@@ -1314,9 +1314,9 @@
                 </a:solidFill>
               </a:defRPr>
             </a:lvl7pPr>
-            <a:lvl8pPr marL="2560320" indent="0">
-              <a:buNone/>
-              <a:defRPr sz="1280">
+            <a:lvl8pPr marL="5120640" indent="0">
+              <a:buNone/>
+              <a:defRPr sz="2560">
                 <a:solidFill>
                   <a:schemeClr val="tx1">
                     <a:tint val="75000"/>
@@ -1324,9 +1324,9 @@
                 </a:solidFill>
               </a:defRPr>
             </a:lvl8pPr>
-            <a:lvl9pPr marL="2926080" indent="0">
-              <a:buNone/>
-              <a:defRPr sz="1280">
+            <a:lvl9pPr marL="5852160" indent="0">
+              <a:buNone/>
+              <a:defRPr sz="2560">
                 <a:solidFill>
                   <a:schemeClr val="tx1">
                     <a:tint val="75000"/>
@@ -1361,7 +1361,7 @@
           <a:p>
             <a:fld id="{1516511B-B61A-47A9-97DC-35FBB5E54714}" type="datetimeFigureOut">
               <a:rPr lang="en-US" smtClean="0"/>
-              <a:t>9/25/2021</a:t>
+              <a:t>9/30/2021</a:t>
             </a:fld>
             <a:endParaRPr lang="en-US"/>
           </a:p>
@@ -1412,7 +1412,7 @@
     </p:spTree>
     <p:extLst>
       <p:ext uri="{BB962C8B-B14F-4D97-AF65-F5344CB8AC3E}">
-        <p14:creationId xmlns:p14="http://schemas.microsoft.com/office/powerpoint/2010/main" val="1768878523"/>
+        <p14:creationId xmlns:p14="http://schemas.microsoft.com/office/powerpoint/2010/main" val="4031131613"/>
       </p:ext>
     </p:extLst>
   </p:cSld>
@@ -1474,8 +1474,8 @@
         </p:nvSpPr>
         <p:spPr>
           <a:xfrm>
-            <a:off x="1005840" y="1460500"/>
-            <a:ext cx="6217920" cy="3481070"/>
+            <a:off x="1634490" y="2921000"/>
+            <a:ext cx="10104120" cy="6962141"/>
           </a:xfrm>
         </p:spPr>
         <p:txBody>
@@ -1531,8 +1531,8 @@
         </p:nvSpPr>
         <p:spPr>
           <a:xfrm>
-            <a:off x="7406640" y="1460500"/>
-            <a:ext cx="6217920" cy="3481070"/>
+            <a:off x="12035790" y="2921000"/>
+            <a:ext cx="10104120" cy="6962141"/>
           </a:xfrm>
         </p:spPr>
         <p:txBody>
@@ -1593,7 +1593,7 @@
           <a:p>
             <a:fld id="{1516511B-B61A-47A9-97DC-35FBB5E54714}" type="datetimeFigureOut">
               <a:rPr lang="en-US" smtClean="0"/>
-              <a:t>9/25/2021</a:t>
+              <a:t>9/30/2021</a:t>
             </a:fld>
             <a:endParaRPr lang="en-US"/>
           </a:p>
@@ -1644,7 +1644,7 @@
     </p:spTree>
     <p:extLst>
       <p:ext uri="{BB962C8B-B14F-4D97-AF65-F5344CB8AC3E}">
-        <p14:creationId xmlns:p14="http://schemas.microsoft.com/office/powerpoint/2010/main" val="186253193"/>
+        <p14:creationId xmlns:p14="http://schemas.microsoft.com/office/powerpoint/2010/main" val="1106770384"/>
       </p:ext>
     </p:extLst>
   </p:cSld>
@@ -1683,8 +1683,8 @@
         </p:nvSpPr>
         <p:spPr>
           <a:xfrm>
-            <a:off x="1007746" y="292101"/>
-            <a:ext cx="12618720" cy="1060450"/>
+            <a:off x="1637587" y="584201"/>
+            <a:ext cx="20505420" cy="2120901"/>
           </a:xfrm>
         </p:spPr>
         <p:txBody>
@@ -1711,8 +1711,8 @@
         </p:nvSpPr>
         <p:spPr>
           <a:xfrm>
-            <a:off x="1007746" y="1344930"/>
-            <a:ext cx="6189344" cy="659130"/>
+            <a:off x="1637587" y="2689861"/>
+            <a:ext cx="10057685" cy="1318259"/>
           </a:xfrm>
         </p:spPr>
         <p:txBody>
@@ -1720,39 +1720,39 @@
           <a:lstStyle>
             <a:lvl1pPr marL="0" indent="0">
               <a:buNone/>
-              <a:defRPr sz="1920" b="1"/>
+              <a:defRPr sz="3840" b="1"/>
             </a:lvl1pPr>
-            <a:lvl2pPr marL="365760" indent="0">
-              <a:buNone/>
-              <a:defRPr sz="1600" b="1"/>
+            <a:lvl2pPr marL="731520" indent="0">
+              <a:buNone/>
+              <a:defRPr sz="3200" b="1"/>
             </a:lvl2pPr>
-            <a:lvl3pPr marL="731520" indent="0">
-              <a:buNone/>
-              <a:defRPr sz="1440" b="1"/>
+            <a:lvl3pPr marL="1463040" indent="0">
+              <a:buNone/>
+              <a:defRPr sz="2880" b="1"/>
             </a:lvl3pPr>
-            <a:lvl4pPr marL="1097280" indent="0">
-              <a:buNone/>
-              <a:defRPr sz="1280" b="1"/>
+            <a:lvl4pPr marL="2194560" indent="0">
+              <a:buNone/>
+              <a:defRPr sz="2560" b="1"/>
             </a:lvl4pPr>
-            <a:lvl5pPr marL="1463040" indent="0">
-              <a:buNone/>
-              <a:defRPr sz="1280" b="1"/>
+            <a:lvl5pPr marL="2926080" indent="0">
+              <a:buNone/>
+              <a:defRPr sz="2560" b="1"/>
             </a:lvl5pPr>
-            <a:lvl6pPr marL="1828800" indent="0">
-              <a:buNone/>
-              <a:defRPr sz="1280" b="1"/>
+            <a:lvl6pPr marL="3657600" indent="0">
+              <a:buNone/>
+              <a:defRPr sz="2560" b="1"/>
             </a:lvl6pPr>
-            <a:lvl7pPr marL="2194560" indent="0">
-              <a:buNone/>
-              <a:defRPr sz="1280" b="1"/>
+            <a:lvl7pPr marL="4389120" indent="0">
+              <a:buNone/>
+              <a:defRPr sz="2560" b="1"/>
             </a:lvl7pPr>
-            <a:lvl8pPr marL="2560320" indent="0">
-              <a:buNone/>
-              <a:defRPr sz="1280" b="1"/>
+            <a:lvl8pPr marL="5120640" indent="0">
+              <a:buNone/>
+              <a:defRPr sz="2560" b="1"/>
             </a:lvl8pPr>
-            <a:lvl9pPr marL="2926080" indent="0">
-              <a:buNone/>
-              <a:defRPr sz="1280" b="1"/>
+            <a:lvl9pPr marL="5852160" indent="0">
+              <a:buNone/>
+              <a:defRPr sz="2560" b="1"/>
             </a:lvl9pPr>
           </a:lstStyle>
           <a:p>
@@ -1776,8 +1776,8 @@
         </p:nvSpPr>
         <p:spPr>
           <a:xfrm>
-            <a:off x="1007746" y="2004060"/>
-            <a:ext cx="6189344" cy="2947670"/>
+            <a:off x="1637587" y="4008120"/>
+            <a:ext cx="10057685" cy="5895341"/>
           </a:xfrm>
         </p:spPr>
         <p:txBody>
@@ -1833,8 +1833,8 @@
         </p:nvSpPr>
         <p:spPr>
           <a:xfrm>
-            <a:off x="7406640" y="1344930"/>
-            <a:ext cx="6219826" cy="659130"/>
+            <a:off x="12035790" y="2689861"/>
+            <a:ext cx="10107217" cy="1318259"/>
           </a:xfrm>
         </p:spPr>
         <p:txBody>
@@ -1842,39 +1842,39 @@
           <a:lstStyle>
             <a:lvl1pPr marL="0" indent="0">
               <a:buNone/>
-              <a:defRPr sz="1920" b="1"/>
+              <a:defRPr sz="3840" b="1"/>
             </a:lvl1pPr>
-            <a:lvl2pPr marL="365760" indent="0">
-              <a:buNone/>
-              <a:defRPr sz="1600" b="1"/>
+            <a:lvl2pPr marL="731520" indent="0">
+              <a:buNone/>
+              <a:defRPr sz="3200" b="1"/>
             </a:lvl2pPr>
-            <a:lvl3pPr marL="731520" indent="0">
-              <a:buNone/>
-              <a:defRPr sz="1440" b="1"/>
+            <a:lvl3pPr marL="1463040" indent="0">
+              <a:buNone/>
+              <a:defRPr sz="2880" b="1"/>
             </a:lvl3pPr>
-            <a:lvl4pPr marL="1097280" indent="0">
-              <a:buNone/>
-              <a:defRPr sz="1280" b="1"/>
+            <a:lvl4pPr marL="2194560" indent="0">
+              <a:buNone/>
+              <a:defRPr sz="2560" b="1"/>
             </a:lvl4pPr>
-            <a:lvl5pPr marL="1463040" indent="0">
-              <a:buNone/>
-              <a:defRPr sz="1280" b="1"/>
+            <a:lvl5pPr marL="2926080" indent="0">
+              <a:buNone/>
+              <a:defRPr sz="2560" b="1"/>
             </a:lvl5pPr>
-            <a:lvl6pPr marL="1828800" indent="0">
-              <a:buNone/>
-              <a:defRPr sz="1280" b="1"/>
+            <a:lvl6pPr marL="3657600" indent="0">
+              <a:buNone/>
+              <a:defRPr sz="2560" b="1"/>
             </a:lvl6pPr>
-            <a:lvl7pPr marL="2194560" indent="0">
-              <a:buNone/>
-              <a:defRPr sz="1280" b="1"/>
+            <a:lvl7pPr marL="4389120" indent="0">
+              <a:buNone/>
+              <a:defRPr sz="2560" b="1"/>
             </a:lvl7pPr>
-            <a:lvl8pPr marL="2560320" indent="0">
-              <a:buNone/>
-              <a:defRPr sz="1280" b="1"/>
+            <a:lvl8pPr marL="5120640" indent="0">
+              <a:buNone/>
+              <a:defRPr sz="2560" b="1"/>
             </a:lvl8pPr>
-            <a:lvl9pPr marL="2926080" indent="0">
-              <a:buNone/>
-              <a:defRPr sz="1280" b="1"/>
+            <a:lvl9pPr marL="5852160" indent="0">
+              <a:buNone/>
+              <a:defRPr sz="2560" b="1"/>
             </a:lvl9pPr>
           </a:lstStyle>
           <a:p>
@@ -1898,8 +1898,8 @@
         </p:nvSpPr>
         <p:spPr>
           <a:xfrm>
-            <a:off x="7406640" y="2004060"/>
-            <a:ext cx="6219826" cy="2947670"/>
+            <a:off x="12035790" y="4008120"/>
+            <a:ext cx="10107217" cy="5895341"/>
           </a:xfrm>
         </p:spPr>
         <p:txBody>
@@ -1960,7 +1960,7 @@
           <a:p>
             <a:fld id="{1516511B-B61A-47A9-97DC-35FBB5E54714}" type="datetimeFigureOut">
               <a:rPr lang="en-US" smtClean="0"/>
-              <a:t>9/25/2021</a:t>
+              <a:t>9/30/2021</a:t>
             </a:fld>
             <a:endParaRPr lang="en-US"/>
           </a:p>
@@ -2011,7 +2011,7 @@
     </p:spTree>
     <p:extLst>
       <p:ext uri="{BB962C8B-B14F-4D97-AF65-F5344CB8AC3E}">
-        <p14:creationId xmlns:p14="http://schemas.microsoft.com/office/powerpoint/2010/main" val="1222560586"/>
+        <p14:creationId xmlns:p14="http://schemas.microsoft.com/office/powerpoint/2010/main" val="96786273"/>
       </p:ext>
     </p:extLst>
   </p:cSld>
@@ -2078,7 +2078,7 @@
           <a:p>
             <a:fld id="{1516511B-B61A-47A9-97DC-35FBB5E54714}" type="datetimeFigureOut">
               <a:rPr lang="en-US" smtClean="0"/>
-              <a:t>9/25/2021</a:t>
+              <a:t>9/30/2021</a:t>
             </a:fld>
             <a:endParaRPr lang="en-US"/>
           </a:p>
@@ -2129,7 +2129,7 @@
     </p:spTree>
     <p:extLst>
       <p:ext uri="{BB962C8B-B14F-4D97-AF65-F5344CB8AC3E}">
-        <p14:creationId xmlns:p14="http://schemas.microsoft.com/office/powerpoint/2010/main" val="2253754059"/>
+        <p14:creationId xmlns:p14="http://schemas.microsoft.com/office/powerpoint/2010/main" val="4194486672"/>
       </p:ext>
     </p:extLst>
   </p:cSld>
@@ -2173,7 +2173,7 @@
           <a:p>
             <a:fld id="{1516511B-B61A-47A9-97DC-35FBB5E54714}" type="datetimeFigureOut">
               <a:rPr lang="en-US" smtClean="0"/>
-              <a:t>9/25/2021</a:t>
+              <a:t>9/30/2021</a:t>
             </a:fld>
             <a:endParaRPr lang="en-US"/>
           </a:p>
@@ -2224,7 +2224,7 @@
     </p:spTree>
     <p:extLst>
       <p:ext uri="{BB962C8B-B14F-4D97-AF65-F5344CB8AC3E}">
-        <p14:creationId xmlns:p14="http://schemas.microsoft.com/office/powerpoint/2010/main" val="1104040556"/>
+        <p14:creationId xmlns:p14="http://schemas.microsoft.com/office/powerpoint/2010/main" val="3113625966"/>
       </p:ext>
     </p:extLst>
   </p:cSld>
@@ -2263,15 +2263,15 @@
         </p:nvSpPr>
         <p:spPr>
           <a:xfrm>
-            <a:off x="1007746" y="365760"/>
-            <a:ext cx="4718684" cy="1280160"/>
+            <a:off x="1637588" y="731520"/>
+            <a:ext cx="7667862" cy="2560320"/>
           </a:xfrm>
         </p:spPr>
         <p:txBody>
           <a:bodyPr anchor="b"/>
           <a:lstStyle>
             <a:lvl1pPr>
-              <a:defRPr sz="2560"/>
+              <a:defRPr sz="5120"/>
             </a:lvl1pPr>
           </a:lstStyle>
           <a:p>
@@ -2295,38 +2295,132 @@
         </p:nvSpPr>
         <p:spPr>
           <a:xfrm>
-            <a:off x="6219826" y="789940"/>
-            <a:ext cx="7406640" cy="3898900"/>
+            <a:off x="10107217" y="1579881"/>
+            <a:ext cx="12035790" cy="7797800"/>
           </a:xfrm>
         </p:spPr>
         <p:txBody>
           <a:bodyPr/>
           <a:lstStyle>
             <a:lvl1pPr>
+              <a:defRPr sz="5120"/>
+            </a:lvl1pPr>
+            <a:lvl2pPr>
+              <a:defRPr sz="4480"/>
+            </a:lvl2pPr>
+            <a:lvl3pPr>
+              <a:defRPr sz="3840"/>
+            </a:lvl3pPr>
+            <a:lvl4pPr>
+              <a:defRPr sz="3200"/>
+            </a:lvl4pPr>
+            <a:lvl5pPr>
+              <a:defRPr sz="3200"/>
+            </a:lvl5pPr>
+            <a:lvl6pPr>
+              <a:defRPr sz="3200"/>
+            </a:lvl6pPr>
+            <a:lvl7pPr>
+              <a:defRPr sz="3200"/>
+            </a:lvl7pPr>
+            <a:lvl8pPr>
+              <a:defRPr sz="3200"/>
+            </a:lvl8pPr>
+            <a:lvl9pPr>
+              <a:defRPr sz="3200"/>
+            </a:lvl9pPr>
+          </a:lstStyle>
+          <a:p>
+            <a:pPr lvl="0"/>
+            <a:r>
+              <a:rPr lang="en-US"/>
+              <a:t>Click to edit Master text styles</a:t>
+            </a:r>
+          </a:p>
+          <a:p>
+            <a:pPr lvl="1"/>
+            <a:r>
+              <a:rPr lang="en-US"/>
+              <a:t>Second level</a:t>
+            </a:r>
+          </a:p>
+          <a:p>
+            <a:pPr lvl="2"/>
+            <a:r>
+              <a:rPr lang="en-US"/>
+              <a:t>Third level</a:t>
+            </a:r>
+          </a:p>
+          <a:p>
+            <a:pPr lvl="3"/>
+            <a:r>
+              <a:rPr lang="en-US"/>
+              <a:t>Fourth level</a:t>
+            </a:r>
+          </a:p>
+          <a:p>
+            <a:pPr lvl="4"/>
+            <a:r>
+              <a:rPr lang="en-US"/>
+              <a:t>Fifth level</a:t>
+            </a:r>
+            <a:endParaRPr lang="en-US" dirty="0"/>
+          </a:p>
+        </p:txBody>
+      </p:sp>
+      <p:sp>
+        <p:nvSpPr>
+          <p:cNvPr id="4" name="Text Placeholder 3"/>
+          <p:cNvSpPr>
+            <a:spLocks noGrp="1"/>
+          </p:cNvSpPr>
+          <p:nvPr>
+            <p:ph type="body" sz="half" idx="2"/>
+          </p:nvPr>
+        </p:nvSpPr>
+        <p:spPr>
+          <a:xfrm>
+            <a:off x="1637588" y="3291840"/>
+            <a:ext cx="7667862" cy="6098541"/>
+          </a:xfrm>
+        </p:spPr>
+        <p:txBody>
+          <a:bodyPr/>
+          <a:lstStyle>
+            <a:lvl1pPr marL="0" indent="0">
+              <a:buNone/>
               <a:defRPr sz="2560"/>
             </a:lvl1pPr>
-            <a:lvl2pPr>
+            <a:lvl2pPr marL="731520" indent="0">
+              <a:buNone/>
               <a:defRPr sz="2240"/>
             </a:lvl2pPr>
-            <a:lvl3pPr>
+            <a:lvl3pPr marL="1463040" indent="0">
+              <a:buNone/>
               <a:defRPr sz="1920"/>
             </a:lvl3pPr>
-            <a:lvl4pPr>
+            <a:lvl4pPr marL="2194560" indent="0">
+              <a:buNone/>
               <a:defRPr sz="1600"/>
             </a:lvl4pPr>
-            <a:lvl5pPr>
+            <a:lvl5pPr marL="2926080" indent="0">
+              <a:buNone/>
               <a:defRPr sz="1600"/>
             </a:lvl5pPr>
-            <a:lvl6pPr>
+            <a:lvl6pPr marL="3657600" indent="0">
+              <a:buNone/>
               <a:defRPr sz="1600"/>
             </a:lvl6pPr>
-            <a:lvl7pPr>
+            <a:lvl7pPr marL="4389120" indent="0">
+              <a:buNone/>
               <a:defRPr sz="1600"/>
             </a:lvl7pPr>
-            <a:lvl8pPr>
+            <a:lvl8pPr marL="5120640" indent="0">
+              <a:buNone/>
               <a:defRPr sz="1600"/>
             </a:lvl8pPr>
-            <a:lvl9pPr>
+            <a:lvl9pPr marL="5852160" indent="0">
+              <a:buNone/>
               <a:defRPr sz="1600"/>
             </a:lvl9pPr>
           </a:lstStyle>
@@ -2337,100 +2431,6 @@
               <a:t>Click to edit Master text styles</a:t>
             </a:r>
           </a:p>
-          <a:p>
-            <a:pPr lvl="1"/>
-            <a:r>
-              <a:rPr lang="en-US"/>
-              <a:t>Second level</a:t>
-            </a:r>
-          </a:p>
-          <a:p>
-            <a:pPr lvl="2"/>
-            <a:r>
-              <a:rPr lang="en-US"/>
-              <a:t>Third level</a:t>
-            </a:r>
-          </a:p>
-          <a:p>
-            <a:pPr lvl="3"/>
-            <a:r>
-              <a:rPr lang="en-US"/>
-              <a:t>Fourth level</a:t>
-            </a:r>
-          </a:p>
-          <a:p>
-            <a:pPr lvl="4"/>
-            <a:r>
-              <a:rPr lang="en-US"/>
-              <a:t>Fifth level</a:t>
-            </a:r>
-            <a:endParaRPr lang="en-US" dirty="0"/>
-          </a:p>
-        </p:txBody>
-      </p:sp>
-      <p:sp>
-        <p:nvSpPr>
-          <p:cNvPr id="4" name="Text Placeholder 3"/>
-          <p:cNvSpPr>
-            <a:spLocks noGrp="1"/>
-          </p:cNvSpPr>
-          <p:nvPr>
-            <p:ph type="body" sz="half" idx="2"/>
-          </p:nvPr>
-        </p:nvSpPr>
-        <p:spPr>
-          <a:xfrm>
-            <a:off x="1007746" y="1645920"/>
-            <a:ext cx="4718684" cy="3049270"/>
-          </a:xfrm>
-        </p:spPr>
-        <p:txBody>
-          <a:bodyPr/>
-          <a:lstStyle>
-            <a:lvl1pPr marL="0" indent="0">
-              <a:buNone/>
-              <a:defRPr sz="1280"/>
-            </a:lvl1pPr>
-            <a:lvl2pPr marL="365760" indent="0">
-              <a:buNone/>
-              <a:defRPr sz="1120"/>
-            </a:lvl2pPr>
-            <a:lvl3pPr marL="731520" indent="0">
-              <a:buNone/>
-              <a:defRPr sz="960"/>
-            </a:lvl3pPr>
-            <a:lvl4pPr marL="1097280" indent="0">
-              <a:buNone/>
-              <a:defRPr sz="800"/>
-            </a:lvl4pPr>
-            <a:lvl5pPr marL="1463040" indent="0">
-              <a:buNone/>
-              <a:defRPr sz="800"/>
-            </a:lvl5pPr>
-            <a:lvl6pPr marL="1828800" indent="0">
-              <a:buNone/>
-              <a:defRPr sz="800"/>
-            </a:lvl6pPr>
-            <a:lvl7pPr marL="2194560" indent="0">
-              <a:buNone/>
-              <a:defRPr sz="800"/>
-            </a:lvl7pPr>
-            <a:lvl8pPr marL="2560320" indent="0">
-              <a:buNone/>
-              <a:defRPr sz="800"/>
-            </a:lvl8pPr>
-            <a:lvl9pPr marL="2926080" indent="0">
-              <a:buNone/>
-              <a:defRPr sz="800"/>
-            </a:lvl9pPr>
-          </a:lstStyle>
-          <a:p>
-            <a:pPr lvl="0"/>
-            <a:r>
-              <a:rPr lang="en-US"/>
-              <a:t>Click to edit Master text styles</a:t>
-            </a:r>
-          </a:p>
         </p:txBody>
       </p:sp>
       <p:sp>
@@ -2450,7 +2450,7 @@
           <a:p>
             <a:fld id="{1516511B-B61A-47A9-97DC-35FBB5E54714}" type="datetimeFigureOut">
               <a:rPr lang="en-US" smtClean="0"/>
-              <a:t>9/25/2021</a:t>
+              <a:t>9/30/2021</a:t>
             </a:fld>
             <a:endParaRPr lang="en-US"/>
           </a:p>
@@ -2501,7 +2501,7 @@
     </p:spTree>
     <p:extLst>
       <p:ext uri="{BB962C8B-B14F-4D97-AF65-F5344CB8AC3E}">
-        <p14:creationId xmlns:p14="http://schemas.microsoft.com/office/powerpoint/2010/main" val="2934915688"/>
+        <p14:creationId xmlns:p14="http://schemas.microsoft.com/office/powerpoint/2010/main" val="1039788082"/>
       </p:ext>
     </p:extLst>
   </p:cSld>
@@ -2540,15 +2540,15 @@
         </p:nvSpPr>
         <p:spPr>
           <a:xfrm>
-            <a:off x="1007746" y="365760"/>
-            <a:ext cx="4718684" cy="1280160"/>
+            <a:off x="1637588" y="731520"/>
+            <a:ext cx="7667862" cy="2560320"/>
           </a:xfrm>
         </p:spPr>
         <p:txBody>
           <a:bodyPr anchor="b"/>
           <a:lstStyle>
             <a:lvl1pPr>
-              <a:defRPr sz="2560"/>
+              <a:defRPr sz="5120"/>
             </a:lvl1pPr>
           </a:lstStyle>
           <a:p>
@@ -2572,8 +2572,8 @@
         </p:nvSpPr>
         <p:spPr>
           <a:xfrm>
-            <a:off x="6219826" y="789940"/>
-            <a:ext cx="7406640" cy="3898900"/>
+            <a:off x="10107217" y="1579881"/>
+            <a:ext cx="12035790" cy="7797800"/>
           </a:xfrm>
         </p:spPr>
         <p:txBody>
@@ -2581,107 +2581,107 @@
           <a:lstStyle>
             <a:lvl1pPr marL="0" indent="0">
               <a:buNone/>
+              <a:defRPr sz="5120"/>
+            </a:lvl1pPr>
+            <a:lvl2pPr marL="731520" indent="0">
+              <a:buNone/>
+              <a:defRPr sz="4480"/>
+            </a:lvl2pPr>
+            <a:lvl3pPr marL="1463040" indent="0">
+              <a:buNone/>
+              <a:defRPr sz="3840"/>
+            </a:lvl3pPr>
+            <a:lvl4pPr marL="2194560" indent="0">
+              <a:buNone/>
+              <a:defRPr sz="3200"/>
+            </a:lvl4pPr>
+            <a:lvl5pPr marL="2926080" indent="0">
+              <a:buNone/>
+              <a:defRPr sz="3200"/>
+            </a:lvl5pPr>
+            <a:lvl6pPr marL="3657600" indent="0">
+              <a:buNone/>
+              <a:defRPr sz="3200"/>
+            </a:lvl6pPr>
+            <a:lvl7pPr marL="4389120" indent="0">
+              <a:buNone/>
+              <a:defRPr sz="3200"/>
+            </a:lvl7pPr>
+            <a:lvl8pPr marL="5120640" indent="0">
+              <a:buNone/>
+              <a:defRPr sz="3200"/>
+            </a:lvl8pPr>
+            <a:lvl9pPr marL="5852160" indent="0">
+              <a:buNone/>
+              <a:defRPr sz="3200"/>
+            </a:lvl9pPr>
+          </a:lstStyle>
+          <a:p>
+            <a:r>
+              <a:rPr lang="en-US"/>
+              <a:t>Click icon to add picture</a:t>
+            </a:r>
+            <a:endParaRPr lang="en-US" dirty="0"/>
+          </a:p>
+        </p:txBody>
+      </p:sp>
+      <p:sp>
+        <p:nvSpPr>
+          <p:cNvPr id="4" name="Text Placeholder 3"/>
+          <p:cNvSpPr>
+            <a:spLocks noGrp="1"/>
+          </p:cNvSpPr>
+          <p:nvPr>
+            <p:ph type="body" sz="half" idx="2"/>
+          </p:nvPr>
+        </p:nvSpPr>
+        <p:spPr>
+          <a:xfrm>
+            <a:off x="1637588" y="3291840"/>
+            <a:ext cx="7667862" cy="6098541"/>
+          </a:xfrm>
+        </p:spPr>
+        <p:txBody>
+          <a:bodyPr/>
+          <a:lstStyle>
+            <a:lvl1pPr marL="0" indent="0">
+              <a:buNone/>
               <a:defRPr sz="2560"/>
             </a:lvl1pPr>
-            <a:lvl2pPr marL="365760" indent="0">
+            <a:lvl2pPr marL="731520" indent="0">
               <a:buNone/>
               <a:defRPr sz="2240"/>
             </a:lvl2pPr>
-            <a:lvl3pPr marL="731520" indent="0">
+            <a:lvl3pPr marL="1463040" indent="0">
               <a:buNone/>
               <a:defRPr sz="1920"/>
             </a:lvl3pPr>
-            <a:lvl4pPr marL="1097280" indent="0">
+            <a:lvl4pPr marL="2194560" indent="0">
               <a:buNone/>
               <a:defRPr sz="1600"/>
             </a:lvl4pPr>
-            <a:lvl5pPr marL="1463040" indent="0">
+            <a:lvl5pPr marL="2926080" indent="0">
               <a:buNone/>
               <a:defRPr sz="1600"/>
             </a:lvl5pPr>
-            <a:lvl6pPr marL="1828800" indent="0">
+            <a:lvl6pPr marL="3657600" indent="0">
               <a:buNone/>
               <a:defRPr sz="1600"/>
             </a:lvl6pPr>
-            <a:lvl7pPr marL="2194560" indent="0">
+            <a:lvl7pPr marL="4389120" indent="0">
               <a:buNone/>
               <a:defRPr sz="1600"/>
             </a:lvl7pPr>
-            <a:lvl8pPr marL="2560320" indent="0">
+            <a:lvl8pPr marL="5120640" indent="0">
               <a:buNone/>
               <a:defRPr sz="1600"/>
             </a:lvl8pPr>
-            <a:lvl9pPr marL="2926080" indent="0">
+            <a:lvl9pPr marL="5852160" indent="0">
               <a:buNone/>
               <a:defRPr sz="1600"/>
             </a:lvl9pPr>
           </a:lstStyle>
           <a:p>
-            <a:r>
-              <a:rPr lang="en-US"/>
-              <a:t>Click icon to add picture</a:t>
-            </a:r>
-            <a:endParaRPr lang="en-US" dirty="0"/>
-          </a:p>
-        </p:txBody>
-      </p:sp>
-      <p:sp>
-        <p:nvSpPr>
-          <p:cNvPr id="4" name="Text Placeholder 3"/>
-          <p:cNvSpPr>
-            <a:spLocks noGrp="1"/>
-          </p:cNvSpPr>
-          <p:nvPr>
-            <p:ph type="body" sz="half" idx="2"/>
-          </p:nvPr>
-        </p:nvSpPr>
-        <p:spPr>
-          <a:xfrm>
-            <a:off x="1007746" y="1645920"/>
-            <a:ext cx="4718684" cy="3049270"/>
-          </a:xfrm>
-        </p:spPr>
-        <p:txBody>
-          <a:bodyPr/>
-          <a:lstStyle>
-            <a:lvl1pPr marL="0" indent="0">
-              <a:buNone/>
-              <a:defRPr sz="1280"/>
-            </a:lvl1pPr>
-            <a:lvl2pPr marL="365760" indent="0">
-              <a:buNone/>
-              <a:defRPr sz="1120"/>
-            </a:lvl2pPr>
-            <a:lvl3pPr marL="731520" indent="0">
-              <a:buNone/>
-              <a:defRPr sz="960"/>
-            </a:lvl3pPr>
-            <a:lvl4pPr marL="1097280" indent="0">
-              <a:buNone/>
-              <a:defRPr sz="800"/>
-            </a:lvl4pPr>
-            <a:lvl5pPr marL="1463040" indent="0">
-              <a:buNone/>
-              <a:defRPr sz="800"/>
-            </a:lvl5pPr>
-            <a:lvl6pPr marL="1828800" indent="0">
-              <a:buNone/>
-              <a:defRPr sz="800"/>
-            </a:lvl6pPr>
-            <a:lvl7pPr marL="2194560" indent="0">
-              <a:buNone/>
-              <a:defRPr sz="800"/>
-            </a:lvl7pPr>
-            <a:lvl8pPr marL="2560320" indent="0">
-              <a:buNone/>
-              <a:defRPr sz="800"/>
-            </a:lvl8pPr>
-            <a:lvl9pPr marL="2926080" indent="0">
-              <a:buNone/>
-              <a:defRPr sz="800"/>
-            </a:lvl9pPr>
-          </a:lstStyle>
-          <a:p>
             <a:pPr lvl="0"/>
             <a:r>
               <a:rPr lang="en-US"/>
@@ -2707,7 +2707,7 @@
           <a:p>
             <a:fld id="{1516511B-B61A-47A9-97DC-35FBB5E54714}" type="datetimeFigureOut">
               <a:rPr lang="en-US" smtClean="0"/>
-              <a:t>9/25/2021</a:t>
+              <a:t>9/30/2021</a:t>
             </a:fld>
             <a:endParaRPr lang="en-US"/>
           </a:p>
@@ -2758,7 +2758,7 @@
     </p:spTree>
     <p:extLst>
       <p:ext uri="{BB962C8B-B14F-4D97-AF65-F5344CB8AC3E}">
-        <p14:creationId xmlns:p14="http://schemas.microsoft.com/office/powerpoint/2010/main" val="2362465958"/>
+        <p14:creationId xmlns:p14="http://schemas.microsoft.com/office/powerpoint/2010/main" val="2132718119"/>
       </p:ext>
     </p:extLst>
   </p:cSld>
@@ -2802,8 +2802,8 @@
         </p:nvSpPr>
         <p:spPr>
           <a:xfrm>
-            <a:off x="1005840" y="292101"/>
-            <a:ext cx="12618720" cy="1060450"/>
+            <a:off x="1634490" y="584201"/>
+            <a:ext cx="20505420" cy="2120901"/>
           </a:xfrm>
           <a:prstGeom prst="rect">
             <a:avLst/>
@@ -2835,8 +2835,8 @@
         </p:nvSpPr>
         <p:spPr>
           <a:xfrm>
-            <a:off x="1005840" y="1460500"/>
-            <a:ext cx="12618720" cy="3481070"/>
+            <a:off x="1634490" y="2921000"/>
+            <a:ext cx="20505420" cy="6962141"/>
           </a:xfrm>
           <a:prstGeom prst="rect">
             <a:avLst/>
@@ -2897,8 +2897,8 @@
         </p:nvSpPr>
         <p:spPr>
           <a:xfrm>
-            <a:off x="1005840" y="5085080"/>
-            <a:ext cx="3291840" cy="292100"/>
+            <a:off x="1634490" y="10170161"/>
+            <a:ext cx="5349240" cy="584200"/>
           </a:xfrm>
           <a:prstGeom prst="rect">
             <a:avLst/>
@@ -2908,7 +2908,7 @@
           <a:bodyPr vert="horz" lIns="91440" tIns="45720" rIns="91440" bIns="45720" rtlCol="0" anchor="ctr"/>
           <a:lstStyle>
             <a:lvl1pPr algn="l">
-              <a:defRPr sz="960">
+              <a:defRPr sz="1920">
                 <a:solidFill>
                   <a:schemeClr val="tx1">
                     <a:tint val="75000"/>
@@ -2920,7 +2920,7 @@
           <a:p>
             <a:fld id="{1516511B-B61A-47A9-97DC-35FBB5E54714}" type="datetimeFigureOut">
               <a:rPr lang="en-US" smtClean="0"/>
-              <a:t>9/25/2021</a:t>
+              <a:t>9/30/2021</a:t>
             </a:fld>
             <a:endParaRPr lang="en-US"/>
           </a:p>
@@ -2938,8 +2938,8 @@
         </p:nvSpPr>
         <p:spPr>
           <a:xfrm>
-            <a:off x="4846320" y="5085080"/>
-            <a:ext cx="4937760" cy="292100"/>
+            <a:off x="7875270" y="10170161"/>
+            <a:ext cx="8023860" cy="584200"/>
           </a:xfrm>
           <a:prstGeom prst="rect">
             <a:avLst/>
@@ -2949,7 +2949,7 @@
           <a:bodyPr vert="horz" lIns="91440" tIns="45720" rIns="91440" bIns="45720" rtlCol="0" anchor="ctr"/>
           <a:lstStyle>
             <a:lvl1pPr algn="ctr">
-              <a:defRPr sz="960">
+              <a:defRPr sz="1920">
                 <a:solidFill>
                   <a:schemeClr val="tx1">
                     <a:tint val="75000"/>
@@ -2975,8 +2975,8 @@
         </p:nvSpPr>
         <p:spPr>
           <a:xfrm>
-            <a:off x="10332720" y="5085080"/>
-            <a:ext cx="3291840" cy="292100"/>
+            <a:off x="16790670" y="10170161"/>
+            <a:ext cx="5349240" cy="584200"/>
           </a:xfrm>
           <a:prstGeom prst="rect">
             <a:avLst/>
@@ -2986,7 +2986,7 @@
           <a:bodyPr vert="horz" lIns="91440" tIns="45720" rIns="91440" bIns="45720" rtlCol="0" anchor="ctr"/>
           <a:lstStyle>
             <a:lvl1pPr algn="r">
-              <a:defRPr sz="960">
+              <a:defRPr sz="1920">
                 <a:solidFill>
                   <a:schemeClr val="tx1">
                     <a:tint val="75000"/>
@@ -3007,27 +3007,27 @@
     </p:spTree>
     <p:extLst>
       <p:ext uri="{BB962C8B-B14F-4D97-AF65-F5344CB8AC3E}">
-        <p14:creationId xmlns:p14="http://schemas.microsoft.com/office/powerpoint/2010/main" val="1714237031"/>
+        <p14:creationId xmlns:p14="http://schemas.microsoft.com/office/powerpoint/2010/main" val="2847444807"/>
       </p:ext>
     </p:extLst>
   </p:cSld>
   <p:clrMap bg1="lt1" tx1="dk1" bg2="lt2" tx2="dk2" accent1="accent1" accent2="accent2" accent3="accent3" accent4="accent4" accent5="accent5" accent6="accent6" hlink="hlink" folHlink="folHlink"/>
   <p:sldLayoutIdLst>
-    <p:sldLayoutId id="2147483721" r:id="rId1"/>
-    <p:sldLayoutId id="2147483722" r:id="rId2"/>
-    <p:sldLayoutId id="2147483723" r:id="rId3"/>
-    <p:sldLayoutId id="2147483724" r:id="rId4"/>
-    <p:sldLayoutId id="2147483725" r:id="rId5"/>
-    <p:sldLayoutId id="2147483726" r:id="rId6"/>
-    <p:sldLayoutId id="2147483727" r:id="rId7"/>
-    <p:sldLayoutId id="2147483728" r:id="rId8"/>
-    <p:sldLayoutId id="2147483729" r:id="rId9"/>
-    <p:sldLayoutId id="2147483730" r:id="rId10"/>
-    <p:sldLayoutId id="2147483731" r:id="rId11"/>
+    <p:sldLayoutId id="2147483757" r:id="rId1"/>
+    <p:sldLayoutId id="2147483758" r:id="rId2"/>
+    <p:sldLayoutId id="2147483759" r:id="rId3"/>
+    <p:sldLayoutId id="2147483760" r:id="rId4"/>
+    <p:sldLayoutId id="2147483761" r:id="rId5"/>
+    <p:sldLayoutId id="2147483762" r:id="rId6"/>
+    <p:sldLayoutId id="2147483763" r:id="rId7"/>
+    <p:sldLayoutId id="2147483764" r:id="rId8"/>
+    <p:sldLayoutId id="2147483765" r:id="rId9"/>
+    <p:sldLayoutId id="2147483766" r:id="rId10"/>
+    <p:sldLayoutId id="2147483767" r:id="rId11"/>
   </p:sldLayoutIdLst>
   <p:txStyles>
     <p:titleStyle>
-      <a:lvl1pPr algn="l" defTabSz="731520" rtl="0" eaLnBrk="1" latinLnBrk="0" hangingPunct="1">
+      <a:lvl1pPr algn="l" defTabSz="1463040" rtl="0" eaLnBrk="1" latinLnBrk="0" hangingPunct="1">
         <a:lnSpc>
           <a:spcPct val="90000"/>
         </a:lnSpc>
@@ -3035,7 +3035,7 @@
           <a:spcPct val="0"/>
         </a:spcBef>
         <a:buNone/>
-        <a:defRPr sz="3520" kern="1200">
+        <a:defRPr sz="7040" kern="1200">
           <a:solidFill>
             <a:schemeClr val="tx1"/>
           </a:solidFill>
@@ -3046,7 +3046,25 @@
       </a:lvl1pPr>
     </p:titleStyle>
     <p:bodyStyle>
-      <a:lvl1pPr marL="182880" indent="-182880" algn="l" defTabSz="731520" rtl="0" eaLnBrk="1" latinLnBrk="0" hangingPunct="1">
+      <a:lvl1pPr marL="365760" indent="-365760" algn="l" defTabSz="1463040" rtl="0" eaLnBrk="1" latinLnBrk="0" hangingPunct="1">
+        <a:lnSpc>
+          <a:spcPct val="90000"/>
+        </a:lnSpc>
+        <a:spcBef>
+          <a:spcPts val="1600"/>
+        </a:spcBef>
+        <a:buFont typeface="Arial" panose="020B0604020202020204" pitchFamily="34" charset="0"/>
+        <a:buChar char="•"/>
+        <a:defRPr sz="4480" kern="1200">
+          <a:solidFill>
+            <a:schemeClr val="tx1"/>
+          </a:solidFill>
+          <a:latin typeface="+mn-lt"/>
+          <a:ea typeface="+mn-ea"/>
+          <a:cs typeface="+mn-cs"/>
+        </a:defRPr>
+      </a:lvl1pPr>
+      <a:lvl2pPr marL="1097280" indent="-365760" algn="l" defTabSz="1463040" rtl="0" eaLnBrk="1" latinLnBrk="0" hangingPunct="1">
         <a:lnSpc>
           <a:spcPct val="90000"/>
         </a:lnSpc>
@@ -3055,25 +3073,7 @@
         </a:spcBef>
         <a:buFont typeface="Arial" panose="020B0604020202020204" pitchFamily="34" charset="0"/>
         <a:buChar char="•"/>
-        <a:defRPr sz="2240" kern="1200">
-          <a:solidFill>
-            <a:schemeClr val="tx1"/>
-          </a:solidFill>
-          <a:latin typeface="+mn-lt"/>
-          <a:ea typeface="+mn-ea"/>
-          <a:cs typeface="+mn-cs"/>
-        </a:defRPr>
-      </a:lvl1pPr>
-      <a:lvl2pPr marL="548640" indent="-182880" algn="l" defTabSz="731520" rtl="0" eaLnBrk="1" latinLnBrk="0" hangingPunct="1">
-        <a:lnSpc>
-          <a:spcPct val="90000"/>
-        </a:lnSpc>
-        <a:spcBef>
-          <a:spcPts val="400"/>
-        </a:spcBef>
-        <a:buFont typeface="Arial" panose="020B0604020202020204" pitchFamily="34" charset="0"/>
-        <a:buChar char="•"/>
-        <a:defRPr sz="1920" kern="1200">
+        <a:defRPr sz="3840" kern="1200">
           <a:solidFill>
             <a:schemeClr val="tx1"/>
           </a:solidFill>
@@ -3082,16 +3082,16 @@
           <a:cs typeface="+mn-cs"/>
         </a:defRPr>
       </a:lvl2pPr>
-      <a:lvl3pPr marL="914400" indent="-182880" algn="l" defTabSz="731520" rtl="0" eaLnBrk="1" latinLnBrk="0" hangingPunct="1">
+      <a:lvl3pPr marL="1828800" indent="-365760" algn="l" defTabSz="1463040" rtl="0" eaLnBrk="1" latinLnBrk="0" hangingPunct="1">
         <a:lnSpc>
           <a:spcPct val="90000"/>
         </a:lnSpc>
         <a:spcBef>
-          <a:spcPts val="400"/>
+          <a:spcPts val="800"/>
         </a:spcBef>
         <a:buFont typeface="Arial" panose="020B0604020202020204" pitchFamily="34" charset="0"/>
         <a:buChar char="•"/>
-        <a:defRPr sz="1600" kern="1200">
+        <a:defRPr sz="3200" kern="1200">
           <a:solidFill>
             <a:schemeClr val="tx1"/>
           </a:solidFill>
@@ -3100,16 +3100,16 @@
           <a:cs typeface="+mn-cs"/>
         </a:defRPr>
       </a:lvl3pPr>
-      <a:lvl4pPr marL="1280160" indent="-182880" algn="l" defTabSz="731520" rtl="0" eaLnBrk="1" latinLnBrk="0" hangingPunct="1">
+      <a:lvl4pPr marL="2560320" indent="-365760" algn="l" defTabSz="1463040" rtl="0" eaLnBrk="1" latinLnBrk="0" hangingPunct="1">
         <a:lnSpc>
           <a:spcPct val="90000"/>
         </a:lnSpc>
         <a:spcBef>
-          <a:spcPts val="400"/>
+          <a:spcPts val="800"/>
         </a:spcBef>
         <a:buFont typeface="Arial" panose="020B0604020202020204" pitchFamily="34" charset="0"/>
         <a:buChar char="•"/>
-        <a:defRPr sz="1440" kern="1200">
+        <a:defRPr sz="2880" kern="1200">
           <a:solidFill>
             <a:schemeClr val="tx1"/>
           </a:solidFill>
@@ -3118,16 +3118,16 @@
           <a:cs typeface="+mn-cs"/>
         </a:defRPr>
       </a:lvl4pPr>
-      <a:lvl5pPr marL="1645920" indent="-182880" algn="l" defTabSz="731520" rtl="0" eaLnBrk="1" latinLnBrk="0" hangingPunct="1">
+      <a:lvl5pPr marL="3291840" indent="-365760" algn="l" defTabSz="1463040" rtl="0" eaLnBrk="1" latinLnBrk="0" hangingPunct="1">
         <a:lnSpc>
           <a:spcPct val="90000"/>
         </a:lnSpc>
         <a:spcBef>
-          <a:spcPts val="400"/>
+          <a:spcPts val="800"/>
         </a:spcBef>
         <a:buFont typeface="Arial" panose="020B0604020202020204" pitchFamily="34" charset="0"/>
         <a:buChar char="•"/>
-        <a:defRPr sz="1440" kern="1200">
+        <a:defRPr sz="2880" kern="1200">
           <a:solidFill>
             <a:schemeClr val="tx1"/>
           </a:solidFill>
@@ -3136,16 +3136,16 @@
           <a:cs typeface="+mn-cs"/>
         </a:defRPr>
       </a:lvl5pPr>
-      <a:lvl6pPr marL="2011680" indent="-182880" algn="l" defTabSz="731520" rtl="0" eaLnBrk="1" latinLnBrk="0" hangingPunct="1">
+      <a:lvl6pPr marL="4023360" indent="-365760" algn="l" defTabSz="1463040" rtl="0" eaLnBrk="1" latinLnBrk="0" hangingPunct="1">
         <a:lnSpc>
           <a:spcPct val="90000"/>
         </a:lnSpc>
         <a:spcBef>
-          <a:spcPts val="400"/>
+          <a:spcPts val="800"/>
         </a:spcBef>
         <a:buFont typeface="Arial" panose="020B0604020202020204" pitchFamily="34" charset="0"/>
         <a:buChar char="•"/>
-        <a:defRPr sz="1440" kern="1200">
+        <a:defRPr sz="2880" kern="1200">
           <a:solidFill>
             <a:schemeClr val="tx1"/>
           </a:solidFill>
@@ -3154,16 +3154,16 @@
           <a:cs typeface="+mn-cs"/>
         </a:defRPr>
       </a:lvl6pPr>
-      <a:lvl7pPr marL="2377440" indent="-182880" algn="l" defTabSz="731520" rtl="0" eaLnBrk="1" latinLnBrk="0" hangingPunct="1">
+      <a:lvl7pPr marL="4754880" indent="-365760" algn="l" defTabSz="1463040" rtl="0" eaLnBrk="1" latinLnBrk="0" hangingPunct="1">
         <a:lnSpc>
           <a:spcPct val="90000"/>
         </a:lnSpc>
         <a:spcBef>
-          <a:spcPts val="400"/>
+          <a:spcPts val="800"/>
         </a:spcBef>
         <a:buFont typeface="Arial" panose="020B0604020202020204" pitchFamily="34" charset="0"/>
         <a:buChar char="•"/>
-        <a:defRPr sz="1440" kern="1200">
+        <a:defRPr sz="2880" kern="1200">
           <a:solidFill>
             <a:schemeClr val="tx1"/>
           </a:solidFill>
@@ -3172,16 +3172,16 @@
           <a:cs typeface="+mn-cs"/>
         </a:defRPr>
       </a:lvl7pPr>
-      <a:lvl8pPr marL="2743200" indent="-182880" algn="l" defTabSz="731520" rtl="0" eaLnBrk="1" latinLnBrk="0" hangingPunct="1">
+      <a:lvl8pPr marL="5486400" indent="-365760" algn="l" defTabSz="1463040" rtl="0" eaLnBrk="1" latinLnBrk="0" hangingPunct="1">
         <a:lnSpc>
           <a:spcPct val="90000"/>
         </a:lnSpc>
         <a:spcBef>
-          <a:spcPts val="400"/>
+          <a:spcPts val="800"/>
         </a:spcBef>
         <a:buFont typeface="Arial" panose="020B0604020202020204" pitchFamily="34" charset="0"/>
         <a:buChar char="•"/>
-        <a:defRPr sz="1440" kern="1200">
+        <a:defRPr sz="2880" kern="1200">
           <a:solidFill>
             <a:schemeClr val="tx1"/>
           </a:solidFill>
@@ -3190,16 +3190,16 @@
           <a:cs typeface="+mn-cs"/>
         </a:defRPr>
       </a:lvl8pPr>
-      <a:lvl9pPr marL="3108960" indent="-182880" algn="l" defTabSz="731520" rtl="0" eaLnBrk="1" latinLnBrk="0" hangingPunct="1">
+      <a:lvl9pPr marL="6217920" indent="-365760" algn="l" defTabSz="1463040" rtl="0" eaLnBrk="1" latinLnBrk="0" hangingPunct="1">
         <a:lnSpc>
           <a:spcPct val="90000"/>
         </a:lnSpc>
         <a:spcBef>
-          <a:spcPts val="400"/>
+          <a:spcPts val="800"/>
         </a:spcBef>
         <a:buFont typeface="Arial" panose="020B0604020202020204" pitchFamily="34" charset="0"/>
         <a:buChar char="•"/>
-        <a:defRPr sz="1440" kern="1200">
+        <a:defRPr sz="2880" kern="1200">
           <a:solidFill>
             <a:schemeClr val="tx1"/>
           </a:solidFill>
@@ -3213,8 +3213,8 @@
       <a:defPPr>
         <a:defRPr lang="en-US"/>
       </a:defPPr>
-      <a:lvl1pPr marL="0" algn="l" defTabSz="731520" rtl="0" eaLnBrk="1" latinLnBrk="0" hangingPunct="1">
-        <a:defRPr sz="1440" kern="1200">
+      <a:lvl1pPr marL="0" algn="l" defTabSz="1463040" rtl="0" eaLnBrk="1" latinLnBrk="0" hangingPunct="1">
+        <a:defRPr sz="2880" kern="1200">
           <a:solidFill>
             <a:schemeClr val="tx1"/>
           </a:solidFill>
@@ -3223,8 +3223,8 @@
           <a:cs typeface="+mn-cs"/>
         </a:defRPr>
       </a:lvl1pPr>
-      <a:lvl2pPr marL="365760" algn="l" defTabSz="731520" rtl="0" eaLnBrk="1" latinLnBrk="0" hangingPunct="1">
-        <a:defRPr sz="1440" kern="1200">
+      <a:lvl2pPr marL="731520" algn="l" defTabSz="1463040" rtl="0" eaLnBrk="1" latinLnBrk="0" hangingPunct="1">
+        <a:defRPr sz="2880" kern="1200">
           <a:solidFill>
             <a:schemeClr val="tx1"/>
           </a:solidFill>
@@ -3233,8 +3233,8 @@
           <a:cs typeface="+mn-cs"/>
         </a:defRPr>
       </a:lvl2pPr>
-      <a:lvl3pPr marL="731520" algn="l" defTabSz="731520" rtl="0" eaLnBrk="1" latinLnBrk="0" hangingPunct="1">
-        <a:defRPr sz="1440" kern="1200">
+      <a:lvl3pPr marL="1463040" algn="l" defTabSz="1463040" rtl="0" eaLnBrk="1" latinLnBrk="0" hangingPunct="1">
+        <a:defRPr sz="2880" kern="1200">
           <a:solidFill>
             <a:schemeClr val="tx1"/>
           </a:solidFill>
@@ -3243,8 +3243,8 @@
           <a:cs typeface="+mn-cs"/>
         </a:defRPr>
       </a:lvl3pPr>
-      <a:lvl4pPr marL="1097280" algn="l" defTabSz="731520" rtl="0" eaLnBrk="1" latinLnBrk="0" hangingPunct="1">
-        <a:defRPr sz="1440" kern="1200">
+      <a:lvl4pPr marL="2194560" algn="l" defTabSz="1463040" rtl="0" eaLnBrk="1" latinLnBrk="0" hangingPunct="1">
+        <a:defRPr sz="2880" kern="1200">
           <a:solidFill>
             <a:schemeClr val="tx1"/>
           </a:solidFill>
@@ -3253,8 +3253,8 @@
           <a:cs typeface="+mn-cs"/>
         </a:defRPr>
       </a:lvl4pPr>
-      <a:lvl5pPr marL="1463040" algn="l" defTabSz="731520" rtl="0" eaLnBrk="1" latinLnBrk="0" hangingPunct="1">
-        <a:defRPr sz="1440" kern="1200">
+      <a:lvl5pPr marL="2926080" algn="l" defTabSz="1463040" rtl="0" eaLnBrk="1" latinLnBrk="0" hangingPunct="1">
+        <a:defRPr sz="2880" kern="1200">
           <a:solidFill>
             <a:schemeClr val="tx1"/>
           </a:solidFill>
@@ -3263,8 +3263,8 @@
           <a:cs typeface="+mn-cs"/>
         </a:defRPr>
       </a:lvl5pPr>
-      <a:lvl6pPr marL="1828800" algn="l" defTabSz="731520" rtl="0" eaLnBrk="1" latinLnBrk="0" hangingPunct="1">
-        <a:defRPr sz="1440" kern="1200">
+      <a:lvl6pPr marL="3657600" algn="l" defTabSz="1463040" rtl="0" eaLnBrk="1" latinLnBrk="0" hangingPunct="1">
+        <a:defRPr sz="2880" kern="1200">
           <a:solidFill>
             <a:schemeClr val="tx1"/>
           </a:solidFill>
@@ -3273,8 +3273,8 @@
           <a:cs typeface="+mn-cs"/>
         </a:defRPr>
       </a:lvl6pPr>
-      <a:lvl7pPr marL="2194560" algn="l" defTabSz="731520" rtl="0" eaLnBrk="1" latinLnBrk="0" hangingPunct="1">
-        <a:defRPr sz="1440" kern="1200">
+      <a:lvl7pPr marL="4389120" algn="l" defTabSz="1463040" rtl="0" eaLnBrk="1" latinLnBrk="0" hangingPunct="1">
+        <a:defRPr sz="2880" kern="1200">
           <a:solidFill>
             <a:schemeClr val="tx1"/>
           </a:solidFill>
@@ -3283,8 +3283,8 @@
           <a:cs typeface="+mn-cs"/>
         </a:defRPr>
       </a:lvl7pPr>
-      <a:lvl8pPr marL="2560320" algn="l" defTabSz="731520" rtl="0" eaLnBrk="1" latinLnBrk="0" hangingPunct="1">
-        <a:defRPr sz="1440" kern="1200">
+      <a:lvl8pPr marL="5120640" algn="l" defTabSz="1463040" rtl="0" eaLnBrk="1" latinLnBrk="0" hangingPunct="1">
+        <a:defRPr sz="2880" kern="1200">
           <a:solidFill>
             <a:schemeClr val="tx1"/>
           </a:solidFill>
@@ -3293,8 +3293,8 @@
           <a:cs typeface="+mn-cs"/>
         </a:defRPr>
       </a:lvl8pPr>
-      <a:lvl9pPr marL="2926080" algn="l" defTabSz="731520" rtl="0" eaLnBrk="1" latinLnBrk="0" hangingPunct="1">
-        <a:defRPr sz="1440" kern="1200">
+      <a:lvl9pPr marL="5852160" algn="l" defTabSz="1463040" rtl="0" eaLnBrk="1" latinLnBrk="0" hangingPunct="1">
+        <a:defRPr sz="2880" kern="1200">
           <a:solidFill>
             <a:schemeClr val="tx1"/>
           </a:solidFill>
@@ -3339,8 +3339,8 @@
         </p:nvGrpSpPr>
         <p:grpSpPr>
           <a:xfrm>
-            <a:off x="6007362" y="307731"/>
-            <a:ext cx="7965832" cy="4870938"/>
+            <a:off x="9339480" y="649542"/>
+            <a:ext cx="14060236" cy="9207361"/>
             <a:chOff x="836863" y="296455"/>
             <a:chExt cx="7912769" cy="4960019"/>
           </a:xfrm>
@@ -3392,7 +3392,7 @@
             <a:p>
               <a:pPr algn="ctr"/>
               <a:r>
-                <a:rPr lang="en-US" sz="1400" dirty="0">
+                <a:rPr lang="en-US" sz="2800" dirty="0">
                   <a:latin typeface="Times New Roman" panose="02020603050405020304" pitchFamily="18" charset="0"/>
                   <a:cs typeface="Times New Roman" panose="02020603050405020304" pitchFamily="18" charset="0"/>
                 </a:rPr>
@@ -3448,7 +3448,7 @@
             <a:p>
               <a:pPr algn="ctr"/>
               <a:r>
-                <a:rPr lang="en-US" sz="1400" dirty="0">
+                <a:rPr lang="en-US" sz="2800" dirty="0">
                   <a:latin typeface="Times New Roman" panose="02020603050405020304" pitchFamily="18" charset="0"/>
                   <a:cs typeface="Times New Roman" panose="02020603050405020304" pitchFamily="18" charset="0"/>
                 </a:rPr>
@@ -3504,7 +3504,7 @@
             <a:p>
               <a:pPr algn="ctr"/>
               <a:r>
-                <a:rPr lang="en-US" sz="1400" dirty="0">
+                <a:rPr lang="en-US" sz="2800" dirty="0">
                   <a:latin typeface="Times New Roman" panose="02020603050405020304" pitchFamily="18" charset="0"/>
                   <a:cs typeface="Times New Roman" panose="02020603050405020304" pitchFamily="18" charset="0"/>
                 </a:rPr>
@@ -3560,7 +3560,7 @@
             <a:p>
               <a:pPr algn="ctr"/>
               <a:r>
-                <a:rPr lang="en-US" sz="1400" dirty="0">
+                <a:rPr lang="en-US" sz="2800" dirty="0">
                   <a:latin typeface="Times New Roman" panose="02020603050405020304" pitchFamily="18" charset="0"/>
                   <a:cs typeface="Times New Roman" panose="02020603050405020304" pitchFamily="18" charset="0"/>
                 </a:rPr>
@@ -3616,7 +3616,7 @@
             <a:p>
               <a:pPr algn="ctr"/>
               <a:r>
-                <a:rPr lang="en-US" sz="1400" dirty="0">
+                <a:rPr lang="en-US" sz="2800" dirty="0">
                   <a:latin typeface="Times New Roman" panose="02020603050405020304" pitchFamily="18" charset="0"/>
                   <a:cs typeface="Times New Roman" panose="02020603050405020304" pitchFamily="18" charset="0"/>
                 </a:rPr>
@@ -3672,7 +3672,7 @@
             <a:p>
               <a:pPr algn="ctr"/>
               <a:r>
-                <a:rPr lang="en-US" sz="1400" dirty="0">
+                <a:rPr lang="en-US" sz="2800" dirty="0">
                   <a:latin typeface="Times New Roman" panose="02020603050405020304" pitchFamily="18" charset="0"/>
                   <a:cs typeface="Times New Roman" panose="02020603050405020304" pitchFamily="18" charset="0"/>
                 </a:rPr>
@@ -3728,7 +3728,7 @@
             <a:p>
               <a:pPr algn="ctr"/>
               <a:r>
-                <a:rPr lang="en-US" sz="1400" dirty="0">
+                <a:rPr lang="en-US" sz="2800" dirty="0">
                   <a:latin typeface="Times New Roman" panose="02020603050405020304" pitchFamily="18" charset="0"/>
                   <a:cs typeface="Times New Roman" panose="02020603050405020304" pitchFamily="18" charset="0"/>
                 </a:rPr>
@@ -4012,7 +4012,7 @@
             <a:p>
               <a:pPr algn="ctr"/>
               <a:r>
-                <a:rPr lang="en-US" sz="1400" dirty="0">
+                <a:rPr lang="en-US" sz="2800" dirty="0">
                   <a:solidFill>
                     <a:schemeClr val="tx1"/>
                   </a:solidFill>
@@ -4075,7 +4075,7 @@
             <a:p>
               <a:pPr algn="ctr"/>
               <a:r>
-                <a:rPr lang="en-US" sz="1400" dirty="0">
+                <a:rPr lang="en-US" sz="2800" i="1" dirty="0">
                   <a:solidFill>
                     <a:schemeClr val="tx1"/>
                   </a:solidFill>
@@ -4225,7 +4225,7 @@
             <a:p>
               <a:pPr algn="ctr"/>
               <a:r>
-                <a:rPr lang="en-US" sz="1400" dirty="0">
+                <a:rPr lang="en-US" sz="2800" i="1" dirty="0">
                   <a:solidFill>
                     <a:schemeClr val="tx1"/>
                   </a:solidFill>
@@ -4376,7 +4376,7 @@
             <a:p>
               <a:pPr algn="ctr"/>
               <a:r>
-                <a:rPr lang="en-US" sz="1400" dirty="0">
+                <a:rPr lang="en-US" sz="2800" i="1" dirty="0">
                   <a:solidFill>
                     <a:schemeClr val="tx1"/>
                   </a:solidFill>
@@ -4403,8 +4403,8 @@
         </p:nvSpPr>
         <p:spPr>
           <a:xfrm>
-            <a:off x="200209" y="137363"/>
-            <a:ext cx="407484" cy="461665"/>
+            <a:off x="625448" y="112471"/>
+            <a:ext cx="628698" cy="830997"/>
           </a:xfrm>
           <a:prstGeom prst="rect">
             <a:avLst/>
@@ -4418,7 +4418,7 @@
           <a:lstStyle/>
           <a:p>
             <a:r>
-              <a:rPr lang="en-US" sz="2400" b="1" dirty="0">
+              <a:rPr lang="en-US" sz="4800" b="1" dirty="0">
                 <a:latin typeface="Times New Roman" panose="02020603050405020304" pitchFamily="18" charset="0"/>
                 <a:cs typeface="Times New Roman" panose="02020603050405020304" pitchFamily="18" charset="0"/>
               </a:rPr>
@@ -4427,50 +4427,12 @@
           </a:p>
         </p:txBody>
       </p:sp>
-      <p:sp>
-        <p:nvSpPr>
-          <p:cNvPr id="37" name="TextBox 36">
+      <p:grpSp>
+        <p:nvGrpSpPr>
+          <p:cNvPr id="4" name="Group 3">
             <a:extLst>
               <a:ext uri="{FF2B5EF4-FFF2-40B4-BE49-F238E27FC236}">
-                <a16:creationId xmlns:a16="http://schemas.microsoft.com/office/drawing/2014/main" id="{B11E5811-2BA3-4B5B-8774-8468A2E229FE}"/>
-              </a:ext>
-            </a:extLst>
-          </p:cNvPr>
-          <p:cNvSpPr txBox="1"/>
-          <p:nvPr/>
-        </p:nvSpPr>
-        <p:spPr>
-          <a:xfrm>
-            <a:off x="5178414" y="137363"/>
-            <a:ext cx="389850" cy="461665"/>
-          </a:xfrm>
-          <a:prstGeom prst="rect">
-            <a:avLst/>
-          </a:prstGeom>
-          <a:noFill/>
-        </p:spPr>
-        <p:txBody>
-          <a:bodyPr wrap="none" rtlCol="0">
-            <a:spAutoFit/>
-          </a:bodyPr>
-          <a:lstStyle/>
-          <a:p>
-            <a:r>
-              <a:rPr lang="en-US" sz="2400" b="1" dirty="0">
-                <a:latin typeface="Times New Roman" panose="02020603050405020304" pitchFamily="18" charset="0"/>
-                <a:cs typeface="Times New Roman" panose="02020603050405020304" pitchFamily="18" charset="0"/>
-              </a:rPr>
-              <a:t>B</a:t>
-            </a:r>
-          </a:p>
-        </p:txBody>
-      </p:sp>
-      <p:grpSp>
-        <p:nvGrpSpPr>
-          <p:cNvPr id="38" name="Group 37">
-            <a:extLst>
-              <a:ext uri="{FF2B5EF4-FFF2-40B4-BE49-F238E27FC236}">
-                <a16:creationId xmlns:a16="http://schemas.microsoft.com/office/drawing/2014/main" id="{EFB80EFC-6BAE-4B74-BE73-CAAC857B02A5}"/>
+                <a16:creationId xmlns:a16="http://schemas.microsoft.com/office/drawing/2014/main" id="{ABBE01E7-5D18-4C2A-8BA2-891A7A307FC9}"/>
               </a:ext>
             </a:extLst>
           </p:cNvPr>
@@ -4479,10 +4441,10 @@
         </p:nvGrpSpPr>
         <p:grpSpPr>
           <a:xfrm>
-            <a:off x="1956308" y="53894"/>
-            <a:ext cx="2504214" cy="5187216"/>
-            <a:chOff x="1107542" y="-41227"/>
-            <a:chExt cx="2479589" cy="9178313"/>
+            <a:off x="1979182" y="43653"/>
+            <a:ext cx="4647926" cy="10885494"/>
+            <a:chOff x="2754436" y="69474"/>
+            <a:chExt cx="4647926" cy="10885494"/>
           </a:xfrm>
         </p:grpSpPr>
         <p:pic>
@@ -4507,8 +4469,8 @@
           </p:blipFill>
           <p:spPr>
             <a:xfrm>
-              <a:off x="1753796" y="-41227"/>
-              <a:ext cx="1128281" cy="1307046"/>
+              <a:off x="3788267" y="69474"/>
+              <a:ext cx="2108047" cy="1665529"/>
             </a:xfrm>
             <a:prstGeom prst="rect">
               <a:avLst/>
@@ -4537,8 +4499,8 @@
           </p:blipFill>
           <p:spPr>
             <a:xfrm>
-              <a:off x="1859577" y="7368567"/>
-              <a:ext cx="1005517" cy="1299011"/>
+              <a:off x="4131492" y="8979864"/>
+              <a:ext cx="1878678" cy="1655291"/>
             </a:xfrm>
             <a:prstGeom prst="rect">
               <a:avLst/>
@@ -4559,8 +4521,8 @@
           </p:nvSpPr>
           <p:spPr>
             <a:xfrm>
-              <a:off x="1443235" y="2226548"/>
-              <a:ext cx="1808207" cy="1290820"/>
+              <a:off x="3255163" y="2416036"/>
+              <a:ext cx="3378400" cy="1644853"/>
             </a:xfrm>
             <a:prstGeom prst="flowChartManualOperation">
               <a:avLst/>
@@ -4594,7 +4556,7 @@
             <a:p>
               <a:pPr algn="ctr"/>
               <a:r>
-                <a:rPr lang="en-US" sz="1400" dirty="0">
+                <a:rPr lang="en-US" sz="2800" dirty="0">
                   <a:solidFill>
                     <a:schemeClr val="tx1"/>
                   </a:solidFill>
@@ -4620,8 +4582,8 @@
           </p:nvSpPr>
           <p:spPr>
             <a:xfrm>
-              <a:off x="1107542" y="3968997"/>
-              <a:ext cx="2479589" cy="1290820"/>
+              <a:off x="2754436" y="4550331"/>
+              <a:ext cx="4632790" cy="1644853"/>
             </a:xfrm>
             <a:prstGeom prst="roundRect">
               <a:avLst/>
@@ -4655,7 +4617,7 @@
             <a:p>
               <a:pPr algn="ctr"/>
               <a:r>
-                <a:rPr lang="en-US" sz="1400" dirty="0">
+                <a:rPr lang="en-US" sz="2800" dirty="0">
                   <a:solidFill>
                     <a:schemeClr val="tx1"/>
                   </a:solidFill>
@@ -4679,8 +4641,8 @@
           </p:nvSpPr>
           <p:spPr>
             <a:xfrm rot="10800000">
-              <a:off x="1443232" y="5690580"/>
-              <a:ext cx="1808207" cy="1290820"/>
+              <a:off x="3412087" y="6733576"/>
+              <a:ext cx="3378400" cy="1644853"/>
             </a:xfrm>
             <a:prstGeom prst="flowChartManualOperation">
               <a:avLst/>
@@ -4713,7 +4675,7 @@
             <a:lstStyle/>
             <a:p>
               <a:pPr algn="ctr"/>
-              <a:endParaRPr lang="en-US" dirty="0">
+              <a:endParaRPr lang="en-US" sz="5850" dirty="0">
                 <a:solidFill>
                   <a:schemeClr val="tx1"/>
                 </a:solidFill>
@@ -4737,8 +4699,8 @@
           </p:nvSpPr>
           <p:spPr>
             <a:xfrm>
-              <a:off x="1948954" y="5674258"/>
-              <a:ext cx="1108015" cy="1307000"/>
+              <a:off x="4432726" y="6884178"/>
+              <a:ext cx="2070182" cy="1384995"/>
             </a:xfrm>
             <a:prstGeom prst="rect">
               <a:avLst/>
@@ -4751,8 +4713,9 @@
             </a:bodyPr>
             <a:lstStyle/>
             <a:p>
+              <a:pPr algn="ctr"/>
               <a:r>
-                <a:rPr lang="en-US" sz="1400" dirty="0">
+                <a:rPr lang="en-US" sz="2800" dirty="0">
                   <a:latin typeface="Times New Roman" panose="02020603050405020304" pitchFamily="18" charset="0"/>
                   <a:cs typeface="Times New Roman" panose="02020603050405020304" pitchFamily="18" charset="0"/>
                 </a:rPr>
@@ -4775,8 +4738,8 @@
           </p:nvSpPr>
           <p:spPr>
             <a:xfrm>
-              <a:off x="1869191" y="1198984"/>
-              <a:ext cx="855840" cy="544584"/>
+              <a:off x="5864762" y="675364"/>
+              <a:ext cx="1537600" cy="523220"/>
             </a:xfrm>
             <a:prstGeom prst="rect">
               <a:avLst/>
@@ -4790,7 +4753,7 @@
             <a:lstStyle/>
             <a:p>
               <a:r>
-                <a:rPr lang="en-US" sz="1400" dirty="0">
+                <a:rPr lang="en-US" sz="2800" dirty="0">
                   <a:latin typeface="Times New Roman" panose="02020603050405020304" pitchFamily="18" charset="0"/>
                   <a:cs typeface="Times New Roman" panose="02020603050405020304" pitchFamily="18" charset="0"/>
                 </a:rPr>
@@ -4813,8 +4776,8 @@
           </p:nvSpPr>
           <p:spPr>
             <a:xfrm>
-              <a:off x="1402692" y="8592502"/>
-              <a:ext cx="1919290" cy="544584"/>
+              <a:off x="3412086" y="10431748"/>
+              <a:ext cx="3677610" cy="523220"/>
             </a:xfrm>
             <a:prstGeom prst="rect">
               <a:avLst/>
@@ -4828,7 +4791,7 @@
             <a:lstStyle/>
             <a:p>
               <a:r>
-                <a:rPr lang="en-US" sz="1400" dirty="0">
+                <a:rPr lang="en-US" sz="2800" dirty="0">
                   <a:latin typeface="Times New Roman" panose="02020603050405020304" pitchFamily="18" charset="0"/>
                   <a:cs typeface="Times New Roman" panose="02020603050405020304" pitchFamily="18" charset="0"/>
                 </a:rPr>
@@ -4851,8 +4814,8 @@
           </p:nvSpPr>
           <p:spPr>
             <a:xfrm>
-              <a:off x="2083727" y="1822894"/>
-              <a:ext cx="527221" cy="403654"/>
+              <a:off x="4450128" y="1861213"/>
+              <a:ext cx="985044" cy="514364"/>
             </a:xfrm>
             <a:prstGeom prst="downArrow">
               <a:avLst/>
@@ -4885,7 +4848,7 @@
             <a:lstStyle/>
             <a:p>
               <a:pPr algn="ctr"/>
-              <a:endParaRPr lang="en-US"/>
+              <a:endParaRPr lang="en-US" sz="5850"/>
             </a:p>
           </p:txBody>
         </p:sp>
@@ -4903,8 +4866,8 @@
           </p:nvSpPr>
           <p:spPr>
             <a:xfrm>
-              <a:off x="2098727" y="3533593"/>
-              <a:ext cx="527221" cy="403654"/>
+              <a:off x="4468458" y="4050385"/>
+              <a:ext cx="985044" cy="514364"/>
             </a:xfrm>
             <a:prstGeom prst="downArrow">
               <a:avLst/>
@@ -4937,7 +4900,7 @@
             <a:lstStyle/>
             <a:p>
               <a:pPr algn="ctr"/>
-              <a:endParaRPr lang="en-US"/>
+              <a:endParaRPr lang="en-US" sz="5850"/>
             </a:p>
           </p:txBody>
         </p:sp>
@@ -4955,8 +4918,8 @@
           </p:nvSpPr>
           <p:spPr>
             <a:xfrm>
-              <a:off x="2098727" y="5270605"/>
-              <a:ext cx="527221" cy="403654"/>
+              <a:off x="4578309" y="6195184"/>
+              <a:ext cx="985044" cy="514364"/>
             </a:xfrm>
             <a:prstGeom prst="downArrow">
               <a:avLst/>
@@ -4989,7 +4952,7 @@
             <a:lstStyle/>
             <a:p>
               <a:pPr algn="ctr"/>
-              <a:endParaRPr lang="en-US"/>
+              <a:endParaRPr lang="en-US" sz="5850"/>
             </a:p>
           </p:txBody>
         </p:sp>
@@ -5007,8 +4970,8 @@
           </p:nvSpPr>
           <p:spPr>
             <a:xfrm>
-              <a:off x="2098727" y="6978249"/>
-              <a:ext cx="527221" cy="403654"/>
+              <a:off x="4608764" y="8407296"/>
+              <a:ext cx="985044" cy="514364"/>
             </a:xfrm>
             <a:prstGeom prst="downArrow">
               <a:avLst/>
@@ -5041,11 +5004,49 @@
             <a:lstStyle/>
             <a:p>
               <a:pPr algn="ctr"/>
-              <a:endParaRPr lang="en-US"/>
+              <a:endParaRPr lang="en-US" sz="5850"/>
             </a:p>
           </p:txBody>
         </p:sp>
       </p:grpSp>
+      <p:sp>
+        <p:nvSpPr>
+          <p:cNvPr id="51" name="TextBox 50">
+            <a:extLst>
+              <a:ext uri="{FF2B5EF4-FFF2-40B4-BE49-F238E27FC236}">
+                <a16:creationId xmlns:a16="http://schemas.microsoft.com/office/drawing/2014/main" id="{94BCFFBE-6B40-4D2D-831E-9C5A823EC52B}"/>
+              </a:ext>
+            </a:extLst>
+          </p:cNvPr>
+          <p:cNvSpPr txBox="1"/>
+          <p:nvPr/>
+        </p:nvSpPr>
+        <p:spPr>
+          <a:xfrm>
+            <a:off x="8475614" y="112470"/>
+            <a:ext cx="595035" cy="830997"/>
+          </a:xfrm>
+          <a:prstGeom prst="rect">
+            <a:avLst/>
+          </a:prstGeom>
+          <a:noFill/>
+        </p:spPr>
+        <p:txBody>
+          <a:bodyPr wrap="none" rtlCol="0">
+            <a:spAutoFit/>
+          </a:bodyPr>
+          <a:lstStyle/>
+          <a:p>
+            <a:r>
+              <a:rPr lang="en-US" sz="4800" b="1" dirty="0">
+                <a:latin typeface="Times New Roman" panose="02020603050405020304" pitchFamily="18" charset="0"/>
+                <a:cs typeface="Times New Roman" panose="02020603050405020304" pitchFamily="18" charset="0"/>
+              </a:rPr>
+              <a:t>B</a:t>
+            </a:r>
+          </a:p>
+        </p:txBody>
+      </p:sp>
     </p:spTree>
     <p:extLst>
       <p:ext uri="{BB962C8B-B14F-4D97-AF65-F5344CB8AC3E}">

</xml_diff>

<commit_message>
Updating figures and validation notebook
</commit_message>
<xml_diff>
--- a/Images/SI4.pptx
+++ b/Images/SI4.pptx
@@ -197,7 +197,7 @@
           <a:p>
             <a:fld id="{0C45F89B-D0D3-4AC5-836F-869636F86470}" type="datetimeFigureOut">
               <a:rPr lang="en-US" smtClean="0"/>
-              <a:t>10/1/2021</a:t>
+              <a:t>11/11/2021</a:t>
             </a:fld>
             <a:endParaRPr lang="en-US"/>
           </a:p>
@@ -595,7 +595,7 @@
           <a:p>
             <a:fld id="{1516511B-B61A-47A9-97DC-35FBB5E54714}" type="datetimeFigureOut">
               <a:rPr lang="en-US" smtClean="0"/>
-              <a:t>10/1/2021</a:t>
+              <a:t>11/11/2021</a:t>
             </a:fld>
             <a:endParaRPr lang="en-US"/>
           </a:p>
@@ -765,7 +765,7 @@
           <a:p>
             <a:fld id="{1516511B-B61A-47A9-97DC-35FBB5E54714}" type="datetimeFigureOut">
               <a:rPr lang="en-US" smtClean="0"/>
-              <a:t>10/1/2021</a:t>
+              <a:t>11/11/2021</a:t>
             </a:fld>
             <a:endParaRPr lang="en-US"/>
           </a:p>
@@ -945,7 +945,7 @@
           <a:p>
             <a:fld id="{1516511B-B61A-47A9-97DC-35FBB5E54714}" type="datetimeFigureOut">
               <a:rPr lang="en-US" smtClean="0"/>
-              <a:t>10/1/2021</a:t>
+              <a:t>11/11/2021</a:t>
             </a:fld>
             <a:endParaRPr lang="en-US"/>
           </a:p>
@@ -1115,7 +1115,7 @@
           <a:p>
             <a:fld id="{1516511B-B61A-47A9-97DC-35FBB5E54714}" type="datetimeFigureOut">
               <a:rPr lang="en-US" smtClean="0"/>
-              <a:t>10/1/2021</a:t>
+              <a:t>11/11/2021</a:t>
             </a:fld>
             <a:endParaRPr lang="en-US"/>
           </a:p>
@@ -1361,7 +1361,7 @@
           <a:p>
             <a:fld id="{1516511B-B61A-47A9-97DC-35FBB5E54714}" type="datetimeFigureOut">
               <a:rPr lang="en-US" smtClean="0"/>
-              <a:t>10/1/2021</a:t>
+              <a:t>11/11/2021</a:t>
             </a:fld>
             <a:endParaRPr lang="en-US"/>
           </a:p>
@@ -1593,7 +1593,7 @@
           <a:p>
             <a:fld id="{1516511B-B61A-47A9-97DC-35FBB5E54714}" type="datetimeFigureOut">
               <a:rPr lang="en-US" smtClean="0"/>
-              <a:t>10/1/2021</a:t>
+              <a:t>11/11/2021</a:t>
             </a:fld>
             <a:endParaRPr lang="en-US"/>
           </a:p>
@@ -1960,7 +1960,7 @@
           <a:p>
             <a:fld id="{1516511B-B61A-47A9-97DC-35FBB5E54714}" type="datetimeFigureOut">
               <a:rPr lang="en-US" smtClean="0"/>
-              <a:t>10/1/2021</a:t>
+              <a:t>11/11/2021</a:t>
             </a:fld>
             <a:endParaRPr lang="en-US"/>
           </a:p>
@@ -2078,7 +2078,7 @@
           <a:p>
             <a:fld id="{1516511B-B61A-47A9-97DC-35FBB5E54714}" type="datetimeFigureOut">
               <a:rPr lang="en-US" smtClean="0"/>
-              <a:t>10/1/2021</a:t>
+              <a:t>11/11/2021</a:t>
             </a:fld>
             <a:endParaRPr lang="en-US"/>
           </a:p>
@@ -2173,7 +2173,7 @@
           <a:p>
             <a:fld id="{1516511B-B61A-47A9-97DC-35FBB5E54714}" type="datetimeFigureOut">
               <a:rPr lang="en-US" smtClean="0"/>
-              <a:t>10/1/2021</a:t>
+              <a:t>11/11/2021</a:t>
             </a:fld>
             <a:endParaRPr lang="en-US"/>
           </a:p>
@@ -2450,7 +2450,7 @@
           <a:p>
             <a:fld id="{1516511B-B61A-47A9-97DC-35FBB5E54714}" type="datetimeFigureOut">
               <a:rPr lang="en-US" smtClean="0"/>
-              <a:t>10/1/2021</a:t>
+              <a:t>11/11/2021</a:t>
             </a:fld>
             <a:endParaRPr lang="en-US"/>
           </a:p>
@@ -2707,7 +2707,7 @@
           <a:p>
             <a:fld id="{1516511B-B61A-47A9-97DC-35FBB5E54714}" type="datetimeFigureOut">
               <a:rPr lang="en-US" smtClean="0"/>
-              <a:t>10/1/2021</a:t>
+              <a:t>11/11/2021</a:t>
             </a:fld>
             <a:endParaRPr lang="en-US"/>
           </a:p>
@@ -2920,7 +2920,7 @@
           <a:p>
             <a:fld id="{1516511B-B61A-47A9-97DC-35FBB5E54714}" type="datetimeFigureOut">
               <a:rPr lang="en-US" smtClean="0"/>
-              <a:t>10/1/2021</a:t>
+              <a:t>11/11/2021</a:t>
             </a:fld>
             <a:endParaRPr lang="en-US"/>
           </a:p>
@@ -3339,7 +3339,7 @@
         </p:nvGrpSpPr>
         <p:grpSpPr>
           <a:xfrm>
-            <a:off x="9339480" y="649542"/>
+            <a:off x="872243" y="664362"/>
             <a:ext cx="14060236" cy="9207361"/>
             <a:chOff x="836863" y="296455"/>
             <a:chExt cx="7912769" cy="4960019"/>
@@ -4082,7 +4082,7 @@
                   <a:latin typeface="Times New Roman" panose="02020603050405020304" pitchFamily="18" charset="0"/>
                   <a:cs typeface="Times New Roman" panose="02020603050405020304" pitchFamily="18" charset="0"/>
                 </a:rPr>
-                <a:t>Maximize the similarities between proteins 1, 2, and 3</a:t>
+                <a:t>Minimize the distances between proteins 1, 2, and 3</a:t>
               </a:r>
             </a:p>
           </p:txBody>
@@ -4232,7 +4232,7 @@
                   <a:latin typeface="Times New Roman" panose="02020603050405020304" pitchFamily="18" charset="0"/>
                   <a:cs typeface="Times New Roman" panose="02020603050405020304" pitchFamily="18" charset="0"/>
                 </a:rPr>
-                <a:t>Maximize the similarities between proteins 1, 2, and 3</a:t>
+                <a:t>Minimize the distances between proteins 4 and 5</a:t>
               </a:r>
             </a:p>
           </p:txBody>
@@ -4383,7 +4383,7 @@
                   <a:latin typeface="Times New Roman" panose="02020603050405020304" pitchFamily="18" charset="0"/>
                   <a:cs typeface="Times New Roman" panose="02020603050405020304" pitchFamily="18" charset="0"/>
                 </a:rPr>
-                <a:t>Maximize the dissimilarities between proteins (1, 2, 3) and (4,5)</a:t>
+                <a:t>Maximize the distances between proteins (1, 2, 3) and (4,5)</a:t>
               </a:r>
             </a:p>
           </p:txBody>
@@ -4403,7 +4403,7 @@
         </p:nvSpPr>
         <p:spPr>
           <a:xfrm>
-            <a:off x="625448" y="112471"/>
+            <a:off x="368792" y="60106"/>
             <a:ext cx="628698" cy="830997"/>
           </a:xfrm>
           <a:prstGeom prst="rect">
@@ -4441,7 +4441,7 @@
         </p:nvGrpSpPr>
         <p:grpSpPr>
           <a:xfrm>
-            <a:off x="1835357" y="62463"/>
+            <a:off x="16820087" y="77282"/>
             <a:ext cx="4791751" cy="10844561"/>
             <a:chOff x="2610611" y="88284"/>
             <a:chExt cx="4791751" cy="10844561"/>
@@ -5023,7 +5023,7 @@
         </p:nvSpPr>
         <p:spPr>
           <a:xfrm>
-            <a:off x="8475614" y="112470"/>
+            <a:off x="15470774" y="60106"/>
             <a:ext cx="595035" cy="830997"/>
           </a:xfrm>
           <a:prstGeom prst="rect">

</xml_diff>